<commit_message>
Added mrs references and worked on presentation
</commit_message>
<xml_diff>
--- a/presentation/ajs_dir_presentation.pptx
+++ b/presentation/ajs_dir_presentation.pptx
@@ -5,7 +5,7 @@
     <p:sldMasterId id="2147483660" r:id="rId1"/>
   </p:sldMasterIdLst>
   <p:notesMasterIdLst>
-    <p:notesMasterId r:id="rId12"/>
+    <p:notesMasterId r:id="rId17"/>
   </p:notesMasterIdLst>
   <p:sldIdLst>
     <p:sldId id="256" r:id="rId2"/>
@@ -13,11 +13,16 @@
     <p:sldId id="258" r:id="rId4"/>
     <p:sldId id="259" r:id="rId5"/>
     <p:sldId id="260" r:id="rId6"/>
-    <p:sldId id="261" r:id="rId7"/>
+    <p:sldId id="266" r:id="rId7"/>
     <p:sldId id="263" r:id="rId8"/>
-    <p:sldId id="264" r:id="rId9"/>
-    <p:sldId id="265" r:id="rId10"/>
-    <p:sldId id="262" r:id="rId11"/>
+    <p:sldId id="267" r:id="rId9"/>
+    <p:sldId id="264" r:id="rId10"/>
+    <p:sldId id="269" r:id="rId11"/>
+    <p:sldId id="261" r:id="rId12"/>
+    <p:sldId id="265" r:id="rId13"/>
+    <p:sldId id="270" r:id="rId14"/>
+    <p:sldId id="268" r:id="rId15"/>
+    <p:sldId id="262" r:id="rId16"/>
   </p:sldIdLst>
   <p:sldSz cx="9144000" cy="6858000" type="screen4x3"/>
   <p:notesSz cx="6858000" cy="9144000"/>
@@ -201,7 +206,7 @@
           <a:p>
             <a:fld id="{457A472E-D807-BD49-BE97-A395F22B75F3}" type="datetimeFigureOut">
               <a:rPr lang="en-US" smtClean="0"/>
-              <a:t>8/30/14</a:t>
+              <a:t>8/31/14</a:t>
             </a:fld>
             <a:endParaRPr lang="en-US"/>
           </a:p>
@@ -534,7 +539,7 @@
           <a:p>
             <a:fld id="{0666F230-82CB-A344-8833-0AA894583C70}" type="slidenum">
               <a:rPr lang="en-US" smtClean="0"/>
-              <a:t>6</a:t>
+              <a:t>11</a:t>
             </a:fld>
             <a:endParaRPr lang="en-US"/>
           </a:p>
@@ -838,7 +843,7 @@
             <a:fld id="{23A271A1-F6D6-438B-A432-4747EE7ECD40}" type="datetimeFigureOut">
               <a:rPr lang="en-US" smtClean="0"/>
               <a:pPr algn="ctr" eaLnBrk="1" latinLnBrk="0" hangingPunct="1"/>
-              <a:t>8/30/14</a:t>
+              <a:t>8/31/14</a:t>
             </a:fld>
             <a:endParaRPr lang="en-US" sz="2000" dirty="0">
               <a:solidFill>
@@ -1025,7 +1030,7 @@
             <a:fld id="{23A271A1-F6D6-438B-A432-4747EE7ECD40}" type="datetimeFigureOut">
               <a:rPr lang="en-US" smtClean="0"/>
               <a:pPr eaLnBrk="1" latinLnBrk="0" hangingPunct="1"/>
-              <a:t>8/30/14</a:t>
+              <a:t>8/31/14</a:t>
             </a:fld>
             <a:endParaRPr lang="en-US"/>
           </a:p>
@@ -1193,7 +1198,7 @@
             <a:fld id="{23A271A1-F6D6-438B-A432-4747EE7ECD40}" type="datetimeFigureOut">
               <a:rPr lang="en-US" smtClean="0"/>
               <a:pPr eaLnBrk="1" latinLnBrk="0" hangingPunct="1"/>
-              <a:t>8/30/14</a:t>
+              <a:t>8/31/14</a:t>
             </a:fld>
             <a:endParaRPr lang="en-US" dirty="0"/>
           </a:p>
@@ -1455,7 +1460,7 @@
             <a:fld id="{23A271A1-F6D6-438B-A432-4747EE7ECD40}" type="datetimeFigureOut">
               <a:rPr lang="en-US" smtClean="0"/>
               <a:pPr eaLnBrk="1" latinLnBrk="0" hangingPunct="1"/>
-              <a:t>8/30/14</a:t>
+              <a:t>8/31/14</a:t>
             </a:fld>
             <a:endParaRPr lang="en-US" dirty="0"/>
           </a:p>
@@ -1855,7 +1860,7 @@
             <a:fld id="{23A271A1-F6D6-438B-A432-4747EE7ECD40}" type="datetimeFigureOut">
               <a:rPr lang="en-US" smtClean="0"/>
               <a:pPr eaLnBrk="1" latinLnBrk="0" hangingPunct="1"/>
-              <a:t>8/30/14</a:t>
+              <a:t>8/31/14</a:t>
             </a:fld>
             <a:endParaRPr lang="en-US"/>
           </a:p>
@@ -2069,7 +2074,7 @@
             <a:fld id="{23A271A1-F6D6-438B-A432-4747EE7ECD40}" type="datetimeFigureOut">
               <a:rPr lang="en-US" smtClean="0"/>
               <a:pPr eaLnBrk="1" latinLnBrk="0" hangingPunct="1"/>
-              <a:t>8/30/14</a:t>
+              <a:t>8/31/14</a:t>
             </a:fld>
             <a:endParaRPr lang="en-US"/>
           </a:p>
@@ -2273,7 +2278,7 @@
             <a:fld id="{23A271A1-F6D6-438B-A432-4747EE7ECD40}" type="datetimeFigureOut">
               <a:rPr lang="en-US" smtClean="0"/>
               <a:pPr eaLnBrk="1" latinLnBrk="0" hangingPunct="1"/>
-              <a:t>8/30/14</a:t>
+              <a:t>8/31/14</a:t>
             </a:fld>
             <a:endParaRPr lang="en-US"/>
           </a:p>
@@ -2462,7 +2467,7 @@
             <a:fld id="{23A271A1-F6D6-438B-A432-4747EE7ECD40}" type="datetimeFigureOut">
               <a:rPr lang="en-US" smtClean="0"/>
               <a:pPr eaLnBrk="1" latinLnBrk="0" hangingPunct="1"/>
-              <a:t>8/30/14</a:t>
+              <a:t>8/31/14</a:t>
             </a:fld>
             <a:endParaRPr lang="en-US"/>
           </a:p>
@@ -2567,7 +2572,7 @@
             <a:fld id="{23A271A1-F6D6-438B-A432-4747EE7ECD40}" type="datetimeFigureOut">
               <a:rPr lang="en-US" smtClean="0"/>
               <a:pPr eaLnBrk="1" latinLnBrk="0" hangingPunct="1"/>
-              <a:t>8/30/14</a:t>
+              <a:t>8/31/14</a:t>
             </a:fld>
             <a:endParaRPr lang="en-US"/>
           </a:p>
@@ -2706,7 +2711,7 @@
             <a:fld id="{23A271A1-F6D6-438B-A432-4747EE7ECD40}" type="datetimeFigureOut">
               <a:rPr lang="en-US" smtClean="0"/>
               <a:pPr eaLnBrk="1" latinLnBrk="0" hangingPunct="1"/>
-              <a:t>8/30/14</a:t>
+              <a:t>8/31/14</a:t>
             </a:fld>
             <a:endParaRPr lang="en-US"/>
           </a:p>
@@ -3205,7 +3210,7 @@
             <a:fld id="{23A271A1-F6D6-438B-A432-4747EE7ECD40}" type="datetimeFigureOut">
               <a:rPr lang="en-US" smtClean="0"/>
               <a:pPr eaLnBrk="1" latinLnBrk="0" hangingPunct="1"/>
-              <a:t>8/30/14</a:t>
+              <a:t>8/31/14</a:t>
             </a:fld>
             <a:endParaRPr lang="en-US"/>
           </a:p>
@@ -3466,7 +3471,7 @@
             <a:fld id="{23A271A1-F6D6-438B-A432-4747EE7ECD40}" type="datetimeFigureOut">
               <a:rPr lang="en-US" smtClean="0"/>
               <a:pPr eaLnBrk="1" latinLnBrk="0" hangingPunct="1"/>
-              <a:t>8/30/14</a:t>
+              <a:t>8/31/14</a:t>
             </a:fld>
             <a:endParaRPr lang="en-US" sz="1400" dirty="0">
               <a:solidFill>
@@ -4350,6 +4355,13 @@
   <p:clrMapOvr>
     <a:masterClrMapping/>
   </p:clrMapOvr>
+  <p:timing>
+    <p:tnLst>
+      <p:par>
+        <p:cTn xmlns:p14="http://schemas.microsoft.com/office/powerpoint/2010/main" id="1" dur="indefinite" restart="never" nodeType="tmRoot"/>
+      </p:par>
+    </p:tnLst>
+  </p:timing>
 </p:sld>
 </file>
 
@@ -4387,7 +4399,2267 @@
           <a:p>
             <a:r>
               <a:rPr lang="en-US" dirty="0"/>
-              <a:t>Writing Basic Custom Directives</a:t>
+              <a:t>Inside A Directive: Return Object</a:t>
+            </a:r>
+          </a:p>
+        </p:txBody>
+      </p:sp>
+      <p:sp>
+        <p:nvSpPr>
+          <p:cNvPr id="3" name="Content Placeholder 2"/>
+          <p:cNvSpPr>
+            <a:spLocks noGrp="1"/>
+          </p:cNvSpPr>
+          <p:nvPr>
+            <p:ph sz="quarter" idx="1"/>
+          </p:nvPr>
+        </p:nvSpPr>
+        <p:spPr/>
+        <p:txBody>
+          <a:bodyPr/>
+          <a:lstStyle/>
+          <a:p>
+            <a:r>
+              <a:rPr lang="en-US" dirty="0" smtClean="0"/>
+              <a:t>Some additional items that can be returned:</a:t>
+            </a:r>
+          </a:p>
+          <a:p>
+            <a:pPr lvl="1"/>
+            <a:r>
+              <a:rPr lang="en-US" dirty="0" smtClean="0"/>
+              <a:t>Replace (true or </a:t>
+            </a:r>
+            <a:r>
+              <a:rPr lang="en-US" b="1" dirty="0" smtClean="0">
+                <a:solidFill>
+                  <a:schemeClr val="accent1"/>
+                </a:solidFill>
+              </a:rPr>
+              <a:t>false</a:t>
+            </a:r>
+            <a:r>
+              <a:rPr lang="en-US" dirty="0" smtClean="0"/>
+              <a:t>)</a:t>
+            </a:r>
+          </a:p>
+          <a:p>
+            <a:pPr lvl="1"/>
+            <a:r>
+              <a:rPr lang="en-US" dirty="0" smtClean="0"/>
+              <a:t>Priority (</a:t>
+            </a:r>
+            <a:r>
+              <a:rPr lang="en-US" dirty="0" smtClean="0">
+                <a:solidFill>
+                  <a:srgbClr val="AD0101"/>
+                </a:solidFill>
+              </a:rPr>
+              <a:t>0</a:t>
+            </a:r>
+            <a:r>
+              <a:rPr lang="en-US" dirty="0" smtClean="0"/>
+              <a:t> – 3)</a:t>
+            </a:r>
+          </a:p>
+          <a:p>
+            <a:pPr lvl="1"/>
+            <a:r>
+              <a:rPr lang="en-US" dirty="0" smtClean="0"/>
+              <a:t>Transclude </a:t>
+            </a:r>
+            <a:r>
+              <a:rPr lang="en-US" dirty="0"/>
+              <a:t>(true or </a:t>
+            </a:r>
+            <a:r>
+              <a:rPr lang="en-US" b="1" dirty="0">
+                <a:solidFill>
+                  <a:schemeClr val="accent1"/>
+                </a:solidFill>
+              </a:rPr>
+              <a:t>false</a:t>
+            </a:r>
+            <a:r>
+              <a:rPr lang="en-US" dirty="0"/>
+              <a:t>)</a:t>
+            </a:r>
+          </a:p>
+          <a:p>
+            <a:pPr lvl="1"/>
+            <a:r>
+              <a:rPr lang="en-US" dirty="0" smtClean="0"/>
+              <a:t>Terminal </a:t>
+            </a:r>
+            <a:r>
+              <a:rPr lang="en-US" dirty="0"/>
+              <a:t>(true or </a:t>
+            </a:r>
+            <a:r>
+              <a:rPr lang="en-US" b="1" dirty="0">
+                <a:solidFill>
+                  <a:schemeClr val="accent1"/>
+                </a:solidFill>
+              </a:rPr>
+              <a:t>false</a:t>
+            </a:r>
+            <a:r>
+              <a:rPr lang="en-US" dirty="0"/>
+              <a:t>)</a:t>
+            </a:r>
+          </a:p>
+          <a:p>
+            <a:pPr lvl="1"/>
+            <a:r>
+              <a:rPr lang="en-US" dirty="0" smtClean="0"/>
+              <a:t>Require (</a:t>
+            </a:r>
+            <a:r>
+              <a:rPr lang="en-US" b="1" dirty="0" smtClean="0">
+                <a:solidFill>
+                  <a:schemeClr val="accent1"/>
+                </a:solidFill>
+              </a:rPr>
+              <a:t>false </a:t>
+            </a:r>
+            <a:r>
+              <a:rPr lang="en-US" dirty="0" smtClean="0"/>
+              <a:t>or ‘object’)</a:t>
+            </a:r>
+            <a:endParaRPr lang="en-US" dirty="0"/>
+          </a:p>
+          <a:p>
+            <a:pPr lvl="1"/>
+            <a:r>
+              <a:rPr lang="en-US" dirty="0" smtClean="0"/>
+              <a:t>Compile (function that returns object)</a:t>
+            </a:r>
+          </a:p>
+          <a:p>
+            <a:pPr lvl="2"/>
+            <a:r>
+              <a:rPr lang="en-US" dirty="0" smtClean="0"/>
+              <a:t>Pre (function)</a:t>
+            </a:r>
+          </a:p>
+          <a:p>
+            <a:pPr lvl="2"/>
+            <a:r>
+              <a:rPr lang="en-US" dirty="0" smtClean="0"/>
+              <a:t>Post (function)</a:t>
+            </a:r>
+            <a:endParaRPr lang="en-US" dirty="0"/>
+          </a:p>
+        </p:txBody>
+      </p:sp>
+    </p:spTree>
+    <p:extLst>
+      <p:ext uri="{BB962C8B-B14F-4D97-AF65-F5344CB8AC3E}">
+        <p14:creationId xmlns:p14="http://schemas.microsoft.com/office/powerpoint/2010/main" val="3230212530"/>
+      </p:ext>
+    </p:extLst>
+  </p:cSld>
+  <p:clrMapOvr>
+    <a:masterClrMapping/>
+  </p:clrMapOvr>
+  <p:timing>
+    <p:tnLst>
+      <p:par>
+        <p:cTn xmlns:p14="http://schemas.microsoft.com/office/powerpoint/2010/main" id="1" dur="indefinite" restart="never" nodeType="tmRoot"/>
+      </p:par>
+    </p:tnLst>
+  </p:timing>
+</p:sld>
+</file>
+
+<file path=ppt/slides/slide11.xml><?xml version="1.0" encoding="utf-8"?>
+<p:sld xmlns:a="http://schemas.openxmlformats.org/drawingml/2006/main" xmlns:r="http://schemas.openxmlformats.org/officeDocument/2006/relationships" xmlns:p="http://schemas.openxmlformats.org/presentationml/2006/main">
+  <p:cSld>
+    <p:spTree>
+      <p:nvGrpSpPr>
+        <p:cNvPr id="1" name=""/>
+        <p:cNvGrpSpPr/>
+        <p:nvPr/>
+      </p:nvGrpSpPr>
+      <p:grpSpPr>
+        <a:xfrm>
+          <a:off x="0" y="0"/>
+          <a:ext cx="0" cy="0"/>
+          <a:chOff x="0" y="0"/>
+          <a:chExt cx="0" cy="0"/>
+        </a:xfrm>
+      </p:grpSpPr>
+      <p:sp>
+        <p:nvSpPr>
+          <p:cNvPr id="2" name="Title 1"/>
+          <p:cNvSpPr>
+            <a:spLocks noGrp="1"/>
+          </p:cNvSpPr>
+          <p:nvPr>
+            <p:ph type="title"/>
+          </p:nvPr>
+        </p:nvSpPr>
+        <p:spPr/>
+        <p:txBody>
+          <a:bodyPr>
+            <a:normAutofit/>
+          </a:bodyPr>
+          <a:lstStyle/>
+          <a:p>
+            <a:r>
+              <a:rPr lang="en-US" dirty="0" smtClean="0"/>
+              <a:t>Inside </a:t>
+            </a:r>
+            <a:r>
+              <a:rPr lang="en-US" dirty="0"/>
+              <a:t>A </a:t>
+            </a:r>
+            <a:r>
+              <a:rPr lang="en-US" dirty="0" smtClean="0"/>
+              <a:t>Directive: Restrict </a:t>
+            </a:r>
+            <a:endParaRPr lang="en-US" dirty="0"/>
+          </a:p>
+        </p:txBody>
+      </p:sp>
+      <p:sp>
+        <p:nvSpPr>
+          <p:cNvPr id="3" name="Content Placeholder 2"/>
+          <p:cNvSpPr>
+            <a:spLocks noGrp="1"/>
+          </p:cNvSpPr>
+          <p:nvPr>
+            <p:ph sz="quarter" idx="1"/>
+          </p:nvPr>
+        </p:nvSpPr>
+        <p:spPr>
+          <a:xfrm>
+            <a:off x="612648" y="1683171"/>
+            <a:ext cx="8153400" cy="4468338"/>
+          </a:xfrm>
+        </p:spPr>
+        <p:txBody>
+          <a:bodyPr>
+            <a:normAutofit/>
+          </a:bodyPr>
+          <a:lstStyle/>
+          <a:p>
+            <a:r>
+              <a:rPr lang="en-US" sz="2800" dirty="0" smtClean="0"/>
+              <a:t>Directives Implementations </a:t>
+            </a:r>
+            <a:r>
+              <a:rPr lang="en-US" sz="2800" dirty="0" smtClean="0"/>
+              <a:t>(‘restrict’) Come </a:t>
+            </a:r>
+            <a:r>
+              <a:rPr lang="en-US" sz="2800" dirty="0" smtClean="0"/>
+              <a:t>In 4 Types:</a:t>
+            </a:r>
+          </a:p>
+          <a:p>
+            <a:pPr lvl="1"/>
+            <a:r>
+              <a:rPr lang="en-US" sz="2100" dirty="0" smtClean="0"/>
+              <a:t>A new HTML </a:t>
+            </a:r>
+            <a:r>
+              <a:rPr lang="en-US" sz="2100" dirty="0" smtClean="0"/>
+              <a:t>Element &lt;Tag&gt; </a:t>
+            </a:r>
+            <a:r>
+              <a:rPr lang="en-US" sz="2100" dirty="0" smtClean="0"/>
+              <a:t>( </a:t>
+            </a:r>
+            <a:r>
+              <a:rPr lang="en-US" sz="2100" dirty="0" smtClean="0">
+                <a:solidFill>
+                  <a:srgbClr val="5A6885"/>
+                </a:solidFill>
+              </a:rPr>
+              <a:t>&lt;</a:t>
+            </a:r>
+            <a:r>
+              <a:rPr lang="en-US" sz="2100" dirty="0" smtClean="0">
+                <a:solidFill>
+                  <a:srgbClr val="AD0101"/>
+                </a:solidFill>
+              </a:rPr>
+              <a:t>my-custom</a:t>
+            </a:r>
+            <a:r>
+              <a:rPr lang="en-US" sz="2100" dirty="0" smtClean="0">
+                <a:solidFill>
+                  <a:srgbClr val="5A6885"/>
+                </a:solidFill>
+              </a:rPr>
+              <a:t>&gt;&lt;/</a:t>
+            </a:r>
+            <a:r>
+              <a:rPr lang="en-US" sz="2100" dirty="0" smtClean="0">
+                <a:solidFill>
+                  <a:srgbClr val="AD0101"/>
+                </a:solidFill>
+              </a:rPr>
+              <a:t>my-custom</a:t>
+            </a:r>
+            <a:r>
+              <a:rPr lang="en-US" sz="2100" dirty="0" smtClean="0">
+                <a:solidFill>
+                  <a:srgbClr val="5A6885"/>
+                </a:solidFill>
+              </a:rPr>
+              <a:t>&gt; </a:t>
+            </a:r>
+            <a:r>
+              <a:rPr lang="en-US" sz="2100" dirty="0" smtClean="0"/>
+              <a:t>)</a:t>
+            </a:r>
+          </a:p>
+          <a:p>
+            <a:pPr lvl="1"/>
+            <a:r>
+              <a:rPr lang="en-US" sz="2100" dirty="0" smtClean="0"/>
+              <a:t>An Attribute ( </a:t>
+            </a:r>
+            <a:r>
+              <a:rPr lang="en-US" sz="2100" dirty="0" smtClean="0">
+                <a:solidFill>
+                  <a:srgbClr val="5A6885"/>
+                </a:solidFill>
+              </a:rPr>
+              <a:t>&lt;input type=“text” </a:t>
+            </a:r>
+            <a:r>
+              <a:rPr lang="en-US" sz="2100" dirty="0" smtClean="0">
+                <a:solidFill>
+                  <a:srgbClr val="AD0101"/>
+                </a:solidFill>
+              </a:rPr>
+              <a:t>data-m</a:t>
+            </a:r>
+            <a:r>
+              <a:rPr lang="en-US" sz="2100" dirty="0" smtClean="0">
+                <a:solidFill>
+                  <a:schemeClr val="accent1"/>
+                </a:solidFill>
+              </a:rPr>
+              <a:t>y-custom </a:t>
+            </a:r>
+            <a:r>
+              <a:rPr lang="en-US" sz="2100" dirty="0" smtClean="0">
+                <a:solidFill>
+                  <a:srgbClr val="5A6885"/>
+                </a:solidFill>
+              </a:rPr>
+              <a:t>/&gt; </a:t>
+            </a:r>
+            <a:r>
+              <a:rPr lang="en-US" sz="2100" dirty="0" smtClean="0"/>
+              <a:t>) </a:t>
+            </a:r>
+          </a:p>
+          <a:p>
+            <a:pPr lvl="1"/>
+            <a:r>
+              <a:rPr lang="en-US" sz="2100" dirty="0" smtClean="0"/>
+              <a:t>As A Class ( </a:t>
+            </a:r>
+            <a:r>
+              <a:rPr lang="en-US" sz="2100" dirty="0" smtClean="0">
+                <a:solidFill>
+                  <a:srgbClr val="5A6885"/>
+                </a:solidFill>
+              </a:rPr>
+              <a:t>&lt;h1 class=“</a:t>
+            </a:r>
+            <a:r>
+              <a:rPr lang="en-US" sz="2100" dirty="0" smtClean="0">
+                <a:solidFill>
+                  <a:srgbClr val="AD0101"/>
+                </a:solidFill>
+              </a:rPr>
+              <a:t>my_custom</a:t>
+            </a:r>
+            <a:r>
+              <a:rPr lang="en-US" sz="2100" dirty="0" smtClean="0">
+                <a:solidFill>
+                  <a:srgbClr val="5A6885"/>
+                </a:solidFill>
+              </a:rPr>
+              <a:t>”&gt;&lt;/h1&gt; </a:t>
+            </a:r>
+            <a:r>
+              <a:rPr lang="en-US" sz="2100" dirty="0" smtClean="0"/>
+              <a:t>)</a:t>
+            </a:r>
+          </a:p>
+          <a:p>
+            <a:pPr lvl="1"/>
+            <a:r>
+              <a:rPr lang="en-US" sz="2100" dirty="0" smtClean="0"/>
+              <a:t>Comment/Meta ( </a:t>
+            </a:r>
+            <a:r>
+              <a:rPr lang="en-US" sz="2100" dirty="0" smtClean="0">
+                <a:solidFill>
+                  <a:schemeClr val="accent4">
+                    <a:lumMod val="75000"/>
+                  </a:schemeClr>
+                </a:solidFill>
+              </a:rPr>
+              <a:t>&lt;!--directive:</a:t>
+            </a:r>
+            <a:r>
+              <a:rPr lang="en-US" sz="2100" dirty="0" smtClean="0">
+                <a:solidFill>
+                  <a:schemeClr val="accent1"/>
+                </a:solidFill>
+              </a:rPr>
+              <a:t>my-custom </a:t>
+            </a:r>
+            <a:r>
+              <a:rPr lang="en-US" sz="2100" dirty="0" smtClean="0">
+                <a:solidFill>
+                  <a:schemeClr val="accent4">
+                    <a:lumMod val="75000"/>
+                  </a:schemeClr>
+                </a:solidFill>
+              </a:rPr>
+              <a:t>--&gt;</a:t>
+            </a:r>
+            <a:r>
+              <a:rPr lang="en-US" sz="2100" dirty="0" smtClean="0">
+                <a:solidFill>
+                  <a:schemeClr val="accent5">
+                    <a:lumMod val="60000"/>
+                    <a:lumOff val="40000"/>
+                  </a:schemeClr>
+                </a:solidFill>
+              </a:rPr>
+              <a:t> </a:t>
+            </a:r>
+            <a:r>
+              <a:rPr lang="en-US" sz="2100" dirty="0" smtClean="0"/>
+              <a:t>)</a:t>
+            </a:r>
+          </a:p>
+          <a:p>
+            <a:pPr marL="365760" lvl="1" indent="0">
+              <a:buNone/>
+            </a:pPr>
+            <a:endParaRPr lang="en-US" sz="2000" dirty="0" smtClean="0"/>
+          </a:p>
+          <a:p>
+            <a:pPr marL="365760" lvl="1" indent="0">
+              <a:buNone/>
+            </a:pPr>
+            <a:r>
+              <a:rPr lang="en-US" sz="2000" dirty="0" smtClean="0"/>
+              <a:t>“A”, for attribute, is the default behavior.</a:t>
+            </a:r>
+          </a:p>
+          <a:p>
+            <a:pPr marL="365760" lvl="1" indent="0">
+              <a:buNone/>
+            </a:pPr>
+            <a:endParaRPr lang="en-US" sz="2000" dirty="0"/>
+          </a:p>
+          <a:p>
+            <a:pPr marL="365760" lvl="1" indent="0">
+              <a:buNone/>
+            </a:pPr>
+            <a:r>
+              <a:rPr lang="en-US" sz="2000" b="1" i="1" dirty="0">
+                <a:solidFill>
+                  <a:srgbClr val="008000"/>
+                </a:solidFill>
+              </a:rPr>
+              <a:t>Best Practice:</a:t>
+            </a:r>
+            <a:r>
+              <a:rPr lang="en-US" sz="2000" i="1" dirty="0">
+                <a:solidFill>
+                  <a:srgbClr val="008000"/>
+                </a:solidFill>
+              </a:rPr>
+              <a:t> Prefer using directives via tag name and attributes over comment and class names. Doing so generally makes it easier to determine what directives a given element matches</a:t>
+            </a:r>
+            <a:r>
+              <a:rPr lang="en-US" sz="2000" i="1" dirty="0" smtClean="0">
+                <a:solidFill>
+                  <a:srgbClr val="008000"/>
+                </a:solidFill>
+              </a:rPr>
+              <a:t>. (AngularJS.org) </a:t>
+            </a:r>
+            <a:endParaRPr lang="en-US" sz="2000" i="1" dirty="0">
+              <a:solidFill>
+                <a:srgbClr val="008000"/>
+              </a:solidFill>
+            </a:endParaRPr>
+          </a:p>
+          <a:p>
+            <a:pPr lvl="1"/>
+            <a:endParaRPr lang="en-US" sz="2000" dirty="0" smtClean="0"/>
+          </a:p>
+        </p:txBody>
+      </p:sp>
+    </p:spTree>
+    <p:extLst>
+      <p:ext uri="{BB962C8B-B14F-4D97-AF65-F5344CB8AC3E}">
+        <p14:creationId xmlns:p14="http://schemas.microsoft.com/office/powerpoint/2010/main" val="3639178047"/>
+      </p:ext>
+    </p:extLst>
+  </p:cSld>
+  <p:clrMapOvr>
+    <a:masterClrMapping/>
+  </p:clrMapOvr>
+  <p:timing>
+    <p:tnLst>
+      <p:par>
+        <p:cTn xmlns:p14="http://schemas.microsoft.com/office/powerpoint/2010/main" id="1" dur="indefinite" restart="never" nodeType="tmRoot">
+          <p:childTnLst>
+            <p:seq concurrent="1" nextAc="seek">
+              <p:cTn id="2" dur="indefinite" nodeType="mainSeq">
+                <p:childTnLst>
+                  <p:par>
+                    <p:cTn id="3" fill="hold">
+                      <p:stCondLst>
+                        <p:cond delay="indefinite"/>
+                      </p:stCondLst>
+                      <p:childTnLst>
+                        <p:par>
+                          <p:cTn id="4" fill="hold">
+                            <p:stCondLst>
+                              <p:cond delay="0"/>
+                            </p:stCondLst>
+                            <p:childTnLst>
+                              <p:par>
+                                <p:cTn id="5" presetID="9" presetClass="entr" presetSubtype="0" fill="hold" nodeType="clickEffect">
+                                  <p:stCondLst>
+                                    <p:cond delay="0"/>
+                                  </p:stCondLst>
+                                  <p:childTnLst>
+                                    <p:set>
+                                      <p:cBhvr>
+                                        <p:cTn id="6" dur="1" fill="hold">
+                                          <p:stCondLst>
+                                            <p:cond delay="0"/>
+                                          </p:stCondLst>
+                                        </p:cTn>
+                                        <p:tgtEl>
+                                          <p:spTgt spid="3">
+                                            <p:txEl>
+                                              <p:pRg st="1" end="1"/>
+                                            </p:txEl>
+                                          </p:spTgt>
+                                        </p:tgtEl>
+                                        <p:attrNameLst>
+                                          <p:attrName>style.visibility</p:attrName>
+                                        </p:attrNameLst>
+                                      </p:cBhvr>
+                                      <p:to>
+                                        <p:strVal val="visible"/>
+                                      </p:to>
+                                    </p:set>
+                                    <p:animEffect transition="in" filter="dissolve">
+                                      <p:cBhvr>
+                                        <p:cTn id="7" dur="500"/>
+                                        <p:tgtEl>
+                                          <p:spTgt spid="3">
+                                            <p:txEl>
+                                              <p:pRg st="1" end="1"/>
+                                            </p:txEl>
+                                          </p:spTgt>
+                                        </p:tgtEl>
+                                      </p:cBhvr>
+                                    </p:animEffect>
+                                  </p:childTnLst>
+                                </p:cTn>
+                              </p:par>
+                            </p:childTnLst>
+                          </p:cTn>
+                        </p:par>
+                      </p:childTnLst>
+                    </p:cTn>
+                  </p:par>
+                  <p:par>
+                    <p:cTn id="8" fill="hold">
+                      <p:stCondLst>
+                        <p:cond delay="indefinite"/>
+                      </p:stCondLst>
+                      <p:childTnLst>
+                        <p:par>
+                          <p:cTn id="9" fill="hold">
+                            <p:stCondLst>
+                              <p:cond delay="0"/>
+                            </p:stCondLst>
+                            <p:childTnLst>
+                              <p:par>
+                                <p:cTn id="10" presetID="9" presetClass="entr" presetSubtype="0" fill="hold" nodeType="clickEffect">
+                                  <p:stCondLst>
+                                    <p:cond delay="0"/>
+                                  </p:stCondLst>
+                                  <p:childTnLst>
+                                    <p:set>
+                                      <p:cBhvr>
+                                        <p:cTn id="11" dur="1" fill="hold">
+                                          <p:stCondLst>
+                                            <p:cond delay="0"/>
+                                          </p:stCondLst>
+                                        </p:cTn>
+                                        <p:tgtEl>
+                                          <p:spTgt spid="3">
+                                            <p:txEl>
+                                              <p:pRg st="2" end="2"/>
+                                            </p:txEl>
+                                          </p:spTgt>
+                                        </p:tgtEl>
+                                        <p:attrNameLst>
+                                          <p:attrName>style.visibility</p:attrName>
+                                        </p:attrNameLst>
+                                      </p:cBhvr>
+                                      <p:to>
+                                        <p:strVal val="visible"/>
+                                      </p:to>
+                                    </p:set>
+                                    <p:animEffect transition="in" filter="dissolve">
+                                      <p:cBhvr>
+                                        <p:cTn id="12" dur="500"/>
+                                        <p:tgtEl>
+                                          <p:spTgt spid="3">
+                                            <p:txEl>
+                                              <p:pRg st="2" end="2"/>
+                                            </p:txEl>
+                                          </p:spTgt>
+                                        </p:tgtEl>
+                                      </p:cBhvr>
+                                    </p:animEffect>
+                                  </p:childTnLst>
+                                </p:cTn>
+                              </p:par>
+                            </p:childTnLst>
+                          </p:cTn>
+                        </p:par>
+                      </p:childTnLst>
+                    </p:cTn>
+                  </p:par>
+                  <p:par>
+                    <p:cTn id="13" fill="hold">
+                      <p:stCondLst>
+                        <p:cond delay="indefinite"/>
+                      </p:stCondLst>
+                      <p:childTnLst>
+                        <p:par>
+                          <p:cTn id="14" fill="hold">
+                            <p:stCondLst>
+                              <p:cond delay="0"/>
+                            </p:stCondLst>
+                            <p:childTnLst>
+                              <p:par>
+                                <p:cTn id="15" presetID="9" presetClass="entr" presetSubtype="0" fill="hold" nodeType="clickEffect">
+                                  <p:stCondLst>
+                                    <p:cond delay="0"/>
+                                  </p:stCondLst>
+                                  <p:childTnLst>
+                                    <p:set>
+                                      <p:cBhvr>
+                                        <p:cTn id="16" dur="1" fill="hold">
+                                          <p:stCondLst>
+                                            <p:cond delay="0"/>
+                                          </p:stCondLst>
+                                        </p:cTn>
+                                        <p:tgtEl>
+                                          <p:spTgt spid="3">
+                                            <p:txEl>
+                                              <p:pRg st="3" end="3"/>
+                                            </p:txEl>
+                                          </p:spTgt>
+                                        </p:tgtEl>
+                                        <p:attrNameLst>
+                                          <p:attrName>style.visibility</p:attrName>
+                                        </p:attrNameLst>
+                                      </p:cBhvr>
+                                      <p:to>
+                                        <p:strVal val="visible"/>
+                                      </p:to>
+                                    </p:set>
+                                    <p:animEffect transition="in" filter="dissolve">
+                                      <p:cBhvr>
+                                        <p:cTn id="17" dur="500"/>
+                                        <p:tgtEl>
+                                          <p:spTgt spid="3">
+                                            <p:txEl>
+                                              <p:pRg st="3" end="3"/>
+                                            </p:txEl>
+                                          </p:spTgt>
+                                        </p:tgtEl>
+                                      </p:cBhvr>
+                                    </p:animEffect>
+                                  </p:childTnLst>
+                                </p:cTn>
+                              </p:par>
+                            </p:childTnLst>
+                          </p:cTn>
+                        </p:par>
+                      </p:childTnLst>
+                    </p:cTn>
+                  </p:par>
+                  <p:par>
+                    <p:cTn id="18" fill="hold">
+                      <p:stCondLst>
+                        <p:cond delay="indefinite"/>
+                      </p:stCondLst>
+                      <p:childTnLst>
+                        <p:par>
+                          <p:cTn id="19" fill="hold">
+                            <p:stCondLst>
+                              <p:cond delay="0"/>
+                            </p:stCondLst>
+                            <p:childTnLst>
+                              <p:par>
+                                <p:cTn id="20" presetID="9" presetClass="entr" presetSubtype="0" fill="hold" nodeType="clickEffect">
+                                  <p:stCondLst>
+                                    <p:cond delay="0"/>
+                                  </p:stCondLst>
+                                  <p:childTnLst>
+                                    <p:set>
+                                      <p:cBhvr>
+                                        <p:cTn id="21" dur="1" fill="hold">
+                                          <p:stCondLst>
+                                            <p:cond delay="0"/>
+                                          </p:stCondLst>
+                                        </p:cTn>
+                                        <p:tgtEl>
+                                          <p:spTgt spid="3">
+                                            <p:txEl>
+                                              <p:pRg st="4" end="4"/>
+                                            </p:txEl>
+                                          </p:spTgt>
+                                        </p:tgtEl>
+                                        <p:attrNameLst>
+                                          <p:attrName>style.visibility</p:attrName>
+                                        </p:attrNameLst>
+                                      </p:cBhvr>
+                                      <p:to>
+                                        <p:strVal val="visible"/>
+                                      </p:to>
+                                    </p:set>
+                                    <p:animEffect transition="in" filter="dissolve">
+                                      <p:cBhvr>
+                                        <p:cTn id="22" dur="500"/>
+                                        <p:tgtEl>
+                                          <p:spTgt spid="3">
+                                            <p:txEl>
+                                              <p:pRg st="4" end="4"/>
+                                            </p:txEl>
+                                          </p:spTgt>
+                                        </p:tgtEl>
+                                      </p:cBhvr>
+                                    </p:animEffect>
+                                  </p:childTnLst>
+                                </p:cTn>
+                              </p:par>
+                            </p:childTnLst>
+                          </p:cTn>
+                        </p:par>
+                      </p:childTnLst>
+                    </p:cTn>
+                  </p:par>
+                  <p:par>
+                    <p:cTn id="23" fill="hold">
+                      <p:stCondLst>
+                        <p:cond delay="indefinite"/>
+                      </p:stCondLst>
+                      <p:childTnLst>
+                        <p:par>
+                          <p:cTn id="24" fill="hold">
+                            <p:stCondLst>
+                              <p:cond delay="0"/>
+                            </p:stCondLst>
+                            <p:childTnLst>
+                              <p:par>
+                                <p:cTn id="25" presetID="9" presetClass="entr" presetSubtype="0" fill="hold" nodeType="clickEffect">
+                                  <p:stCondLst>
+                                    <p:cond delay="0"/>
+                                  </p:stCondLst>
+                                  <p:childTnLst>
+                                    <p:set>
+                                      <p:cBhvr>
+                                        <p:cTn id="26" dur="1" fill="hold">
+                                          <p:stCondLst>
+                                            <p:cond delay="0"/>
+                                          </p:stCondLst>
+                                        </p:cTn>
+                                        <p:tgtEl>
+                                          <p:spTgt spid="3">
+                                            <p:txEl>
+                                              <p:pRg st="6" end="6"/>
+                                            </p:txEl>
+                                          </p:spTgt>
+                                        </p:tgtEl>
+                                        <p:attrNameLst>
+                                          <p:attrName>style.visibility</p:attrName>
+                                        </p:attrNameLst>
+                                      </p:cBhvr>
+                                      <p:to>
+                                        <p:strVal val="visible"/>
+                                      </p:to>
+                                    </p:set>
+                                    <p:animEffect transition="in" filter="dissolve">
+                                      <p:cBhvr>
+                                        <p:cTn id="27" dur="500"/>
+                                        <p:tgtEl>
+                                          <p:spTgt spid="3">
+                                            <p:txEl>
+                                              <p:pRg st="6" end="6"/>
+                                            </p:txEl>
+                                          </p:spTgt>
+                                        </p:tgtEl>
+                                      </p:cBhvr>
+                                    </p:animEffect>
+                                  </p:childTnLst>
+                                </p:cTn>
+                              </p:par>
+                              <p:par>
+                                <p:cTn id="28" presetID="9" presetClass="entr" presetSubtype="0" fill="hold" nodeType="withEffect">
+                                  <p:stCondLst>
+                                    <p:cond delay="0"/>
+                                  </p:stCondLst>
+                                  <p:childTnLst>
+                                    <p:set>
+                                      <p:cBhvr>
+                                        <p:cTn id="29" dur="1" fill="hold">
+                                          <p:stCondLst>
+                                            <p:cond delay="0"/>
+                                          </p:stCondLst>
+                                        </p:cTn>
+                                        <p:tgtEl>
+                                          <p:spTgt spid="3">
+                                            <p:txEl>
+                                              <p:pRg st="8" end="8"/>
+                                            </p:txEl>
+                                          </p:spTgt>
+                                        </p:tgtEl>
+                                        <p:attrNameLst>
+                                          <p:attrName>style.visibility</p:attrName>
+                                        </p:attrNameLst>
+                                      </p:cBhvr>
+                                      <p:to>
+                                        <p:strVal val="visible"/>
+                                      </p:to>
+                                    </p:set>
+                                    <p:animEffect transition="in" filter="dissolve">
+                                      <p:cBhvr>
+                                        <p:cTn id="30" dur="500"/>
+                                        <p:tgtEl>
+                                          <p:spTgt spid="3">
+                                            <p:txEl>
+                                              <p:pRg st="8" end="8"/>
+                                            </p:txEl>
+                                          </p:spTgt>
+                                        </p:tgtEl>
+                                      </p:cBhvr>
+                                    </p:animEffect>
+                                  </p:childTnLst>
+                                </p:cTn>
+                              </p:par>
+                            </p:childTnLst>
+                          </p:cTn>
+                        </p:par>
+                      </p:childTnLst>
+                    </p:cTn>
+                  </p:par>
+                </p:childTnLst>
+              </p:cTn>
+              <p:prevCondLst>
+                <p:cond evt="onPrev" delay="0">
+                  <p:tgtEl>
+                    <p:sldTgt/>
+                  </p:tgtEl>
+                </p:cond>
+              </p:prevCondLst>
+              <p:nextCondLst>
+                <p:cond evt="onNext" delay="0">
+                  <p:tgtEl>
+                    <p:sldTgt/>
+                  </p:tgtEl>
+                </p:cond>
+              </p:nextCondLst>
+            </p:seq>
+          </p:childTnLst>
+        </p:cTn>
+      </p:par>
+    </p:tnLst>
+  </p:timing>
+</p:sld>
+</file>
+
+<file path=ppt/slides/slide12.xml><?xml version="1.0" encoding="utf-8"?>
+<p:sld xmlns:a="http://schemas.openxmlformats.org/drawingml/2006/main" xmlns:r="http://schemas.openxmlformats.org/officeDocument/2006/relationships" xmlns:p="http://schemas.openxmlformats.org/presentationml/2006/main">
+  <p:cSld>
+    <p:spTree>
+      <p:nvGrpSpPr>
+        <p:cNvPr id="1" name=""/>
+        <p:cNvGrpSpPr/>
+        <p:nvPr/>
+      </p:nvGrpSpPr>
+      <p:grpSpPr>
+        <a:xfrm>
+          <a:off x="0" y="0"/>
+          <a:ext cx="0" cy="0"/>
+          <a:chOff x="0" y="0"/>
+          <a:chExt cx="0" cy="0"/>
+        </a:xfrm>
+      </p:grpSpPr>
+      <p:sp>
+        <p:nvSpPr>
+          <p:cNvPr id="2" name="Title 1"/>
+          <p:cNvSpPr>
+            <a:spLocks noGrp="1"/>
+          </p:cNvSpPr>
+          <p:nvPr>
+            <p:ph type="title"/>
+          </p:nvPr>
+        </p:nvSpPr>
+        <p:spPr/>
+        <p:txBody>
+          <a:bodyPr>
+            <a:normAutofit/>
+          </a:bodyPr>
+          <a:lstStyle/>
+          <a:p>
+            <a:r>
+              <a:rPr lang="en-US" dirty="0" smtClean="0"/>
+              <a:t>Inside </a:t>
+            </a:r>
+            <a:r>
+              <a:rPr lang="en-US" dirty="0"/>
+              <a:t>A </a:t>
+            </a:r>
+            <a:r>
+              <a:rPr lang="en-US" dirty="0" smtClean="0"/>
+              <a:t>Directive: Scope</a:t>
+            </a:r>
+            <a:endParaRPr lang="en-US" dirty="0"/>
+          </a:p>
+        </p:txBody>
+      </p:sp>
+      <p:sp>
+        <p:nvSpPr>
+          <p:cNvPr id="3" name="Content Placeholder 2"/>
+          <p:cNvSpPr>
+            <a:spLocks noGrp="1"/>
+          </p:cNvSpPr>
+          <p:nvPr>
+            <p:ph sz="quarter" idx="1"/>
+          </p:nvPr>
+        </p:nvSpPr>
+        <p:spPr>
+          <a:xfrm>
+            <a:off x="612648" y="1600201"/>
+            <a:ext cx="8153400" cy="2482832"/>
+          </a:xfrm>
+        </p:spPr>
+        <p:txBody>
+          <a:bodyPr>
+            <a:normAutofit fontScale="92500"/>
+          </a:bodyPr>
+          <a:lstStyle/>
+          <a:p>
+            <a:r>
+              <a:rPr lang="en-US" sz="2400" dirty="0" smtClean="0"/>
+              <a:t>Scope: </a:t>
+            </a:r>
+          </a:p>
+          <a:p>
+            <a:pPr lvl="1"/>
+            <a:r>
+              <a:rPr lang="en-US" sz="2000" b="1" dirty="0" smtClean="0"/>
+              <a:t>Parent</a:t>
+            </a:r>
+            <a:r>
+              <a:rPr lang="en-US" sz="2000" dirty="0" smtClean="0"/>
+              <a:t> – This is the default behavior, in where the directive gets the parent’s scope.</a:t>
+            </a:r>
+          </a:p>
+          <a:p>
+            <a:pPr lvl="1"/>
+            <a:r>
+              <a:rPr lang="en-US" sz="2000" b="1" dirty="0" smtClean="0"/>
+              <a:t>Child</a:t>
+            </a:r>
+            <a:r>
+              <a:rPr lang="en-US" sz="2000" dirty="0" smtClean="0"/>
+              <a:t> – Is where the scope will prototypically inherit from the parent’s scope but can have some of its own properties not visible to the parent.</a:t>
+            </a:r>
+          </a:p>
+          <a:p>
+            <a:pPr lvl="1"/>
+            <a:r>
+              <a:rPr lang="en-US" sz="2000" b="1" dirty="0" smtClean="0"/>
+              <a:t>Isolated</a:t>
+            </a:r>
+            <a:r>
+              <a:rPr lang="en-US" sz="2000" dirty="0" smtClean="0"/>
+              <a:t> – This scope does not inherit from the parent and exists on its own. This is the ideal usage when you want to make this directive reusable.</a:t>
+            </a:r>
+            <a:endParaRPr lang="en-US" sz="2000" dirty="0"/>
+          </a:p>
+        </p:txBody>
+      </p:sp>
+      <p:sp>
+        <p:nvSpPr>
+          <p:cNvPr id="4" name="Content Placeholder 2"/>
+          <p:cNvSpPr txBox="1">
+            <a:spLocks/>
+          </p:cNvSpPr>
+          <p:nvPr/>
+        </p:nvSpPr>
+        <p:spPr>
+          <a:xfrm>
+            <a:off x="536334" y="4083032"/>
+            <a:ext cx="8153400" cy="2649277"/>
+          </a:xfrm>
+          <a:prstGeom prst="rect">
+            <a:avLst/>
+          </a:prstGeom>
+        </p:spPr>
+        <p:txBody>
+          <a:bodyPr vert="horz">
+            <a:normAutofit/>
+          </a:bodyPr>
+          <a:lstStyle>
+            <a:lvl1pPr marL="320040" indent="-320040" algn="l" rtl="0" eaLnBrk="1" latinLnBrk="0" hangingPunct="1">
+              <a:spcBef>
+                <a:spcPts val="700"/>
+              </a:spcBef>
+              <a:buClr>
+                <a:schemeClr val="accent2"/>
+              </a:buClr>
+              <a:buSzPct val="60000"/>
+              <a:buFont typeface="Wingdings"/>
+              <a:buChar char=""/>
+              <a:defRPr kumimoji="0" sz="2900" kern="1200">
+                <a:solidFill>
+                  <a:schemeClr val="tx1"/>
+                </a:solidFill>
+                <a:latin typeface="+mn-lt"/>
+                <a:ea typeface="+mn-ea"/>
+                <a:cs typeface="+mn-cs"/>
+              </a:defRPr>
+            </a:lvl1pPr>
+            <a:lvl2pPr marL="640080" indent="-274320" algn="l" rtl="0" eaLnBrk="1" latinLnBrk="0" hangingPunct="1">
+              <a:spcBef>
+                <a:spcPts val="550"/>
+              </a:spcBef>
+              <a:buClr>
+                <a:schemeClr val="accent1"/>
+              </a:buClr>
+              <a:buSzPct val="70000"/>
+              <a:buFont typeface="Wingdings 2"/>
+              <a:buChar char=""/>
+              <a:defRPr kumimoji="0" sz="2600" kern="1200">
+                <a:solidFill>
+                  <a:schemeClr val="tx1"/>
+                </a:solidFill>
+                <a:latin typeface="+mn-lt"/>
+                <a:ea typeface="+mn-ea"/>
+                <a:cs typeface="+mn-cs"/>
+              </a:defRPr>
+            </a:lvl2pPr>
+            <a:lvl3pPr marL="914400" indent="-228600" algn="l" rtl="0" eaLnBrk="1" latinLnBrk="0" hangingPunct="1">
+              <a:spcBef>
+                <a:spcPts val="500"/>
+              </a:spcBef>
+              <a:buClr>
+                <a:schemeClr val="accent2"/>
+              </a:buClr>
+              <a:buSzPct val="75000"/>
+              <a:buFont typeface="Wingdings"/>
+              <a:buChar char=""/>
+              <a:defRPr kumimoji="0" sz="2300" kern="1200">
+                <a:solidFill>
+                  <a:schemeClr val="tx1"/>
+                </a:solidFill>
+                <a:latin typeface="+mn-lt"/>
+                <a:ea typeface="+mn-ea"/>
+                <a:cs typeface="+mn-cs"/>
+              </a:defRPr>
+            </a:lvl3pPr>
+            <a:lvl4pPr marL="1371600" indent="-228600" algn="l" rtl="0" eaLnBrk="1" latinLnBrk="0" hangingPunct="1">
+              <a:spcBef>
+                <a:spcPts val="400"/>
+              </a:spcBef>
+              <a:buClr>
+                <a:schemeClr val="accent3"/>
+              </a:buClr>
+              <a:buSzPct val="75000"/>
+              <a:buFont typeface="Wingdings"/>
+              <a:buChar char=""/>
+              <a:defRPr kumimoji="0" sz="2000" kern="1200">
+                <a:solidFill>
+                  <a:schemeClr val="tx1"/>
+                </a:solidFill>
+                <a:latin typeface="+mn-lt"/>
+                <a:ea typeface="+mn-ea"/>
+                <a:cs typeface="+mn-cs"/>
+              </a:defRPr>
+            </a:lvl4pPr>
+            <a:lvl5pPr marL="1828800" indent="-228600" algn="l" rtl="0" eaLnBrk="1" latinLnBrk="0" hangingPunct="1">
+              <a:spcBef>
+                <a:spcPts val="400"/>
+              </a:spcBef>
+              <a:buClr>
+                <a:schemeClr val="accent4"/>
+              </a:buClr>
+              <a:buSzPct val="65000"/>
+              <a:buFont typeface="Wingdings"/>
+              <a:buChar char=""/>
+              <a:defRPr kumimoji="0" sz="2000" kern="1200">
+                <a:solidFill>
+                  <a:schemeClr val="tx1"/>
+                </a:solidFill>
+                <a:latin typeface="+mn-lt"/>
+                <a:ea typeface="+mn-ea"/>
+                <a:cs typeface="+mn-cs"/>
+              </a:defRPr>
+            </a:lvl5pPr>
+            <a:lvl6pPr marL="2103120" indent="-228600" algn="l" rtl="0" eaLnBrk="1" latinLnBrk="0" hangingPunct="1">
+              <a:spcBef>
+                <a:spcPct val="20000"/>
+              </a:spcBef>
+              <a:buClr>
+                <a:schemeClr val="accent1"/>
+              </a:buClr>
+              <a:buFont typeface="Wingdings"/>
+              <a:buChar char="§"/>
+              <a:defRPr kumimoji="0" sz="1800" kern="1200" baseline="0">
+                <a:solidFill>
+                  <a:schemeClr val="tx1"/>
+                </a:solidFill>
+                <a:latin typeface="+mn-lt"/>
+                <a:ea typeface="+mn-ea"/>
+                <a:cs typeface="+mn-cs"/>
+              </a:defRPr>
+            </a:lvl6pPr>
+            <a:lvl7pPr marL="2377440" indent="-228600" algn="l" rtl="0" eaLnBrk="1" latinLnBrk="0" hangingPunct="1">
+              <a:spcBef>
+                <a:spcPct val="20000"/>
+              </a:spcBef>
+              <a:buClr>
+                <a:schemeClr val="accent2"/>
+              </a:buClr>
+              <a:buFont typeface="Wingdings"/>
+              <a:buChar char="§"/>
+              <a:defRPr kumimoji="0" sz="1800" kern="1200" baseline="0">
+                <a:solidFill>
+                  <a:schemeClr val="tx1"/>
+                </a:solidFill>
+                <a:latin typeface="+mn-lt"/>
+                <a:ea typeface="+mn-ea"/>
+                <a:cs typeface="+mn-cs"/>
+              </a:defRPr>
+            </a:lvl7pPr>
+            <a:lvl8pPr marL="2651760" indent="-228600" algn="l" rtl="0" eaLnBrk="1" latinLnBrk="0" hangingPunct="1">
+              <a:spcBef>
+                <a:spcPct val="20000"/>
+              </a:spcBef>
+              <a:buClr>
+                <a:schemeClr val="accent3"/>
+              </a:buClr>
+              <a:buFont typeface="Wingdings"/>
+              <a:buChar char="§"/>
+              <a:defRPr kumimoji="0" sz="1800" kern="1200" baseline="0">
+                <a:solidFill>
+                  <a:schemeClr val="tx1"/>
+                </a:solidFill>
+                <a:latin typeface="+mn-lt"/>
+                <a:ea typeface="+mn-ea"/>
+                <a:cs typeface="+mn-cs"/>
+              </a:defRPr>
+            </a:lvl8pPr>
+            <a:lvl9pPr marL="2926080" indent="-228600" algn="l" rtl="0" eaLnBrk="1" latinLnBrk="0" hangingPunct="1">
+              <a:spcBef>
+                <a:spcPct val="20000"/>
+              </a:spcBef>
+              <a:buClr>
+                <a:schemeClr val="accent4"/>
+              </a:buClr>
+              <a:buFont typeface="Wingdings"/>
+              <a:buChar char="§"/>
+              <a:defRPr kumimoji="0" sz="1800" kern="1200" baseline="0">
+                <a:solidFill>
+                  <a:schemeClr val="tx1"/>
+                </a:solidFill>
+                <a:latin typeface="+mn-lt"/>
+                <a:ea typeface="+mn-ea"/>
+                <a:cs typeface="+mn-cs"/>
+              </a:defRPr>
+            </a:lvl9pPr>
+          </a:lstStyle>
+          <a:p>
+            <a:r>
+              <a:rPr lang="en-US" sz="2400" dirty="0" smtClean="0"/>
+              <a:t>How to implement: </a:t>
+            </a:r>
+          </a:p>
+          <a:p>
+            <a:pPr lvl="1"/>
+            <a:r>
+              <a:rPr lang="en-US" sz="2000" b="1" dirty="0" smtClean="0"/>
+              <a:t>Parent</a:t>
+            </a:r>
+            <a:r>
+              <a:rPr lang="en-US" sz="2000" dirty="0"/>
+              <a:t> </a:t>
+            </a:r>
+            <a:r>
+              <a:rPr lang="en-US" sz="2000" dirty="0" smtClean="0"/>
+              <a:t> </a:t>
+            </a:r>
+            <a:r>
+              <a:rPr lang="en-US" sz="2000" dirty="0" smtClean="0">
+                <a:sym typeface="Wingdings"/>
+              </a:rPr>
+              <a:t> </a:t>
+            </a:r>
+            <a:r>
+              <a:rPr lang="en-US" sz="2000" dirty="0" smtClean="0"/>
+              <a:t>scope: </a:t>
+            </a:r>
+            <a:r>
+              <a:rPr lang="en-US" sz="2000" dirty="0" smtClean="0">
+                <a:solidFill>
+                  <a:schemeClr val="accent1"/>
+                </a:solidFill>
+              </a:rPr>
+              <a:t>false </a:t>
+            </a:r>
+            <a:r>
+              <a:rPr lang="en-US" sz="2000" dirty="0" smtClean="0">
+                <a:solidFill>
+                  <a:schemeClr val="accent4">
+                    <a:lumMod val="75000"/>
+                  </a:schemeClr>
+                </a:solidFill>
+              </a:rPr>
+              <a:t>(or don’t add to return object)</a:t>
+            </a:r>
+          </a:p>
+          <a:p>
+            <a:pPr lvl="1"/>
+            <a:r>
+              <a:rPr lang="en-US" sz="2000" b="1" dirty="0" smtClean="0"/>
+              <a:t>Child    </a:t>
+            </a:r>
+            <a:r>
+              <a:rPr lang="en-US" sz="2000" dirty="0" smtClean="0">
+                <a:sym typeface="Wingdings"/>
+              </a:rPr>
+              <a:t> </a:t>
+            </a:r>
+            <a:r>
+              <a:rPr lang="en-US" sz="2000" dirty="0"/>
+              <a:t>scope: </a:t>
+            </a:r>
+            <a:r>
+              <a:rPr lang="en-US" sz="2000" dirty="0" smtClean="0">
+                <a:solidFill>
+                  <a:schemeClr val="accent1"/>
+                </a:solidFill>
+              </a:rPr>
+              <a:t>true</a:t>
+            </a:r>
+            <a:endParaRPr lang="en-US" sz="2000" dirty="0">
+              <a:solidFill>
+                <a:schemeClr val="accent1"/>
+              </a:solidFill>
+            </a:endParaRPr>
+          </a:p>
+          <a:p>
+            <a:pPr lvl="1"/>
+            <a:r>
+              <a:rPr lang="en-US" sz="2000" b="1" dirty="0" smtClean="0"/>
+              <a:t>Isolated</a:t>
+            </a:r>
+            <a:r>
+              <a:rPr lang="en-US" sz="2000" dirty="0" smtClean="0">
+                <a:sym typeface="Wingdings"/>
+              </a:rPr>
+              <a:t> </a:t>
+            </a:r>
+            <a:r>
+              <a:rPr lang="en-US" sz="2000" dirty="0"/>
+              <a:t>scope: </a:t>
+            </a:r>
+            <a:r>
+              <a:rPr lang="en-US" sz="2000" dirty="0" smtClean="0">
+                <a:solidFill>
+                  <a:schemeClr val="accent1"/>
+                </a:solidFill>
+              </a:rPr>
+              <a:t>{}</a:t>
+            </a:r>
+            <a:endParaRPr lang="en-US" sz="2000" dirty="0">
+              <a:solidFill>
+                <a:schemeClr val="accent1"/>
+              </a:solidFill>
+            </a:endParaRPr>
+          </a:p>
+          <a:p>
+            <a:pPr lvl="1"/>
+            <a:endParaRPr lang="en-US" sz="2000" dirty="0" smtClean="0">
+              <a:solidFill>
+                <a:schemeClr val="accent1"/>
+              </a:solidFill>
+            </a:endParaRPr>
+          </a:p>
+        </p:txBody>
+      </p:sp>
+    </p:spTree>
+    <p:extLst>
+      <p:ext uri="{BB962C8B-B14F-4D97-AF65-F5344CB8AC3E}">
+        <p14:creationId xmlns:p14="http://schemas.microsoft.com/office/powerpoint/2010/main" val="4125248952"/>
+      </p:ext>
+    </p:extLst>
+  </p:cSld>
+  <p:clrMapOvr>
+    <a:masterClrMapping/>
+  </p:clrMapOvr>
+  <p:timing>
+    <p:tnLst>
+      <p:par>
+        <p:cTn xmlns:p14="http://schemas.microsoft.com/office/powerpoint/2010/main" id="1" dur="indefinite" restart="never" nodeType="tmRoot">
+          <p:childTnLst>
+            <p:seq concurrent="1" nextAc="seek">
+              <p:cTn id="2" dur="indefinite" nodeType="mainSeq">
+                <p:childTnLst>
+                  <p:par>
+                    <p:cTn id="3" fill="hold">
+                      <p:stCondLst>
+                        <p:cond delay="indefinite"/>
+                      </p:stCondLst>
+                      <p:childTnLst>
+                        <p:par>
+                          <p:cTn id="4" fill="hold">
+                            <p:stCondLst>
+                              <p:cond delay="0"/>
+                            </p:stCondLst>
+                            <p:childTnLst>
+                              <p:par>
+                                <p:cTn id="5" presetID="9" presetClass="entr" presetSubtype="0" fill="hold" nodeType="clickEffect">
+                                  <p:stCondLst>
+                                    <p:cond delay="0"/>
+                                  </p:stCondLst>
+                                  <p:childTnLst>
+                                    <p:set>
+                                      <p:cBhvr>
+                                        <p:cTn id="6" dur="1" fill="hold">
+                                          <p:stCondLst>
+                                            <p:cond delay="0"/>
+                                          </p:stCondLst>
+                                        </p:cTn>
+                                        <p:tgtEl>
+                                          <p:spTgt spid="3">
+                                            <p:txEl>
+                                              <p:pRg st="1" end="1"/>
+                                            </p:txEl>
+                                          </p:spTgt>
+                                        </p:tgtEl>
+                                        <p:attrNameLst>
+                                          <p:attrName>style.visibility</p:attrName>
+                                        </p:attrNameLst>
+                                      </p:cBhvr>
+                                      <p:to>
+                                        <p:strVal val="visible"/>
+                                      </p:to>
+                                    </p:set>
+                                    <p:animEffect transition="in" filter="dissolve">
+                                      <p:cBhvr>
+                                        <p:cTn id="7" dur="500"/>
+                                        <p:tgtEl>
+                                          <p:spTgt spid="3">
+                                            <p:txEl>
+                                              <p:pRg st="1" end="1"/>
+                                            </p:txEl>
+                                          </p:spTgt>
+                                        </p:tgtEl>
+                                      </p:cBhvr>
+                                    </p:animEffect>
+                                  </p:childTnLst>
+                                </p:cTn>
+                              </p:par>
+                            </p:childTnLst>
+                          </p:cTn>
+                        </p:par>
+                      </p:childTnLst>
+                    </p:cTn>
+                  </p:par>
+                  <p:par>
+                    <p:cTn id="8" fill="hold">
+                      <p:stCondLst>
+                        <p:cond delay="indefinite"/>
+                      </p:stCondLst>
+                      <p:childTnLst>
+                        <p:par>
+                          <p:cTn id="9" fill="hold">
+                            <p:stCondLst>
+                              <p:cond delay="0"/>
+                            </p:stCondLst>
+                            <p:childTnLst>
+                              <p:par>
+                                <p:cTn id="10" presetID="9" presetClass="entr" presetSubtype="0" fill="hold" nodeType="clickEffect">
+                                  <p:stCondLst>
+                                    <p:cond delay="0"/>
+                                  </p:stCondLst>
+                                  <p:childTnLst>
+                                    <p:set>
+                                      <p:cBhvr>
+                                        <p:cTn id="11" dur="1" fill="hold">
+                                          <p:stCondLst>
+                                            <p:cond delay="0"/>
+                                          </p:stCondLst>
+                                        </p:cTn>
+                                        <p:tgtEl>
+                                          <p:spTgt spid="3">
+                                            <p:txEl>
+                                              <p:pRg st="2" end="2"/>
+                                            </p:txEl>
+                                          </p:spTgt>
+                                        </p:tgtEl>
+                                        <p:attrNameLst>
+                                          <p:attrName>style.visibility</p:attrName>
+                                        </p:attrNameLst>
+                                      </p:cBhvr>
+                                      <p:to>
+                                        <p:strVal val="visible"/>
+                                      </p:to>
+                                    </p:set>
+                                    <p:animEffect transition="in" filter="dissolve">
+                                      <p:cBhvr>
+                                        <p:cTn id="12" dur="500"/>
+                                        <p:tgtEl>
+                                          <p:spTgt spid="3">
+                                            <p:txEl>
+                                              <p:pRg st="2" end="2"/>
+                                            </p:txEl>
+                                          </p:spTgt>
+                                        </p:tgtEl>
+                                      </p:cBhvr>
+                                    </p:animEffect>
+                                  </p:childTnLst>
+                                </p:cTn>
+                              </p:par>
+                            </p:childTnLst>
+                          </p:cTn>
+                        </p:par>
+                      </p:childTnLst>
+                    </p:cTn>
+                  </p:par>
+                  <p:par>
+                    <p:cTn id="13" fill="hold">
+                      <p:stCondLst>
+                        <p:cond delay="indefinite"/>
+                      </p:stCondLst>
+                      <p:childTnLst>
+                        <p:par>
+                          <p:cTn id="14" fill="hold">
+                            <p:stCondLst>
+                              <p:cond delay="0"/>
+                            </p:stCondLst>
+                            <p:childTnLst>
+                              <p:par>
+                                <p:cTn id="15" presetID="9" presetClass="entr" presetSubtype="0" fill="hold" nodeType="clickEffect">
+                                  <p:stCondLst>
+                                    <p:cond delay="0"/>
+                                  </p:stCondLst>
+                                  <p:childTnLst>
+                                    <p:set>
+                                      <p:cBhvr>
+                                        <p:cTn id="16" dur="1" fill="hold">
+                                          <p:stCondLst>
+                                            <p:cond delay="0"/>
+                                          </p:stCondLst>
+                                        </p:cTn>
+                                        <p:tgtEl>
+                                          <p:spTgt spid="3">
+                                            <p:txEl>
+                                              <p:pRg st="3" end="3"/>
+                                            </p:txEl>
+                                          </p:spTgt>
+                                        </p:tgtEl>
+                                        <p:attrNameLst>
+                                          <p:attrName>style.visibility</p:attrName>
+                                        </p:attrNameLst>
+                                      </p:cBhvr>
+                                      <p:to>
+                                        <p:strVal val="visible"/>
+                                      </p:to>
+                                    </p:set>
+                                    <p:animEffect transition="in" filter="dissolve">
+                                      <p:cBhvr>
+                                        <p:cTn id="17" dur="500"/>
+                                        <p:tgtEl>
+                                          <p:spTgt spid="3">
+                                            <p:txEl>
+                                              <p:pRg st="3" end="3"/>
+                                            </p:txEl>
+                                          </p:spTgt>
+                                        </p:tgtEl>
+                                      </p:cBhvr>
+                                    </p:animEffect>
+                                  </p:childTnLst>
+                                </p:cTn>
+                              </p:par>
+                            </p:childTnLst>
+                          </p:cTn>
+                        </p:par>
+                      </p:childTnLst>
+                    </p:cTn>
+                  </p:par>
+                  <p:par>
+                    <p:cTn id="18" fill="hold">
+                      <p:stCondLst>
+                        <p:cond delay="indefinite"/>
+                      </p:stCondLst>
+                      <p:childTnLst>
+                        <p:par>
+                          <p:cTn id="19" fill="hold">
+                            <p:stCondLst>
+                              <p:cond delay="0"/>
+                            </p:stCondLst>
+                            <p:childTnLst>
+                              <p:par>
+                                <p:cTn id="20" presetID="9" presetClass="entr" presetSubtype="0" fill="hold" nodeType="clickEffect">
+                                  <p:stCondLst>
+                                    <p:cond delay="0"/>
+                                  </p:stCondLst>
+                                  <p:childTnLst>
+                                    <p:set>
+                                      <p:cBhvr>
+                                        <p:cTn id="21" dur="1" fill="hold">
+                                          <p:stCondLst>
+                                            <p:cond delay="0"/>
+                                          </p:stCondLst>
+                                        </p:cTn>
+                                        <p:tgtEl>
+                                          <p:spTgt spid="4">
+                                            <p:txEl>
+                                              <p:pRg st="0" end="0"/>
+                                            </p:txEl>
+                                          </p:spTgt>
+                                        </p:tgtEl>
+                                        <p:attrNameLst>
+                                          <p:attrName>style.visibility</p:attrName>
+                                        </p:attrNameLst>
+                                      </p:cBhvr>
+                                      <p:to>
+                                        <p:strVal val="visible"/>
+                                      </p:to>
+                                    </p:set>
+                                    <p:animEffect transition="in" filter="dissolve">
+                                      <p:cBhvr>
+                                        <p:cTn id="22" dur="500"/>
+                                        <p:tgtEl>
+                                          <p:spTgt spid="4">
+                                            <p:txEl>
+                                              <p:pRg st="0" end="0"/>
+                                            </p:txEl>
+                                          </p:spTgt>
+                                        </p:tgtEl>
+                                      </p:cBhvr>
+                                    </p:animEffect>
+                                  </p:childTnLst>
+                                </p:cTn>
+                              </p:par>
+                              <p:par>
+                                <p:cTn id="23" presetID="9" presetClass="entr" presetSubtype="0" fill="hold" nodeType="withEffect">
+                                  <p:stCondLst>
+                                    <p:cond delay="0"/>
+                                  </p:stCondLst>
+                                  <p:childTnLst>
+                                    <p:set>
+                                      <p:cBhvr>
+                                        <p:cTn id="24" dur="1" fill="hold">
+                                          <p:stCondLst>
+                                            <p:cond delay="0"/>
+                                          </p:stCondLst>
+                                        </p:cTn>
+                                        <p:tgtEl>
+                                          <p:spTgt spid="4">
+                                            <p:txEl>
+                                              <p:pRg st="1" end="1"/>
+                                            </p:txEl>
+                                          </p:spTgt>
+                                        </p:tgtEl>
+                                        <p:attrNameLst>
+                                          <p:attrName>style.visibility</p:attrName>
+                                        </p:attrNameLst>
+                                      </p:cBhvr>
+                                      <p:to>
+                                        <p:strVal val="visible"/>
+                                      </p:to>
+                                    </p:set>
+                                    <p:animEffect transition="in" filter="dissolve">
+                                      <p:cBhvr>
+                                        <p:cTn id="25" dur="500"/>
+                                        <p:tgtEl>
+                                          <p:spTgt spid="4">
+                                            <p:txEl>
+                                              <p:pRg st="1" end="1"/>
+                                            </p:txEl>
+                                          </p:spTgt>
+                                        </p:tgtEl>
+                                      </p:cBhvr>
+                                    </p:animEffect>
+                                  </p:childTnLst>
+                                </p:cTn>
+                              </p:par>
+                              <p:par>
+                                <p:cTn id="26" presetID="9" presetClass="entr" presetSubtype="0" fill="hold" nodeType="withEffect">
+                                  <p:stCondLst>
+                                    <p:cond delay="0"/>
+                                  </p:stCondLst>
+                                  <p:childTnLst>
+                                    <p:set>
+                                      <p:cBhvr>
+                                        <p:cTn id="27" dur="1" fill="hold">
+                                          <p:stCondLst>
+                                            <p:cond delay="0"/>
+                                          </p:stCondLst>
+                                        </p:cTn>
+                                        <p:tgtEl>
+                                          <p:spTgt spid="4">
+                                            <p:txEl>
+                                              <p:pRg st="2" end="2"/>
+                                            </p:txEl>
+                                          </p:spTgt>
+                                        </p:tgtEl>
+                                        <p:attrNameLst>
+                                          <p:attrName>style.visibility</p:attrName>
+                                        </p:attrNameLst>
+                                      </p:cBhvr>
+                                      <p:to>
+                                        <p:strVal val="visible"/>
+                                      </p:to>
+                                    </p:set>
+                                    <p:animEffect transition="in" filter="dissolve">
+                                      <p:cBhvr>
+                                        <p:cTn id="28" dur="500"/>
+                                        <p:tgtEl>
+                                          <p:spTgt spid="4">
+                                            <p:txEl>
+                                              <p:pRg st="2" end="2"/>
+                                            </p:txEl>
+                                          </p:spTgt>
+                                        </p:tgtEl>
+                                      </p:cBhvr>
+                                    </p:animEffect>
+                                  </p:childTnLst>
+                                </p:cTn>
+                              </p:par>
+                              <p:par>
+                                <p:cTn id="29" presetID="9" presetClass="entr" presetSubtype="0" fill="hold" nodeType="withEffect">
+                                  <p:stCondLst>
+                                    <p:cond delay="0"/>
+                                  </p:stCondLst>
+                                  <p:childTnLst>
+                                    <p:set>
+                                      <p:cBhvr>
+                                        <p:cTn id="30" dur="1" fill="hold">
+                                          <p:stCondLst>
+                                            <p:cond delay="0"/>
+                                          </p:stCondLst>
+                                        </p:cTn>
+                                        <p:tgtEl>
+                                          <p:spTgt spid="4">
+                                            <p:txEl>
+                                              <p:pRg st="3" end="3"/>
+                                            </p:txEl>
+                                          </p:spTgt>
+                                        </p:tgtEl>
+                                        <p:attrNameLst>
+                                          <p:attrName>style.visibility</p:attrName>
+                                        </p:attrNameLst>
+                                      </p:cBhvr>
+                                      <p:to>
+                                        <p:strVal val="visible"/>
+                                      </p:to>
+                                    </p:set>
+                                    <p:animEffect transition="in" filter="dissolve">
+                                      <p:cBhvr>
+                                        <p:cTn id="31" dur="500"/>
+                                        <p:tgtEl>
+                                          <p:spTgt spid="4">
+                                            <p:txEl>
+                                              <p:pRg st="3" end="3"/>
+                                            </p:txEl>
+                                          </p:spTgt>
+                                        </p:tgtEl>
+                                      </p:cBhvr>
+                                    </p:animEffect>
+                                  </p:childTnLst>
+                                </p:cTn>
+                              </p:par>
+                            </p:childTnLst>
+                          </p:cTn>
+                        </p:par>
+                      </p:childTnLst>
+                    </p:cTn>
+                  </p:par>
+                </p:childTnLst>
+              </p:cTn>
+              <p:prevCondLst>
+                <p:cond evt="onPrev" delay="0">
+                  <p:tgtEl>
+                    <p:sldTgt/>
+                  </p:tgtEl>
+                </p:cond>
+              </p:prevCondLst>
+              <p:nextCondLst>
+                <p:cond evt="onNext" delay="0">
+                  <p:tgtEl>
+                    <p:sldTgt/>
+                  </p:tgtEl>
+                </p:cond>
+              </p:nextCondLst>
+            </p:seq>
+          </p:childTnLst>
+        </p:cTn>
+      </p:par>
+    </p:tnLst>
+  </p:timing>
+</p:sld>
+</file>
+
+<file path=ppt/slides/slide13.xml><?xml version="1.0" encoding="utf-8"?>
+<p:sld xmlns:a="http://schemas.openxmlformats.org/drawingml/2006/main" xmlns:r="http://schemas.openxmlformats.org/officeDocument/2006/relationships" xmlns:p="http://schemas.openxmlformats.org/presentationml/2006/main">
+  <p:cSld>
+    <p:spTree>
+      <p:nvGrpSpPr>
+        <p:cNvPr id="1" name=""/>
+        <p:cNvGrpSpPr/>
+        <p:nvPr/>
+      </p:nvGrpSpPr>
+      <p:grpSpPr>
+        <a:xfrm>
+          <a:off x="0" y="0"/>
+          <a:ext cx="0" cy="0"/>
+          <a:chOff x="0" y="0"/>
+          <a:chExt cx="0" cy="0"/>
+        </a:xfrm>
+      </p:grpSpPr>
+      <p:sp>
+        <p:nvSpPr>
+          <p:cNvPr id="2" name="Title 1"/>
+          <p:cNvSpPr>
+            <a:spLocks noGrp="1"/>
+          </p:cNvSpPr>
+          <p:nvPr>
+            <p:ph type="title"/>
+          </p:nvPr>
+        </p:nvSpPr>
+        <p:spPr/>
+        <p:txBody>
+          <a:bodyPr/>
+          <a:lstStyle/>
+          <a:p>
+            <a:r>
+              <a:rPr lang="en-US" dirty="0"/>
+              <a:t>Inside A Directive: </a:t>
+            </a:r>
+            <a:r>
+              <a:rPr lang="en-US" dirty="0" smtClean="0"/>
+              <a:t>Isolated Scope</a:t>
+            </a:r>
+            <a:endParaRPr lang="en-US" dirty="0"/>
+          </a:p>
+        </p:txBody>
+      </p:sp>
+      <p:sp>
+        <p:nvSpPr>
+          <p:cNvPr id="3" name="Content Placeholder 2"/>
+          <p:cNvSpPr>
+            <a:spLocks noGrp="1"/>
+          </p:cNvSpPr>
+          <p:nvPr>
+            <p:ph sz="quarter" idx="1"/>
+          </p:nvPr>
+        </p:nvSpPr>
+        <p:spPr/>
+        <p:txBody>
+          <a:bodyPr/>
+          <a:lstStyle/>
+          <a:p>
+            <a:r>
+              <a:rPr lang="en-US" dirty="0" smtClean="0"/>
+              <a:t>Isolating a scope does not preclude it from being able to bind it to aspects of the parents scope</a:t>
+            </a:r>
+          </a:p>
+          <a:p>
+            <a:pPr lvl="1"/>
+            <a:r>
+              <a:rPr lang="en-US" dirty="0" smtClean="0"/>
+              <a:t>Three ways to bind to parent scope:</a:t>
+            </a:r>
+          </a:p>
+          <a:p>
+            <a:pPr lvl="2"/>
+            <a:r>
+              <a:rPr lang="en-US" dirty="0" smtClean="0"/>
+              <a:t>@</a:t>
+            </a:r>
+          </a:p>
+          <a:p>
+            <a:pPr lvl="2"/>
+            <a:r>
+              <a:rPr lang="en-US" dirty="0" smtClean="0"/>
+              <a:t>=</a:t>
+            </a:r>
+          </a:p>
+          <a:p>
+            <a:pPr lvl="2"/>
+            <a:r>
+              <a:rPr lang="en-US" dirty="0"/>
+              <a:t>&amp;</a:t>
+            </a:r>
+          </a:p>
+        </p:txBody>
+      </p:sp>
+    </p:spTree>
+    <p:extLst>
+      <p:ext uri="{BB962C8B-B14F-4D97-AF65-F5344CB8AC3E}">
+        <p14:creationId xmlns:p14="http://schemas.microsoft.com/office/powerpoint/2010/main" val="1568269666"/>
+      </p:ext>
+    </p:extLst>
+  </p:cSld>
+  <p:clrMapOvr>
+    <a:masterClrMapping/>
+  </p:clrMapOvr>
+  <p:timing>
+    <p:tnLst>
+      <p:par>
+        <p:cTn xmlns:p14="http://schemas.microsoft.com/office/powerpoint/2010/main" id="1" dur="indefinite" restart="never" nodeType="tmRoot"/>
+      </p:par>
+    </p:tnLst>
+  </p:timing>
+</p:sld>
+</file>
+
+<file path=ppt/slides/slide14.xml><?xml version="1.0" encoding="utf-8"?>
+<p:sld xmlns:a="http://schemas.openxmlformats.org/drawingml/2006/main" xmlns:r="http://schemas.openxmlformats.org/officeDocument/2006/relationships" xmlns:p="http://schemas.openxmlformats.org/presentationml/2006/main">
+  <p:cSld>
+    <p:spTree>
+      <p:nvGrpSpPr>
+        <p:cNvPr id="1" name=""/>
+        <p:cNvGrpSpPr/>
+        <p:nvPr/>
+      </p:nvGrpSpPr>
+      <p:grpSpPr>
+        <a:xfrm>
+          <a:off x="0" y="0"/>
+          <a:ext cx="0" cy="0"/>
+          <a:chOff x="0" y="0"/>
+          <a:chExt cx="0" cy="0"/>
+        </a:xfrm>
+      </p:grpSpPr>
+      <p:sp>
+        <p:nvSpPr>
+          <p:cNvPr id="2" name="Title 1"/>
+          <p:cNvSpPr>
+            <a:spLocks noGrp="1"/>
+          </p:cNvSpPr>
+          <p:nvPr>
+            <p:ph type="title"/>
+          </p:nvPr>
+        </p:nvSpPr>
+        <p:spPr/>
+        <p:txBody>
+          <a:bodyPr/>
+          <a:lstStyle/>
+          <a:p>
+            <a:r>
+              <a:rPr lang="en-US" dirty="0"/>
+              <a:t>Inside A Directive: </a:t>
+            </a:r>
+            <a:r>
+              <a:rPr lang="en-US" dirty="0" smtClean="0"/>
+              <a:t>Template(</a:t>
+            </a:r>
+            <a:r>
+              <a:rPr lang="en-US" dirty="0" err="1" smtClean="0"/>
+              <a:t>Url</a:t>
+            </a:r>
+            <a:r>
+              <a:rPr lang="en-US" dirty="0" smtClean="0"/>
+              <a:t>)</a:t>
+            </a:r>
+            <a:endParaRPr lang="en-US" dirty="0"/>
+          </a:p>
+        </p:txBody>
+      </p:sp>
+      <p:sp>
+        <p:nvSpPr>
+          <p:cNvPr id="3" name="Content Placeholder 2"/>
+          <p:cNvSpPr>
+            <a:spLocks noGrp="1"/>
+          </p:cNvSpPr>
+          <p:nvPr>
+            <p:ph sz="quarter" idx="1"/>
+          </p:nvPr>
+        </p:nvSpPr>
+        <p:spPr>
+          <a:xfrm>
+            <a:off x="612648" y="1600200"/>
+            <a:ext cx="8153400" cy="2155712"/>
+          </a:xfrm>
+        </p:spPr>
+        <p:txBody>
+          <a:bodyPr/>
+          <a:lstStyle/>
+          <a:p>
+            <a:r>
+              <a:rPr lang="en-US" dirty="0" smtClean="0"/>
+              <a:t>Template:</a:t>
+            </a:r>
+          </a:p>
+          <a:p>
+            <a:pPr lvl="1"/>
+            <a:r>
+              <a:rPr lang="en-US" dirty="0" smtClean="0"/>
+              <a:t>Can be just plain HTML which is to be inserted.</a:t>
+            </a:r>
+          </a:p>
+          <a:p>
+            <a:pPr lvl="2"/>
+            <a:r>
+              <a:rPr lang="en-US" dirty="0"/>
+              <a:t>t</a:t>
+            </a:r>
+            <a:r>
+              <a:rPr lang="en-US" dirty="0" smtClean="0"/>
+              <a:t>emplate: ‘&lt;h1&gt;Insert Me Please&lt;/h1&gt;’</a:t>
+            </a:r>
+          </a:p>
+          <a:p>
+            <a:pPr lvl="2"/>
+            <a:r>
+              <a:rPr lang="en-US" dirty="0"/>
+              <a:t>template: ‘</a:t>
+            </a:r>
+            <a:r>
+              <a:rPr lang="en-US" dirty="0" smtClean="0"/>
+              <a:t>&lt;input type=“text” value=“{{</a:t>
+            </a:r>
+            <a:r>
+              <a:rPr lang="en-US" dirty="0" err="1" smtClean="0"/>
+              <a:t>userName</a:t>
+            </a:r>
+            <a:r>
+              <a:rPr lang="en-US" dirty="0" smtClean="0"/>
+              <a:t>}}” /&gt;’</a:t>
+            </a:r>
+            <a:endParaRPr lang="en-US" dirty="0"/>
+          </a:p>
+        </p:txBody>
+      </p:sp>
+      <p:sp>
+        <p:nvSpPr>
+          <p:cNvPr id="4" name="Content Placeholder 2"/>
+          <p:cNvSpPr txBox="1">
+            <a:spLocks/>
+          </p:cNvSpPr>
+          <p:nvPr/>
+        </p:nvSpPr>
+        <p:spPr>
+          <a:xfrm>
+            <a:off x="765048" y="3916254"/>
+            <a:ext cx="8153400" cy="2155712"/>
+          </a:xfrm>
+          <a:prstGeom prst="rect">
+            <a:avLst/>
+          </a:prstGeom>
+        </p:spPr>
+        <p:txBody>
+          <a:bodyPr vert="horz">
+            <a:normAutofit/>
+          </a:bodyPr>
+          <a:lstStyle>
+            <a:lvl1pPr marL="320040" indent="-320040" algn="l" rtl="0" eaLnBrk="1" latinLnBrk="0" hangingPunct="1">
+              <a:spcBef>
+                <a:spcPts val="700"/>
+              </a:spcBef>
+              <a:buClr>
+                <a:schemeClr val="accent2"/>
+              </a:buClr>
+              <a:buSzPct val="60000"/>
+              <a:buFont typeface="Wingdings"/>
+              <a:buChar char=""/>
+              <a:defRPr kumimoji="0" sz="2900" kern="1200">
+                <a:solidFill>
+                  <a:schemeClr val="tx1"/>
+                </a:solidFill>
+                <a:latin typeface="+mn-lt"/>
+                <a:ea typeface="+mn-ea"/>
+                <a:cs typeface="+mn-cs"/>
+              </a:defRPr>
+            </a:lvl1pPr>
+            <a:lvl2pPr marL="640080" indent="-274320" algn="l" rtl="0" eaLnBrk="1" latinLnBrk="0" hangingPunct="1">
+              <a:spcBef>
+                <a:spcPts val="550"/>
+              </a:spcBef>
+              <a:buClr>
+                <a:schemeClr val="accent1"/>
+              </a:buClr>
+              <a:buSzPct val="70000"/>
+              <a:buFont typeface="Wingdings 2"/>
+              <a:buChar char=""/>
+              <a:defRPr kumimoji="0" sz="2600" kern="1200">
+                <a:solidFill>
+                  <a:schemeClr val="tx1"/>
+                </a:solidFill>
+                <a:latin typeface="+mn-lt"/>
+                <a:ea typeface="+mn-ea"/>
+                <a:cs typeface="+mn-cs"/>
+              </a:defRPr>
+            </a:lvl2pPr>
+            <a:lvl3pPr marL="914400" indent="-228600" algn="l" rtl="0" eaLnBrk="1" latinLnBrk="0" hangingPunct="1">
+              <a:spcBef>
+                <a:spcPts val="500"/>
+              </a:spcBef>
+              <a:buClr>
+                <a:schemeClr val="accent2"/>
+              </a:buClr>
+              <a:buSzPct val="75000"/>
+              <a:buFont typeface="Wingdings"/>
+              <a:buChar char=""/>
+              <a:defRPr kumimoji="0" sz="2300" kern="1200">
+                <a:solidFill>
+                  <a:schemeClr val="tx1"/>
+                </a:solidFill>
+                <a:latin typeface="+mn-lt"/>
+                <a:ea typeface="+mn-ea"/>
+                <a:cs typeface="+mn-cs"/>
+              </a:defRPr>
+            </a:lvl3pPr>
+            <a:lvl4pPr marL="1371600" indent="-228600" algn="l" rtl="0" eaLnBrk="1" latinLnBrk="0" hangingPunct="1">
+              <a:spcBef>
+                <a:spcPts val="400"/>
+              </a:spcBef>
+              <a:buClr>
+                <a:schemeClr val="accent3"/>
+              </a:buClr>
+              <a:buSzPct val="75000"/>
+              <a:buFont typeface="Wingdings"/>
+              <a:buChar char=""/>
+              <a:defRPr kumimoji="0" sz="2000" kern="1200">
+                <a:solidFill>
+                  <a:schemeClr val="tx1"/>
+                </a:solidFill>
+                <a:latin typeface="+mn-lt"/>
+                <a:ea typeface="+mn-ea"/>
+                <a:cs typeface="+mn-cs"/>
+              </a:defRPr>
+            </a:lvl4pPr>
+            <a:lvl5pPr marL="1828800" indent="-228600" algn="l" rtl="0" eaLnBrk="1" latinLnBrk="0" hangingPunct="1">
+              <a:spcBef>
+                <a:spcPts val="400"/>
+              </a:spcBef>
+              <a:buClr>
+                <a:schemeClr val="accent4"/>
+              </a:buClr>
+              <a:buSzPct val="65000"/>
+              <a:buFont typeface="Wingdings"/>
+              <a:buChar char=""/>
+              <a:defRPr kumimoji="0" sz="2000" kern="1200">
+                <a:solidFill>
+                  <a:schemeClr val="tx1"/>
+                </a:solidFill>
+                <a:latin typeface="+mn-lt"/>
+                <a:ea typeface="+mn-ea"/>
+                <a:cs typeface="+mn-cs"/>
+              </a:defRPr>
+            </a:lvl5pPr>
+            <a:lvl6pPr marL="2103120" indent="-228600" algn="l" rtl="0" eaLnBrk="1" latinLnBrk="0" hangingPunct="1">
+              <a:spcBef>
+                <a:spcPct val="20000"/>
+              </a:spcBef>
+              <a:buClr>
+                <a:schemeClr val="accent1"/>
+              </a:buClr>
+              <a:buFont typeface="Wingdings"/>
+              <a:buChar char="§"/>
+              <a:defRPr kumimoji="0" sz="1800" kern="1200" baseline="0">
+                <a:solidFill>
+                  <a:schemeClr val="tx1"/>
+                </a:solidFill>
+                <a:latin typeface="+mn-lt"/>
+                <a:ea typeface="+mn-ea"/>
+                <a:cs typeface="+mn-cs"/>
+              </a:defRPr>
+            </a:lvl6pPr>
+            <a:lvl7pPr marL="2377440" indent="-228600" algn="l" rtl="0" eaLnBrk="1" latinLnBrk="0" hangingPunct="1">
+              <a:spcBef>
+                <a:spcPct val="20000"/>
+              </a:spcBef>
+              <a:buClr>
+                <a:schemeClr val="accent2"/>
+              </a:buClr>
+              <a:buFont typeface="Wingdings"/>
+              <a:buChar char="§"/>
+              <a:defRPr kumimoji="0" sz="1800" kern="1200" baseline="0">
+                <a:solidFill>
+                  <a:schemeClr val="tx1"/>
+                </a:solidFill>
+                <a:latin typeface="+mn-lt"/>
+                <a:ea typeface="+mn-ea"/>
+                <a:cs typeface="+mn-cs"/>
+              </a:defRPr>
+            </a:lvl7pPr>
+            <a:lvl8pPr marL="2651760" indent="-228600" algn="l" rtl="0" eaLnBrk="1" latinLnBrk="0" hangingPunct="1">
+              <a:spcBef>
+                <a:spcPct val="20000"/>
+              </a:spcBef>
+              <a:buClr>
+                <a:schemeClr val="accent3"/>
+              </a:buClr>
+              <a:buFont typeface="Wingdings"/>
+              <a:buChar char="§"/>
+              <a:defRPr kumimoji="0" sz="1800" kern="1200" baseline="0">
+                <a:solidFill>
+                  <a:schemeClr val="tx1"/>
+                </a:solidFill>
+                <a:latin typeface="+mn-lt"/>
+                <a:ea typeface="+mn-ea"/>
+                <a:cs typeface="+mn-cs"/>
+              </a:defRPr>
+            </a:lvl8pPr>
+            <a:lvl9pPr marL="2926080" indent="-228600" algn="l" rtl="0" eaLnBrk="1" latinLnBrk="0" hangingPunct="1">
+              <a:spcBef>
+                <a:spcPct val="20000"/>
+              </a:spcBef>
+              <a:buClr>
+                <a:schemeClr val="accent4"/>
+              </a:buClr>
+              <a:buFont typeface="Wingdings"/>
+              <a:buChar char="§"/>
+              <a:defRPr kumimoji="0" sz="1800" kern="1200" baseline="0">
+                <a:solidFill>
+                  <a:schemeClr val="tx1"/>
+                </a:solidFill>
+                <a:latin typeface="+mn-lt"/>
+                <a:ea typeface="+mn-ea"/>
+                <a:cs typeface="+mn-cs"/>
+              </a:defRPr>
+            </a:lvl9pPr>
+          </a:lstStyle>
+          <a:p>
+            <a:r>
+              <a:rPr lang="en-US" dirty="0" smtClean="0"/>
+              <a:t>TemplateUrl:</a:t>
+            </a:r>
+          </a:p>
+          <a:p>
+            <a:pPr lvl="1"/>
+            <a:r>
+              <a:rPr lang="en-US" dirty="0" smtClean="0"/>
+              <a:t>Points to the location of the “partial” html file</a:t>
+            </a:r>
+          </a:p>
+          <a:p>
+            <a:pPr lvl="2"/>
+            <a:r>
+              <a:rPr lang="en-US" dirty="0" smtClean="0"/>
+              <a:t>templateUrl: ‘./partials/</a:t>
+            </a:r>
+            <a:r>
+              <a:rPr lang="en-US" dirty="0" err="1" smtClean="0"/>
+              <a:t>form.html</a:t>
+            </a:r>
+            <a:r>
+              <a:rPr lang="en-US" dirty="0" smtClean="0"/>
+              <a:t>’</a:t>
+            </a:r>
+          </a:p>
+          <a:p>
+            <a:pPr lvl="2"/>
+            <a:r>
+              <a:rPr lang="en-US" dirty="0"/>
+              <a:t>templateUrl: </a:t>
+            </a:r>
+            <a:r>
+              <a:rPr lang="en-US" dirty="0" smtClean="0"/>
+              <a:t>‘</a:t>
+            </a:r>
+            <a:r>
+              <a:rPr lang="en-US" dirty="0" err="1" smtClean="0"/>
+              <a:t>navBar.html</a:t>
+            </a:r>
+            <a:r>
+              <a:rPr lang="en-US" dirty="0" smtClean="0"/>
+              <a:t>’</a:t>
+            </a:r>
+            <a:endParaRPr lang="en-US" dirty="0"/>
+          </a:p>
+        </p:txBody>
+      </p:sp>
+    </p:spTree>
+    <p:extLst>
+      <p:ext uri="{BB962C8B-B14F-4D97-AF65-F5344CB8AC3E}">
+        <p14:creationId xmlns:p14="http://schemas.microsoft.com/office/powerpoint/2010/main" val="2971061411"/>
+      </p:ext>
+    </p:extLst>
+  </p:cSld>
+  <p:clrMapOvr>
+    <a:masterClrMapping/>
+  </p:clrMapOvr>
+  <p:timing>
+    <p:tnLst>
+      <p:par>
+        <p:cTn xmlns:p14="http://schemas.microsoft.com/office/powerpoint/2010/main" id="1" dur="indefinite" restart="never" nodeType="tmRoot"/>
+      </p:par>
+    </p:tnLst>
+  </p:timing>
+</p:sld>
+</file>
+
+<file path=ppt/slides/slide15.xml><?xml version="1.0" encoding="utf-8"?>
+<p:sld xmlns:a="http://schemas.openxmlformats.org/drawingml/2006/main" xmlns:r="http://schemas.openxmlformats.org/officeDocument/2006/relationships" xmlns:p="http://schemas.openxmlformats.org/presentationml/2006/main">
+  <p:cSld>
+    <p:spTree>
+      <p:nvGrpSpPr>
+        <p:cNvPr id="1" name=""/>
+        <p:cNvGrpSpPr/>
+        <p:nvPr/>
+      </p:nvGrpSpPr>
+      <p:grpSpPr>
+        <a:xfrm>
+          <a:off x="0" y="0"/>
+          <a:ext cx="0" cy="0"/>
+          <a:chOff x="0" y="0"/>
+          <a:chExt cx="0" cy="0"/>
+        </a:xfrm>
+      </p:grpSpPr>
+      <p:sp>
+        <p:nvSpPr>
+          <p:cNvPr id="2" name="Title 1"/>
+          <p:cNvSpPr>
+            <a:spLocks noGrp="1"/>
+          </p:cNvSpPr>
+          <p:nvPr>
+            <p:ph type="title"/>
+          </p:nvPr>
+        </p:nvSpPr>
+        <p:spPr/>
+        <p:txBody>
+          <a:bodyPr/>
+          <a:lstStyle/>
+          <a:p>
+            <a:r>
+              <a:rPr lang="en-US" dirty="0"/>
+              <a:t>Looking Inside A Directive</a:t>
             </a:r>
           </a:p>
         </p:txBody>
@@ -4457,6 +6729,13 @@
   <p:clrMapOvr>
     <a:masterClrMapping/>
   </p:clrMapOvr>
+  <p:timing>
+    <p:tnLst>
+      <p:par>
+        <p:cTn xmlns:p14="http://schemas.microsoft.com/office/powerpoint/2010/main" id="1" dur="indefinite" restart="never" nodeType="tmRoot"/>
+      </p:par>
+    </p:tnLst>
+  </p:timing>
 </p:sld>
 </file>
 
@@ -4512,7 +6791,9 @@
         </p:nvSpPr>
         <p:spPr/>
         <p:txBody>
-          <a:bodyPr/>
+          <a:bodyPr>
+            <a:normAutofit lnSpcReduction="10000"/>
+          </a:bodyPr>
           <a:lstStyle/>
           <a:p>
             <a:r>
@@ -4529,47 +6810,63 @@
           <a:p>
             <a:r>
               <a:rPr lang="en-US" dirty="0" smtClean="0"/>
-              <a:t>Writing Basic Custom Directives</a:t>
-            </a:r>
+              <a:t>Inside A Directive</a:t>
+            </a:r>
+            <a:endParaRPr lang="en-US" dirty="0" smtClean="0"/>
           </a:p>
           <a:p>
             <a:pPr lvl="1"/>
             <a:r>
               <a:rPr lang="en-US" dirty="0" smtClean="0"/>
-              <a:t>Implementations (the 4 flavors)</a:t>
-            </a:r>
+              <a:t>Overview (Example)</a:t>
+            </a:r>
+            <a:endParaRPr lang="en-US" dirty="0" smtClean="0"/>
           </a:p>
           <a:p>
             <a:pPr lvl="1"/>
             <a:r>
               <a:rPr lang="en-US" dirty="0" smtClean="0"/>
-              <a:t>Naming Conventions</a:t>
-            </a:r>
+              <a:t>Naming </a:t>
+            </a:r>
+            <a:endParaRPr lang="en-US" dirty="0" smtClean="0"/>
           </a:p>
           <a:p>
             <a:pPr lvl="1"/>
             <a:r>
-              <a:rPr lang="en-US" dirty="0"/>
-              <a:t>A Look At The Framework</a:t>
-            </a:r>
+              <a:rPr lang="en-US" dirty="0" smtClean="0"/>
+              <a:t>The Return Object</a:t>
+            </a:r>
+            <a:endParaRPr lang="en-US" dirty="0"/>
           </a:p>
           <a:p>
             <a:pPr lvl="1"/>
             <a:r>
               <a:rPr lang="en-US" dirty="0" smtClean="0"/>
-              <a:t>Typical </a:t>
-            </a:r>
-            <a:r>
-              <a:rPr lang="en-US" dirty="0"/>
-              <a:t>Properties</a:t>
-            </a:r>
+              <a:t>Restrict</a:t>
+            </a:r>
+            <a:endParaRPr lang="en-US" dirty="0"/>
           </a:p>
           <a:p>
             <a:pPr lvl="1"/>
             <a:r>
               <a:rPr lang="en-US" dirty="0" smtClean="0"/>
-              <a:t>……….</a:t>
-            </a:r>
+              <a:t>Scope</a:t>
+            </a:r>
+          </a:p>
+          <a:p>
+            <a:pPr lvl="1"/>
+            <a:r>
+              <a:rPr lang="en-US" dirty="0" smtClean="0"/>
+              <a:t>Controller</a:t>
+            </a:r>
+          </a:p>
+          <a:p>
+            <a:pPr lvl="1"/>
+            <a:r>
+              <a:rPr lang="en-US" dirty="0" smtClean="0"/>
+              <a:t>Link</a:t>
+            </a:r>
+            <a:endParaRPr lang="en-US" dirty="0" smtClean="0"/>
           </a:p>
           <a:p>
             <a:pPr lvl="1"/>
@@ -4591,6 +6888,13 @@
   <p:clrMapOvr>
     <a:masterClrMapping/>
   </p:clrMapOvr>
+  <p:timing>
+    <p:tnLst>
+      <p:par>
+        <p:cTn xmlns:p14="http://schemas.microsoft.com/office/powerpoint/2010/main" id="1" dur="indefinite" restart="never" nodeType="tmRoot"/>
+      </p:par>
+    </p:tnLst>
+  </p:timing>
 </p:sld>
 </file>
 
@@ -4751,6 +7055,323 @@
   <p:clrMapOvr>
     <a:masterClrMapping/>
   </p:clrMapOvr>
+  <p:timing>
+    <p:tnLst>
+      <p:par>
+        <p:cTn xmlns:p14="http://schemas.microsoft.com/office/powerpoint/2010/main" id="1" dur="indefinite" restart="never" nodeType="tmRoot">
+          <p:childTnLst>
+            <p:seq concurrent="1" nextAc="seek">
+              <p:cTn id="2" dur="indefinite" nodeType="mainSeq">
+                <p:childTnLst>
+                  <p:par>
+                    <p:cTn id="3" fill="hold">
+                      <p:stCondLst>
+                        <p:cond delay="indefinite"/>
+                      </p:stCondLst>
+                      <p:childTnLst>
+                        <p:par>
+                          <p:cTn id="4" fill="hold">
+                            <p:stCondLst>
+                              <p:cond delay="0"/>
+                            </p:stCondLst>
+                            <p:childTnLst>
+                              <p:par>
+                                <p:cTn id="5" presetID="9" presetClass="entr" presetSubtype="0" fill="hold" nodeType="clickEffect">
+                                  <p:stCondLst>
+                                    <p:cond delay="0"/>
+                                  </p:stCondLst>
+                                  <p:childTnLst>
+                                    <p:set>
+                                      <p:cBhvr>
+                                        <p:cTn id="6" dur="1" fill="hold">
+                                          <p:stCondLst>
+                                            <p:cond delay="0"/>
+                                          </p:stCondLst>
+                                        </p:cTn>
+                                        <p:tgtEl>
+                                          <p:spTgt spid="3">
+                                            <p:txEl>
+                                              <p:pRg st="0" end="0"/>
+                                            </p:txEl>
+                                          </p:spTgt>
+                                        </p:tgtEl>
+                                        <p:attrNameLst>
+                                          <p:attrName>style.visibility</p:attrName>
+                                        </p:attrNameLst>
+                                      </p:cBhvr>
+                                      <p:to>
+                                        <p:strVal val="visible"/>
+                                      </p:to>
+                                    </p:set>
+                                    <p:animEffect transition="in" filter="dissolve">
+                                      <p:cBhvr>
+                                        <p:cTn id="7" dur="500"/>
+                                        <p:tgtEl>
+                                          <p:spTgt spid="3">
+                                            <p:txEl>
+                                              <p:pRg st="0" end="0"/>
+                                            </p:txEl>
+                                          </p:spTgt>
+                                        </p:tgtEl>
+                                      </p:cBhvr>
+                                    </p:animEffect>
+                                  </p:childTnLst>
+                                </p:cTn>
+                              </p:par>
+                            </p:childTnLst>
+                          </p:cTn>
+                        </p:par>
+                      </p:childTnLst>
+                    </p:cTn>
+                  </p:par>
+                  <p:par>
+                    <p:cTn id="8" fill="hold">
+                      <p:stCondLst>
+                        <p:cond delay="indefinite"/>
+                      </p:stCondLst>
+                      <p:childTnLst>
+                        <p:par>
+                          <p:cTn id="9" fill="hold">
+                            <p:stCondLst>
+                              <p:cond delay="0"/>
+                            </p:stCondLst>
+                            <p:childTnLst>
+                              <p:par>
+                                <p:cTn id="10" presetID="9" presetClass="entr" presetSubtype="0" fill="hold" nodeType="clickEffect">
+                                  <p:stCondLst>
+                                    <p:cond delay="0"/>
+                                  </p:stCondLst>
+                                  <p:childTnLst>
+                                    <p:set>
+                                      <p:cBhvr>
+                                        <p:cTn id="11" dur="1" fill="hold">
+                                          <p:stCondLst>
+                                            <p:cond delay="0"/>
+                                          </p:stCondLst>
+                                        </p:cTn>
+                                        <p:tgtEl>
+                                          <p:spTgt spid="3">
+                                            <p:txEl>
+                                              <p:pRg st="1" end="1"/>
+                                            </p:txEl>
+                                          </p:spTgt>
+                                        </p:tgtEl>
+                                        <p:attrNameLst>
+                                          <p:attrName>style.visibility</p:attrName>
+                                        </p:attrNameLst>
+                                      </p:cBhvr>
+                                      <p:to>
+                                        <p:strVal val="visible"/>
+                                      </p:to>
+                                    </p:set>
+                                    <p:animEffect transition="in" filter="dissolve">
+                                      <p:cBhvr>
+                                        <p:cTn id="12" dur="500"/>
+                                        <p:tgtEl>
+                                          <p:spTgt spid="3">
+                                            <p:txEl>
+                                              <p:pRg st="1" end="1"/>
+                                            </p:txEl>
+                                          </p:spTgt>
+                                        </p:tgtEl>
+                                      </p:cBhvr>
+                                    </p:animEffect>
+                                  </p:childTnLst>
+                                </p:cTn>
+                              </p:par>
+                            </p:childTnLst>
+                          </p:cTn>
+                        </p:par>
+                      </p:childTnLst>
+                    </p:cTn>
+                  </p:par>
+                  <p:par>
+                    <p:cTn id="13" fill="hold">
+                      <p:stCondLst>
+                        <p:cond delay="indefinite"/>
+                      </p:stCondLst>
+                      <p:childTnLst>
+                        <p:par>
+                          <p:cTn id="14" fill="hold">
+                            <p:stCondLst>
+                              <p:cond delay="0"/>
+                            </p:stCondLst>
+                            <p:childTnLst>
+                              <p:par>
+                                <p:cTn id="15" presetID="9" presetClass="entr" presetSubtype="0" fill="hold" nodeType="clickEffect">
+                                  <p:stCondLst>
+                                    <p:cond delay="0"/>
+                                  </p:stCondLst>
+                                  <p:childTnLst>
+                                    <p:set>
+                                      <p:cBhvr>
+                                        <p:cTn id="16" dur="1" fill="hold">
+                                          <p:stCondLst>
+                                            <p:cond delay="0"/>
+                                          </p:stCondLst>
+                                        </p:cTn>
+                                        <p:tgtEl>
+                                          <p:spTgt spid="3">
+                                            <p:txEl>
+                                              <p:pRg st="2" end="2"/>
+                                            </p:txEl>
+                                          </p:spTgt>
+                                        </p:tgtEl>
+                                        <p:attrNameLst>
+                                          <p:attrName>style.visibility</p:attrName>
+                                        </p:attrNameLst>
+                                      </p:cBhvr>
+                                      <p:to>
+                                        <p:strVal val="visible"/>
+                                      </p:to>
+                                    </p:set>
+                                    <p:animEffect transition="in" filter="dissolve">
+                                      <p:cBhvr>
+                                        <p:cTn id="17" dur="500"/>
+                                        <p:tgtEl>
+                                          <p:spTgt spid="3">
+                                            <p:txEl>
+                                              <p:pRg st="2" end="2"/>
+                                            </p:txEl>
+                                          </p:spTgt>
+                                        </p:tgtEl>
+                                      </p:cBhvr>
+                                    </p:animEffect>
+                                  </p:childTnLst>
+                                </p:cTn>
+                              </p:par>
+                            </p:childTnLst>
+                          </p:cTn>
+                        </p:par>
+                      </p:childTnLst>
+                    </p:cTn>
+                  </p:par>
+                  <p:par>
+                    <p:cTn id="18" fill="hold">
+                      <p:stCondLst>
+                        <p:cond delay="indefinite"/>
+                      </p:stCondLst>
+                      <p:childTnLst>
+                        <p:par>
+                          <p:cTn id="19" fill="hold">
+                            <p:stCondLst>
+                              <p:cond delay="0"/>
+                            </p:stCondLst>
+                            <p:childTnLst>
+                              <p:par>
+                                <p:cTn id="20" presetID="9" presetClass="entr" presetSubtype="0" fill="hold" nodeType="clickEffect">
+                                  <p:stCondLst>
+                                    <p:cond delay="0"/>
+                                  </p:stCondLst>
+                                  <p:childTnLst>
+                                    <p:set>
+                                      <p:cBhvr>
+                                        <p:cTn id="21" dur="1" fill="hold">
+                                          <p:stCondLst>
+                                            <p:cond delay="0"/>
+                                          </p:stCondLst>
+                                        </p:cTn>
+                                        <p:tgtEl>
+                                          <p:spTgt spid="3">
+                                            <p:txEl>
+                                              <p:pRg st="4" end="4"/>
+                                            </p:txEl>
+                                          </p:spTgt>
+                                        </p:tgtEl>
+                                        <p:attrNameLst>
+                                          <p:attrName>style.visibility</p:attrName>
+                                        </p:attrNameLst>
+                                      </p:cBhvr>
+                                      <p:to>
+                                        <p:strVal val="visible"/>
+                                      </p:to>
+                                    </p:set>
+                                    <p:animEffect transition="in" filter="dissolve">
+                                      <p:cBhvr>
+                                        <p:cTn id="22" dur="500"/>
+                                        <p:tgtEl>
+                                          <p:spTgt spid="3">
+                                            <p:txEl>
+                                              <p:pRg st="4" end="4"/>
+                                            </p:txEl>
+                                          </p:spTgt>
+                                        </p:tgtEl>
+                                      </p:cBhvr>
+                                    </p:animEffect>
+                                  </p:childTnLst>
+                                </p:cTn>
+                              </p:par>
+                              <p:par>
+                                <p:cTn id="23" presetID="9" presetClass="entr" presetSubtype="0" fill="hold" nodeType="withEffect">
+                                  <p:stCondLst>
+                                    <p:cond delay="0"/>
+                                  </p:stCondLst>
+                                  <p:childTnLst>
+                                    <p:set>
+                                      <p:cBhvr>
+                                        <p:cTn id="24" dur="1" fill="hold">
+                                          <p:stCondLst>
+                                            <p:cond delay="0"/>
+                                          </p:stCondLst>
+                                        </p:cTn>
+                                        <p:tgtEl>
+                                          <p:spTgt spid="3">
+                                            <p:txEl>
+                                              <p:pRg st="5" end="5"/>
+                                            </p:txEl>
+                                          </p:spTgt>
+                                        </p:tgtEl>
+                                        <p:attrNameLst>
+                                          <p:attrName>style.visibility</p:attrName>
+                                        </p:attrNameLst>
+                                      </p:cBhvr>
+                                      <p:to>
+                                        <p:strVal val="visible"/>
+                                      </p:to>
+                                    </p:set>
+                                    <p:animEffect transition="in" filter="dissolve">
+                                      <p:cBhvr>
+                                        <p:cTn id="25" dur="500"/>
+                                        <p:tgtEl>
+                                          <p:spTgt spid="3">
+                                            <p:txEl>
+                                              <p:pRg st="5" end="5"/>
+                                            </p:txEl>
+                                          </p:spTgt>
+                                        </p:tgtEl>
+                                      </p:cBhvr>
+                                    </p:animEffect>
+                                  </p:childTnLst>
+                                </p:cTn>
+                              </p:par>
+                            </p:childTnLst>
+                          </p:cTn>
+                        </p:par>
+                      </p:childTnLst>
+                    </p:cTn>
+                  </p:par>
+                </p:childTnLst>
+              </p:cTn>
+              <p:prevCondLst>
+                <p:cond evt="onPrev" delay="0">
+                  <p:tgtEl>
+                    <p:sldTgt/>
+                  </p:tgtEl>
+                </p:cond>
+              </p:prevCondLst>
+              <p:nextCondLst>
+                <p:cond evt="onNext" delay="0">
+                  <p:tgtEl>
+                    <p:sldTgt/>
+                  </p:tgtEl>
+                </p:cond>
+              </p:nextCondLst>
+            </p:seq>
+          </p:childTnLst>
+        </p:cTn>
+      </p:par>
+    </p:tnLst>
+  </p:timing>
 </p:sld>
 </file>
 
@@ -4816,15 +7437,7 @@
             </a:pPr>
             <a:r>
               <a:rPr lang="en-US" dirty="0" smtClean="0"/>
-              <a:t>A quote from </a:t>
-            </a:r>
-            <a:r>
-              <a:rPr lang="en-US" dirty="0" err="1" smtClean="0"/>
-              <a:t>AngularJS.org</a:t>
-            </a:r>
-            <a:r>
-              <a:rPr lang="en-US" dirty="0" smtClean="0"/>
-              <a:t>:</a:t>
+              <a:t>A quote from AngularJS.org:</a:t>
             </a:r>
           </a:p>
           <a:p>
@@ -5019,6 +7632,13 @@
   <p:clrMapOvr>
     <a:masterClrMapping/>
   </p:clrMapOvr>
+  <p:timing>
+    <p:tnLst>
+      <p:par>
+        <p:cTn xmlns:p14="http://schemas.microsoft.com/office/powerpoint/2010/main" id="1" dur="indefinite" restart="never" nodeType="tmRoot"/>
+      </p:par>
+    </p:tnLst>
+  </p:timing>
 </p:sld>
 </file>
 
@@ -5120,6 +7740,27 @@
             <a:endParaRPr lang="en-US" dirty="0" smtClean="0"/>
           </a:p>
           <a:p>
+            <a:r>
+              <a:rPr lang="en-US" dirty="0" err="1" smtClean="0"/>
+              <a:t>ngBind</a:t>
+            </a:r>
+            <a:endParaRPr lang="en-US" dirty="0" smtClean="0"/>
+          </a:p>
+          <a:p>
+            <a:r>
+              <a:rPr lang="en-US" dirty="0" err="1" smtClean="0"/>
+              <a:t>ngView</a:t>
+            </a:r>
+            <a:endParaRPr lang="en-US" dirty="0" smtClean="0"/>
+          </a:p>
+          <a:p>
+            <a:r>
+              <a:rPr lang="en-US" dirty="0" err="1" smtClean="0"/>
+              <a:t>ngSwitch</a:t>
+            </a:r>
+            <a:endParaRPr lang="en-US" dirty="0" smtClean="0"/>
+          </a:p>
+          <a:p>
             <a:endParaRPr lang="en-US" dirty="0"/>
           </a:p>
         </p:txBody>
@@ -5134,6 +7775,13 @@
   <p:clrMapOvr>
     <a:masterClrMapping/>
   </p:clrMapOvr>
+  <p:timing>
+    <p:tnLst>
+      <p:par>
+        <p:cTn xmlns:p14="http://schemas.microsoft.com/office/powerpoint/2010/main" id="1" dur="indefinite" restart="never" nodeType="tmRoot"/>
+      </p:par>
+    </p:tnLst>
+  </p:timing>
 </p:sld>
 </file>
 
@@ -5166,18 +7814,12 @@
         </p:nvSpPr>
         <p:spPr/>
         <p:txBody>
-          <a:bodyPr>
-            <a:normAutofit/>
-          </a:bodyPr>
+          <a:bodyPr/>
           <a:lstStyle/>
           <a:p>
             <a:r>
-              <a:rPr lang="en-US" dirty="0"/>
-              <a:t>Writing Basic Custom </a:t>
-            </a:r>
-            <a:r>
               <a:rPr lang="en-US" dirty="0" smtClean="0"/>
-              <a:t>Directives</a:t>
+              <a:t>Check-In Quiz</a:t>
             </a:r>
             <a:endParaRPr lang="en-US" dirty="0"/>
           </a:p>
@@ -5196,521 +7838,192 @@
         <p:spPr>
           <a:xfrm>
             <a:off x="612648" y="1600200"/>
-            <a:ext cx="8153400" cy="2572951"/>
+            <a:ext cx="8153400" cy="1096352"/>
           </a:xfrm>
         </p:spPr>
         <p:txBody>
-          <a:bodyPr>
-            <a:normAutofit fontScale="85000" lnSpcReduction="20000"/>
-          </a:bodyPr>
+          <a:bodyPr/>
           <a:lstStyle/>
           <a:p>
             <a:r>
-              <a:rPr lang="en-US" sz="2800" dirty="0" smtClean="0"/>
-              <a:t>Directives Implementations Come In 4 Types:</a:t>
+              <a:rPr lang="en-US" dirty="0" smtClean="0"/>
+              <a:t>What is a directive?</a:t>
+            </a:r>
+          </a:p>
+          <a:p>
+            <a:r>
+              <a:rPr lang="en-US" dirty="0" smtClean="0"/>
+              <a:t>Name Some Built-In Directives.</a:t>
             </a:r>
           </a:p>
           <a:p>
             <a:pPr lvl="1"/>
-            <a:r>
-              <a:rPr lang="en-US" sz="2100" dirty="0" smtClean="0"/>
-              <a:t>A new HTML Element ( </a:t>
-            </a:r>
-            <a:r>
-              <a:rPr lang="en-US" sz="2100" dirty="0" smtClean="0">
-                <a:solidFill>
-                  <a:srgbClr val="5A6885"/>
-                </a:solidFill>
-              </a:rPr>
-              <a:t>&lt;</a:t>
-            </a:r>
-            <a:r>
-              <a:rPr lang="en-US" sz="2100" dirty="0" smtClean="0">
-                <a:solidFill>
-                  <a:srgbClr val="AD0101"/>
-                </a:solidFill>
-              </a:rPr>
-              <a:t>my-custom</a:t>
-            </a:r>
-            <a:r>
-              <a:rPr lang="en-US" sz="2100" dirty="0" smtClean="0">
-                <a:solidFill>
-                  <a:srgbClr val="5A6885"/>
-                </a:solidFill>
-              </a:rPr>
-              <a:t>&gt;&lt;/</a:t>
-            </a:r>
-            <a:r>
-              <a:rPr lang="en-US" sz="2100" dirty="0" smtClean="0">
-                <a:solidFill>
-                  <a:srgbClr val="AD0101"/>
-                </a:solidFill>
-              </a:rPr>
-              <a:t>my-custom</a:t>
-            </a:r>
-            <a:r>
-              <a:rPr lang="en-US" sz="2100" dirty="0" smtClean="0">
-                <a:solidFill>
-                  <a:srgbClr val="5A6885"/>
-                </a:solidFill>
-              </a:rPr>
-              <a:t>&gt; </a:t>
-            </a:r>
-            <a:r>
-              <a:rPr lang="en-US" sz="2100" dirty="0" smtClean="0"/>
-              <a:t>)</a:t>
-            </a:r>
-          </a:p>
-          <a:p>
-            <a:pPr lvl="1"/>
-            <a:r>
-              <a:rPr lang="en-US" sz="2100" dirty="0" smtClean="0"/>
-              <a:t>An Attribute ( </a:t>
-            </a:r>
-            <a:r>
-              <a:rPr lang="en-US" sz="2100" dirty="0" smtClean="0">
-                <a:solidFill>
-                  <a:srgbClr val="5A6885"/>
-                </a:solidFill>
-              </a:rPr>
-              <a:t>&lt;input type=“text” </a:t>
-            </a:r>
-            <a:r>
-              <a:rPr lang="en-US" sz="2100" dirty="0" smtClean="0">
-                <a:solidFill>
-                  <a:srgbClr val="AD0101"/>
-                </a:solidFill>
-              </a:rPr>
-              <a:t>data-m</a:t>
-            </a:r>
-            <a:r>
-              <a:rPr lang="en-US" sz="2100" dirty="0" smtClean="0">
-                <a:solidFill>
-                  <a:schemeClr val="accent1"/>
-                </a:solidFill>
-              </a:rPr>
-              <a:t>y-custom </a:t>
-            </a:r>
-            <a:r>
-              <a:rPr lang="en-US" sz="2100" dirty="0" smtClean="0">
-                <a:solidFill>
-                  <a:srgbClr val="5A6885"/>
-                </a:solidFill>
-              </a:rPr>
-              <a:t>/&gt; </a:t>
-            </a:r>
-            <a:r>
-              <a:rPr lang="en-US" sz="2100" dirty="0" smtClean="0"/>
-              <a:t>) </a:t>
-            </a:r>
-          </a:p>
-          <a:p>
-            <a:pPr lvl="1"/>
-            <a:r>
-              <a:rPr lang="en-US" sz="2100" dirty="0" smtClean="0"/>
-              <a:t>As A Class ( </a:t>
-            </a:r>
-            <a:r>
-              <a:rPr lang="en-US" sz="2100" dirty="0" smtClean="0">
-                <a:solidFill>
-                  <a:srgbClr val="5A6885"/>
-                </a:solidFill>
-              </a:rPr>
-              <a:t>&lt;h1 class=“</a:t>
-            </a:r>
-            <a:r>
-              <a:rPr lang="en-US" sz="2100" dirty="0" smtClean="0">
-                <a:solidFill>
-                  <a:srgbClr val="AD0101"/>
-                </a:solidFill>
-              </a:rPr>
-              <a:t>my_custom</a:t>
-            </a:r>
-            <a:r>
-              <a:rPr lang="en-US" sz="2100" dirty="0" smtClean="0">
-                <a:solidFill>
-                  <a:srgbClr val="5A6885"/>
-                </a:solidFill>
-              </a:rPr>
-              <a:t>”&gt;&lt;/h1&gt; </a:t>
-            </a:r>
-            <a:r>
-              <a:rPr lang="en-US" sz="2100" dirty="0" smtClean="0"/>
-              <a:t>)</a:t>
-            </a:r>
-          </a:p>
-          <a:p>
-            <a:pPr lvl="1"/>
-            <a:r>
-              <a:rPr lang="en-US" sz="2100" dirty="0" smtClean="0"/>
-              <a:t>Comment/Meta ( </a:t>
-            </a:r>
-            <a:r>
-              <a:rPr lang="en-US" sz="2100" dirty="0" smtClean="0">
-                <a:solidFill>
-                  <a:schemeClr val="accent4">
-                    <a:lumMod val="75000"/>
-                  </a:schemeClr>
-                </a:solidFill>
-              </a:rPr>
-              <a:t>&lt;!--directive:</a:t>
-            </a:r>
-            <a:r>
-              <a:rPr lang="en-US" sz="2100" dirty="0" smtClean="0">
-                <a:solidFill>
-                  <a:schemeClr val="accent1"/>
-                </a:solidFill>
-              </a:rPr>
-              <a:t>my-custom </a:t>
-            </a:r>
-            <a:r>
-              <a:rPr lang="en-US" sz="2100" dirty="0" smtClean="0">
-                <a:solidFill>
-                  <a:schemeClr val="accent4">
-                    <a:lumMod val="75000"/>
-                  </a:schemeClr>
-                </a:solidFill>
-              </a:rPr>
-              <a:t>--&gt;</a:t>
-            </a:r>
-            <a:r>
-              <a:rPr lang="en-US" sz="2100" dirty="0" smtClean="0">
-                <a:solidFill>
-                  <a:schemeClr val="accent5">
-                    <a:lumMod val="60000"/>
-                    <a:lumOff val="40000"/>
-                  </a:schemeClr>
-                </a:solidFill>
-              </a:rPr>
-              <a:t> </a:t>
-            </a:r>
-            <a:r>
-              <a:rPr lang="en-US" sz="2100" dirty="0" smtClean="0"/>
-              <a:t>)</a:t>
-            </a:r>
-          </a:p>
-          <a:p>
-            <a:pPr marL="365760" lvl="1" indent="0">
-              <a:buNone/>
-            </a:pPr>
-            <a:endParaRPr lang="en-US" sz="2000" dirty="0"/>
-          </a:p>
-          <a:p>
-            <a:pPr marL="365760" lvl="1" indent="0">
-              <a:buNone/>
-            </a:pPr>
-            <a:r>
-              <a:rPr lang="en-US" sz="2000" b="1" i="1" dirty="0">
-                <a:solidFill>
-                  <a:srgbClr val="008000"/>
-                </a:solidFill>
-              </a:rPr>
-              <a:t>Best Practice:</a:t>
-            </a:r>
-            <a:r>
-              <a:rPr lang="en-US" sz="2000" i="1" dirty="0">
-                <a:solidFill>
-                  <a:srgbClr val="008000"/>
-                </a:solidFill>
-              </a:rPr>
-              <a:t> Prefer using directives via tag name and attributes over comment and class names. Doing so generally makes it easier to determine what directives a given element matches. </a:t>
-            </a:r>
-          </a:p>
-          <a:p>
-            <a:pPr lvl="1"/>
-            <a:endParaRPr lang="en-US" sz="2000" dirty="0" smtClean="0"/>
-          </a:p>
-        </p:txBody>
-      </p:sp>
-      <p:sp>
-        <p:nvSpPr>
-          <p:cNvPr id="4" name="Content Placeholder 2"/>
-          <p:cNvSpPr txBox="1">
-            <a:spLocks/>
-          </p:cNvSpPr>
-          <p:nvPr/>
-        </p:nvSpPr>
-        <p:spPr>
-          <a:xfrm>
-            <a:off x="612648" y="4173151"/>
-            <a:ext cx="8153400" cy="2480743"/>
-          </a:xfrm>
-          <a:prstGeom prst="rect">
-            <a:avLst/>
-          </a:prstGeom>
-        </p:spPr>
-        <p:txBody>
-          <a:bodyPr vert="horz">
-            <a:normAutofit fontScale="85000" lnSpcReduction="20000"/>
-          </a:bodyPr>
-          <a:lstStyle>
-            <a:lvl1pPr marL="320040" indent="-320040" algn="l" rtl="0" eaLnBrk="1" latinLnBrk="0" hangingPunct="1">
-              <a:spcBef>
-                <a:spcPts val="700"/>
-              </a:spcBef>
-              <a:buClr>
-                <a:schemeClr val="accent2"/>
-              </a:buClr>
-              <a:buSzPct val="60000"/>
-              <a:buFont typeface="Wingdings"/>
-              <a:buChar char=""/>
-              <a:defRPr kumimoji="0" sz="2900" kern="1200">
-                <a:solidFill>
-                  <a:schemeClr val="tx1"/>
-                </a:solidFill>
-                <a:latin typeface="+mn-lt"/>
-                <a:ea typeface="+mn-ea"/>
-                <a:cs typeface="+mn-cs"/>
-              </a:defRPr>
-            </a:lvl1pPr>
-            <a:lvl2pPr marL="640080" indent="-274320" algn="l" rtl="0" eaLnBrk="1" latinLnBrk="0" hangingPunct="1">
-              <a:spcBef>
-                <a:spcPts val="550"/>
-              </a:spcBef>
-              <a:buClr>
-                <a:schemeClr val="accent1"/>
-              </a:buClr>
-              <a:buSzPct val="70000"/>
-              <a:buFont typeface="Wingdings 2"/>
-              <a:buChar char=""/>
-              <a:defRPr kumimoji="0" sz="2600" kern="1200">
-                <a:solidFill>
-                  <a:schemeClr val="tx1"/>
-                </a:solidFill>
-                <a:latin typeface="+mn-lt"/>
-                <a:ea typeface="+mn-ea"/>
-                <a:cs typeface="+mn-cs"/>
-              </a:defRPr>
-            </a:lvl2pPr>
-            <a:lvl3pPr marL="914400" indent="-228600" algn="l" rtl="0" eaLnBrk="1" latinLnBrk="0" hangingPunct="1">
-              <a:spcBef>
-                <a:spcPts val="500"/>
-              </a:spcBef>
-              <a:buClr>
-                <a:schemeClr val="accent2"/>
-              </a:buClr>
-              <a:buSzPct val="75000"/>
-              <a:buFont typeface="Wingdings"/>
-              <a:buChar char=""/>
-              <a:defRPr kumimoji="0" sz="2300" kern="1200">
-                <a:solidFill>
-                  <a:schemeClr val="tx1"/>
-                </a:solidFill>
-                <a:latin typeface="+mn-lt"/>
-                <a:ea typeface="+mn-ea"/>
-                <a:cs typeface="+mn-cs"/>
-              </a:defRPr>
-            </a:lvl3pPr>
-            <a:lvl4pPr marL="1371600" indent="-228600" algn="l" rtl="0" eaLnBrk="1" latinLnBrk="0" hangingPunct="1">
-              <a:spcBef>
-                <a:spcPts val="400"/>
-              </a:spcBef>
-              <a:buClr>
-                <a:schemeClr val="accent3"/>
-              </a:buClr>
-              <a:buSzPct val="75000"/>
-              <a:buFont typeface="Wingdings"/>
-              <a:buChar char=""/>
-              <a:defRPr kumimoji="0" sz="2000" kern="1200">
-                <a:solidFill>
-                  <a:schemeClr val="tx1"/>
-                </a:solidFill>
-                <a:latin typeface="+mn-lt"/>
-                <a:ea typeface="+mn-ea"/>
-                <a:cs typeface="+mn-cs"/>
-              </a:defRPr>
-            </a:lvl4pPr>
-            <a:lvl5pPr marL="1828800" indent="-228600" algn="l" rtl="0" eaLnBrk="1" latinLnBrk="0" hangingPunct="1">
-              <a:spcBef>
-                <a:spcPts val="400"/>
-              </a:spcBef>
-              <a:buClr>
-                <a:schemeClr val="accent4"/>
-              </a:buClr>
-              <a:buSzPct val="65000"/>
-              <a:buFont typeface="Wingdings"/>
-              <a:buChar char=""/>
-              <a:defRPr kumimoji="0" sz="2000" kern="1200">
-                <a:solidFill>
-                  <a:schemeClr val="tx1"/>
-                </a:solidFill>
-                <a:latin typeface="+mn-lt"/>
-                <a:ea typeface="+mn-ea"/>
-                <a:cs typeface="+mn-cs"/>
-              </a:defRPr>
-            </a:lvl5pPr>
-            <a:lvl6pPr marL="2103120" indent="-228600" algn="l" rtl="0" eaLnBrk="1" latinLnBrk="0" hangingPunct="1">
-              <a:spcBef>
-                <a:spcPct val="20000"/>
-              </a:spcBef>
-              <a:buClr>
-                <a:schemeClr val="accent1"/>
-              </a:buClr>
-              <a:buFont typeface="Wingdings"/>
-              <a:buChar char="§"/>
-              <a:defRPr kumimoji="0" sz="1800" kern="1200" baseline="0">
-                <a:solidFill>
-                  <a:schemeClr val="tx1"/>
-                </a:solidFill>
-                <a:latin typeface="+mn-lt"/>
-                <a:ea typeface="+mn-ea"/>
-                <a:cs typeface="+mn-cs"/>
-              </a:defRPr>
-            </a:lvl6pPr>
-            <a:lvl7pPr marL="2377440" indent="-228600" algn="l" rtl="0" eaLnBrk="1" latinLnBrk="0" hangingPunct="1">
-              <a:spcBef>
-                <a:spcPct val="20000"/>
-              </a:spcBef>
-              <a:buClr>
-                <a:schemeClr val="accent2"/>
-              </a:buClr>
-              <a:buFont typeface="Wingdings"/>
-              <a:buChar char="§"/>
-              <a:defRPr kumimoji="0" sz="1800" kern="1200" baseline="0">
-                <a:solidFill>
-                  <a:schemeClr val="tx1"/>
-                </a:solidFill>
-                <a:latin typeface="+mn-lt"/>
-                <a:ea typeface="+mn-ea"/>
-                <a:cs typeface="+mn-cs"/>
-              </a:defRPr>
-            </a:lvl7pPr>
-            <a:lvl8pPr marL="2651760" indent="-228600" algn="l" rtl="0" eaLnBrk="1" latinLnBrk="0" hangingPunct="1">
-              <a:spcBef>
-                <a:spcPct val="20000"/>
-              </a:spcBef>
-              <a:buClr>
-                <a:schemeClr val="accent3"/>
-              </a:buClr>
-              <a:buFont typeface="Wingdings"/>
-              <a:buChar char="§"/>
-              <a:defRPr kumimoji="0" sz="1800" kern="1200" baseline="0">
-                <a:solidFill>
-                  <a:schemeClr val="tx1"/>
-                </a:solidFill>
-                <a:latin typeface="+mn-lt"/>
-                <a:ea typeface="+mn-ea"/>
-                <a:cs typeface="+mn-cs"/>
-              </a:defRPr>
-            </a:lvl8pPr>
-            <a:lvl9pPr marL="2926080" indent="-228600" algn="l" rtl="0" eaLnBrk="1" latinLnBrk="0" hangingPunct="1">
-              <a:spcBef>
-                <a:spcPct val="20000"/>
-              </a:spcBef>
-              <a:buClr>
-                <a:schemeClr val="accent4"/>
-              </a:buClr>
-              <a:buFont typeface="Wingdings"/>
-              <a:buChar char="§"/>
-              <a:defRPr kumimoji="0" sz="1800" kern="1200" baseline="0">
-                <a:solidFill>
-                  <a:schemeClr val="tx1"/>
-                </a:solidFill>
-                <a:latin typeface="+mn-lt"/>
-                <a:ea typeface="+mn-ea"/>
-                <a:cs typeface="+mn-cs"/>
-              </a:defRPr>
-            </a:lvl9pPr>
-          </a:lstStyle>
-          <a:p>
-            <a:r>
-              <a:rPr lang="en-US" sz="2400" dirty="0" smtClean="0"/>
-              <a:t>Naming Conventions:</a:t>
-            </a:r>
-          </a:p>
-          <a:p>
-            <a:pPr lvl="1"/>
-            <a:r>
-              <a:rPr lang="en-US" sz="2400" dirty="0" smtClean="0"/>
-              <a:t>Building the directive, use “camelCase” (</a:t>
-            </a:r>
-            <a:r>
-              <a:rPr lang="en-US" sz="2400" dirty="0" err="1" smtClean="0"/>
-              <a:t>myCustom</a:t>
-            </a:r>
-            <a:r>
-              <a:rPr lang="en-US" sz="2400" dirty="0" smtClean="0"/>
-              <a:t>)</a:t>
-            </a:r>
-          </a:p>
-          <a:p>
-            <a:pPr lvl="1"/>
-            <a:r>
-              <a:rPr lang="en-US" sz="2400" dirty="0" smtClean="0"/>
-              <a:t>From within the HTML DOM:</a:t>
-            </a:r>
-          </a:p>
-          <a:p>
-            <a:pPr marL="685800" lvl="2" indent="0">
-              <a:buNone/>
-            </a:pPr>
-            <a:r>
-              <a:rPr lang="en-US" sz="2100" dirty="0" smtClean="0"/>
-              <a:t>1. my-custom *	3. my:custom	5. data-my-custom</a:t>
-            </a:r>
-          </a:p>
-          <a:p>
-            <a:pPr marL="685800" lvl="2" indent="0">
-              <a:buNone/>
-            </a:pPr>
-            <a:r>
-              <a:rPr lang="en-US" sz="2100" dirty="0" smtClean="0"/>
-              <a:t>2. my_custom	4. x-my-custom   </a:t>
-            </a:r>
-          </a:p>
-          <a:p>
-            <a:pPr marL="685800" lvl="2" indent="0">
-              <a:buNone/>
-            </a:pPr>
-            <a:endParaRPr lang="en-US" sz="1800" dirty="0" smtClean="0"/>
-          </a:p>
-          <a:p>
-            <a:pPr marL="685800" lvl="2" indent="0">
-              <a:buNone/>
-            </a:pPr>
-            <a:r>
-              <a:rPr lang="en-US" sz="1800" dirty="0" smtClean="0"/>
-              <a:t>* </a:t>
-            </a:r>
-            <a:r>
-              <a:rPr lang="en-US" sz="1800" i="1" dirty="0"/>
-              <a:t>The “-” is the </a:t>
-            </a:r>
-            <a:r>
-              <a:rPr lang="en-US" sz="1800" i="1" dirty="0" smtClean="0"/>
-              <a:t>preferred method (in my opinion and AngularJS). </a:t>
-            </a:r>
-          </a:p>
-          <a:p>
-            <a:pPr marL="685800" lvl="2" indent="0">
-              <a:buNone/>
-            </a:pPr>
-            <a:r>
-              <a:rPr lang="en-US" sz="1800" i="1" dirty="0" smtClean="0"/>
-              <a:t>If </a:t>
-            </a:r>
-            <a:r>
-              <a:rPr lang="en-US" sz="1800" i="1" dirty="0"/>
-              <a:t>you want to be HTML5 </a:t>
-            </a:r>
-            <a:r>
-              <a:rPr lang="en-US" sz="1800" i="1" dirty="0" smtClean="0"/>
-              <a:t>compliant, then add the “x-” or “data-” to your directive</a:t>
-            </a:r>
-            <a:endParaRPr lang="en-US" sz="2000" i="1" dirty="0" smtClean="0"/>
+            <a:endParaRPr lang="en-US" dirty="0"/>
           </a:p>
         </p:txBody>
       </p:sp>
     </p:spTree>
     <p:extLst>
       <p:ext uri="{BB962C8B-B14F-4D97-AF65-F5344CB8AC3E}">
-        <p14:creationId xmlns:p14="http://schemas.microsoft.com/office/powerpoint/2010/main" val="3639178047"/>
+        <p14:creationId xmlns:p14="http://schemas.microsoft.com/office/powerpoint/2010/main" val="3630856592"/>
       </p:ext>
     </p:extLst>
   </p:cSld>
   <p:clrMapOvr>
     <a:masterClrMapping/>
   </p:clrMapOvr>
+  <p:timing>
+    <p:tnLst>
+      <p:par>
+        <p:cTn xmlns:p14="http://schemas.microsoft.com/office/powerpoint/2010/main" id="1" dur="indefinite" restart="never" nodeType="tmRoot">
+          <p:childTnLst>
+            <p:seq concurrent="1" nextAc="seek">
+              <p:cTn id="2" dur="indefinite" nodeType="mainSeq">
+                <p:childTnLst>
+                  <p:par>
+                    <p:cTn id="3" fill="hold">
+                      <p:stCondLst>
+                        <p:cond delay="indefinite"/>
+                      </p:stCondLst>
+                      <p:childTnLst>
+                        <p:par>
+                          <p:cTn id="4" fill="hold">
+                            <p:stCondLst>
+                              <p:cond delay="0"/>
+                            </p:stCondLst>
+                            <p:childTnLst>
+                              <p:par>
+                                <p:cTn id="5" presetID="9" presetClass="entr" presetSubtype="0" fill="hold" nodeType="clickEffect">
+                                  <p:stCondLst>
+                                    <p:cond delay="0"/>
+                                  </p:stCondLst>
+                                  <p:childTnLst>
+                                    <p:set>
+                                      <p:cBhvr>
+                                        <p:cTn id="6" dur="1" fill="hold">
+                                          <p:stCondLst>
+                                            <p:cond delay="0"/>
+                                          </p:stCondLst>
+                                        </p:cTn>
+                                        <p:tgtEl>
+                                          <p:spTgt spid="3">
+                                            <p:txEl>
+                                              <p:pRg st="0" end="0"/>
+                                            </p:txEl>
+                                          </p:spTgt>
+                                        </p:tgtEl>
+                                        <p:attrNameLst>
+                                          <p:attrName>style.visibility</p:attrName>
+                                        </p:attrNameLst>
+                                      </p:cBhvr>
+                                      <p:to>
+                                        <p:strVal val="visible"/>
+                                      </p:to>
+                                    </p:set>
+                                    <p:animEffect transition="in" filter="dissolve">
+                                      <p:cBhvr>
+                                        <p:cTn id="7" dur="500"/>
+                                        <p:tgtEl>
+                                          <p:spTgt spid="3">
+                                            <p:txEl>
+                                              <p:pRg st="0" end="0"/>
+                                            </p:txEl>
+                                          </p:spTgt>
+                                        </p:tgtEl>
+                                      </p:cBhvr>
+                                    </p:animEffect>
+                                  </p:childTnLst>
+                                </p:cTn>
+                              </p:par>
+                            </p:childTnLst>
+                          </p:cTn>
+                        </p:par>
+                      </p:childTnLst>
+                    </p:cTn>
+                  </p:par>
+                  <p:par>
+                    <p:cTn id="8" fill="hold">
+                      <p:stCondLst>
+                        <p:cond delay="indefinite"/>
+                      </p:stCondLst>
+                      <p:childTnLst>
+                        <p:par>
+                          <p:cTn id="9" fill="hold">
+                            <p:stCondLst>
+                              <p:cond delay="0"/>
+                            </p:stCondLst>
+                            <p:childTnLst>
+                              <p:par>
+                                <p:cTn id="10" presetID="9" presetClass="entr" presetSubtype="0" fill="hold" nodeType="clickEffect">
+                                  <p:stCondLst>
+                                    <p:cond delay="0"/>
+                                  </p:stCondLst>
+                                  <p:childTnLst>
+                                    <p:set>
+                                      <p:cBhvr>
+                                        <p:cTn id="11" dur="1" fill="hold">
+                                          <p:stCondLst>
+                                            <p:cond delay="0"/>
+                                          </p:stCondLst>
+                                        </p:cTn>
+                                        <p:tgtEl>
+                                          <p:spTgt spid="3">
+                                            <p:txEl>
+                                              <p:pRg st="1" end="1"/>
+                                            </p:txEl>
+                                          </p:spTgt>
+                                        </p:tgtEl>
+                                        <p:attrNameLst>
+                                          <p:attrName>style.visibility</p:attrName>
+                                        </p:attrNameLst>
+                                      </p:cBhvr>
+                                      <p:to>
+                                        <p:strVal val="visible"/>
+                                      </p:to>
+                                    </p:set>
+                                    <p:animEffect transition="in" filter="dissolve">
+                                      <p:cBhvr>
+                                        <p:cTn id="12" dur="500"/>
+                                        <p:tgtEl>
+                                          <p:spTgt spid="3">
+                                            <p:txEl>
+                                              <p:pRg st="1" end="1"/>
+                                            </p:txEl>
+                                          </p:spTgt>
+                                        </p:tgtEl>
+                                      </p:cBhvr>
+                                    </p:animEffect>
+                                  </p:childTnLst>
+                                </p:cTn>
+                              </p:par>
+                            </p:childTnLst>
+                          </p:cTn>
+                        </p:par>
+                      </p:childTnLst>
+                    </p:cTn>
+                  </p:par>
+                </p:childTnLst>
+              </p:cTn>
+              <p:prevCondLst>
+                <p:cond evt="onPrev" delay="0">
+                  <p:tgtEl>
+                    <p:sldTgt/>
+                  </p:tgtEl>
+                </p:cond>
+              </p:prevCondLst>
+              <p:nextCondLst>
+                <p:cond evt="onNext" delay="0">
+                  <p:tgtEl>
+                    <p:sldTgt/>
+                  </p:tgtEl>
+                </p:cond>
+              </p:nextCondLst>
+            </p:seq>
+          </p:childTnLst>
+        </p:cTn>
+      </p:par>
+    </p:tnLst>
+  </p:timing>
 </p:sld>
 </file>
 
@@ -5747,9 +8060,18 @@
           <a:lstStyle/>
           <a:p>
             <a:r>
+              <a:rPr lang="en-US" dirty="0" smtClean="0"/>
+              <a:t>Inside </a:t>
+            </a:r>
+            <a:r>
               <a:rPr lang="en-US" dirty="0"/>
-              <a:t>Writing Basic Custom Directives</a:t>
-            </a:r>
+              <a:t>A </a:t>
+            </a:r>
+            <a:r>
+              <a:rPr lang="en-US" dirty="0" smtClean="0"/>
+              <a:t>Directive: Overview</a:t>
+            </a:r>
+            <a:endParaRPr lang="en-US" dirty="0"/>
           </a:p>
         </p:txBody>
       </p:sp>
@@ -5824,8 +8146,8 @@
         </p:nvSpPr>
         <p:spPr>
           <a:xfrm>
-            <a:off x="579105" y="4663295"/>
-            <a:ext cx="5799641" cy="1922327"/>
+            <a:off x="1197733" y="4663295"/>
+            <a:ext cx="6728973" cy="1922327"/>
           </a:xfrm>
           <a:prstGeom prst="rect">
             <a:avLst/>
@@ -6029,6 +8351,193 @@
   <p:clrMapOvr>
     <a:masterClrMapping/>
   </p:clrMapOvr>
+  <p:timing>
+    <p:tnLst>
+      <p:par>
+        <p:cTn xmlns:p14="http://schemas.microsoft.com/office/powerpoint/2010/main" id="1" dur="indefinite" restart="never" nodeType="tmRoot">
+          <p:childTnLst>
+            <p:seq concurrent="1" nextAc="seek">
+              <p:cTn id="2" dur="indefinite" nodeType="mainSeq">
+                <p:childTnLst>
+                  <p:par>
+                    <p:cTn id="3" fill="hold">
+                      <p:stCondLst>
+                        <p:cond delay="indefinite"/>
+                      </p:stCondLst>
+                      <p:childTnLst>
+                        <p:par>
+                          <p:cTn id="4" fill="hold">
+                            <p:stCondLst>
+                              <p:cond delay="0"/>
+                            </p:stCondLst>
+                            <p:childTnLst>
+                              <p:par>
+                                <p:cTn id="5" presetID="16" presetClass="entr" presetSubtype="21" fill="hold" nodeType="clickEffect">
+                                  <p:stCondLst>
+                                    <p:cond delay="0"/>
+                                  </p:stCondLst>
+                                  <p:childTnLst>
+                                    <p:set>
+                                      <p:cBhvr>
+                                        <p:cTn id="6" dur="1" fill="hold">
+                                          <p:stCondLst>
+                                            <p:cond delay="0"/>
+                                          </p:stCondLst>
+                                        </p:cTn>
+                                        <p:tgtEl>
+                                          <p:spTgt spid="4"/>
+                                        </p:tgtEl>
+                                        <p:attrNameLst>
+                                          <p:attrName>style.visibility</p:attrName>
+                                        </p:attrNameLst>
+                                      </p:cBhvr>
+                                      <p:to>
+                                        <p:strVal val="visible"/>
+                                      </p:to>
+                                    </p:set>
+                                    <p:animEffect transition="in" filter="barn(inVertical)">
+                                      <p:cBhvr>
+                                        <p:cTn id="7" dur="500"/>
+                                        <p:tgtEl>
+                                          <p:spTgt spid="4"/>
+                                        </p:tgtEl>
+                                      </p:cBhvr>
+                                    </p:animEffect>
+                                  </p:childTnLst>
+                                </p:cTn>
+                              </p:par>
+                            </p:childTnLst>
+                          </p:cTn>
+                        </p:par>
+                      </p:childTnLst>
+                    </p:cTn>
+                  </p:par>
+                  <p:par>
+                    <p:cTn id="8" fill="hold">
+                      <p:stCondLst>
+                        <p:cond delay="indefinite"/>
+                      </p:stCondLst>
+                      <p:childTnLst>
+                        <p:par>
+                          <p:cTn id="9" fill="hold">
+                            <p:stCondLst>
+                              <p:cond delay="0"/>
+                            </p:stCondLst>
+                            <p:childTnLst>
+                              <p:par>
+                                <p:cTn id="10" presetID="9" presetClass="entr" presetSubtype="0" fill="hold" nodeType="clickEffect">
+                                  <p:stCondLst>
+                                    <p:cond delay="0"/>
+                                  </p:stCondLst>
+                                  <p:childTnLst>
+                                    <p:set>
+                                      <p:cBhvr>
+                                        <p:cTn id="11" dur="1" fill="hold">
+                                          <p:stCondLst>
+                                            <p:cond delay="0"/>
+                                          </p:stCondLst>
+                                        </p:cTn>
+                                        <p:tgtEl>
+                                          <p:spTgt spid="9">
+                                            <p:txEl>
+                                              <p:pRg st="0" end="0"/>
+                                            </p:txEl>
+                                          </p:spTgt>
+                                        </p:tgtEl>
+                                        <p:attrNameLst>
+                                          <p:attrName>style.visibility</p:attrName>
+                                        </p:attrNameLst>
+                                      </p:cBhvr>
+                                      <p:to>
+                                        <p:strVal val="visible"/>
+                                      </p:to>
+                                    </p:set>
+                                    <p:animEffect transition="in" filter="dissolve">
+                                      <p:cBhvr>
+                                        <p:cTn id="12" dur="500"/>
+                                        <p:tgtEl>
+                                          <p:spTgt spid="9">
+                                            <p:txEl>
+                                              <p:pRg st="0" end="0"/>
+                                            </p:txEl>
+                                          </p:spTgt>
+                                        </p:tgtEl>
+                                      </p:cBhvr>
+                                    </p:animEffect>
+                                  </p:childTnLst>
+                                </p:cTn>
+                              </p:par>
+                              <p:par>
+                                <p:cTn id="13" presetID="9" presetClass="entr" presetSubtype="0" fill="hold" nodeType="withEffect">
+                                  <p:stCondLst>
+                                    <p:cond delay="0"/>
+                                  </p:stCondLst>
+                                  <p:childTnLst>
+                                    <p:set>
+                                      <p:cBhvr>
+                                        <p:cTn id="14" dur="1" fill="hold">
+                                          <p:stCondLst>
+                                            <p:cond delay="0"/>
+                                          </p:stCondLst>
+                                        </p:cTn>
+                                        <p:tgtEl>
+                                          <p:spTgt spid="9">
+                                            <p:txEl>
+                                              <p:pRg st="1" end="1"/>
+                                            </p:txEl>
+                                          </p:spTgt>
+                                        </p:tgtEl>
+                                        <p:attrNameLst>
+                                          <p:attrName>style.visibility</p:attrName>
+                                        </p:attrNameLst>
+                                      </p:cBhvr>
+                                      <p:to>
+                                        <p:strVal val="visible"/>
+                                      </p:to>
+                                    </p:set>
+                                    <p:animEffect transition="in" filter="dissolve">
+                                      <p:cBhvr>
+                                        <p:cTn id="15" dur="500"/>
+                                        <p:tgtEl>
+                                          <p:spTgt spid="9">
+                                            <p:txEl>
+                                              <p:pRg st="1" end="1"/>
+                                            </p:txEl>
+                                          </p:spTgt>
+                                        </p:tgtEl>
+                                      </p:cBhvr>
+                                    </p:animEffect>
+                                  </p:childTnLst>
+                                </p:cTn>
+                              </p:par>
+                            </p:childTnLst>
+                          </p:cTn>
+                        </p:par>
+                      </p:childTnLst>
+                    </p:cTn>
+                  </p:par>
+                </p:childTnLst>
+              </p:cTn>
+              <p:prevCondLst>
+                <p:cond evt="onPrev" delay="0">
+                  <p:tgtEl>
+                    <p:sldTgt/>
+                  </p:tgtEl>
+                </p:cond>
+              </p:prevCondLst>
+              <p:nextCondLst>
+                <p:cond evt="onNext" delay="0">
+                  <p:tgtEl>
+                    <p:sldTgt/>
+                  </p:tgtEl>
+                </p:cond>
+              </p:nextCondLst>
+            </p:seq>
+          </p:childTnLst>
+        </p:cTn>
+      </p:par>
+    </p:tnLst>
+  </p:timing>
 </p:sld>
 </file>
 
@@ -6066,8 +8575,406 @@
           <a:p>
             <a:r>
               <a:rPr lang="en-US" dirty="0"/>
-              <a:t>Writing Basic Custom Directives</a:t>
-            </a:r>
+              <a:t>Inside A Directive: </a:t>
+            </a:r>
+            <a:r>
+              <a:rPr lang="en-US" dirty="0" smtClean="0"/>
+              <a:t>Naming</a:t>
+            </a:r>
+            <a:endParaRPr lang="en-US" dirty="0"/>
+          </a:p>
+        </p:txBody>
+      </p:sp>
+      <p:sp>
+        <p:nvSpPr>
+          <p:cNvPr id="4" name="Content Placeholder 2"/>
+          <p:cNvSpPr txBox="1">
+            <a:spLocks/>
+          </p:cNvSpPr>
+          <p:nvPr/>
+        </p:nvSpPr>
+        <p:spPr>
+          <a:xfrm>
+            <a:off x="612648" y="1614160"/>
+            <a:ext cx="8153400" cy="3237226"/>
+          </a:xfrm>
+          <a:prstGeom prst="rect">
+            <a:avLst/>
+          </a:prstGeom>
+        </p:spPr>
+        <p:txBody>
+          <a:bodyPr vert="horz">
+            <a:normAutofit/>
+          </a:bodyPr>
+          <a:lstStyle>
+            <a:lvl1pPr marL="320040" indent="-320040" algn="l" rtl="0" eaLnBrk="1" latinLnBrk="0" hangingPunct="1">
+              <a:spcBef>
+                <a:spcPts val="700"/>
+              </a:spcBef>
+              <a:buClr>
+                <a:schemeClr val="accent2"/>
+              </a:buClr>
+              <a:buSzPct val="60000"/>
+              <a:buFont typeface="Wingdings"/>
+              <a:buChar char=""/>
+              <a:defRPr kumimoji="0" sz="2900" kern="1200">
+                <a:solidFill>
+                  <a:schemeClr val="tx1"/>
+                </a:solidFill>
+                <a:latin typeface="+mn-lt"/>
+                <a:ea typeface="+mn-ea"/>
+                <a:cs typeface="+mn-cs"/>
+              </a:defRPr>
+            </a:lvl1pPr>
+            <a:lvl2pPr marL="640080" indent="-274320" algn="l" rtl="0" eaLnBrk="1" latinLnBrk="0" hangingPunct="1">
+              <a:spcBef>
+                <a:spcPts val="550"/>
+              </a:spcBef>
+              <a:buClr>
+                <a:schemeClr val="accent1"/>
+              </a:buClr>
+              <a:buSzPct val="70000"/>
+              <a:buFont typeface="Wingdings 2"/>
+              <a:buChar char=""/>
+              <a:defRPr kumimoji="0" sz="2600" kern="1200">
+                <a:solidFill>
+                  <a:schemeClr val="tx1"/>
+                </a:solidFill>
+                <a:latin typeface="+mn-lt"/>
+                <a:ea typeface="+mn-ea"/>
+                <a:cs typeface="+mn-cs"/>
+              </a:defRPr>
+            </a:lvl2pPr>
+            <a:lvl3pPr marL="914400" indent="-228600" algn="l" rtl="0" eaLnBrk="1" latinLnBrk="0" hangingPunct="1">
+              <a:spcBef>
+                <a:spcPts val="500"/>
+              </a:spcBef>
+              <a:buClr>
+                <a:schemeClr val="accent2"/>
+              </a:buClr>
+              <a:buSzPct val="75000"/>
+              <a:buFont typeface="Wingdings"/>
+              <a:buChar char=""/>
+              <a:defRPr kumimoji="0" sz="2300" kern="1200">
+                <a:solidFill>
+                  <a:schemeClr val="tx1"/>
+                </a:solidFill>
+                <a:latin typeface="+mn-lt"/>
+                <a:ea typeface="+mn-ea"/>
+                <a:cs typeface="+mn-cs"/>
+              </a:defRPr>
+            </a:lvl3pPr>
+            <a:lvl4pPr marL="1371600" indent="-228600" algn="l" rtl="0" eaLnBrk="1" latinLnBrk="0" hangingPunct="1">
+              <a:spcBef>
+                <a:spcPts val="400"/>
+              </a:spcBef>
+              <a:buClr>
+                <a:schemeClr val="accent3"/>
+              </a:buClr>
+              <a:buSzPct val="75000"/>
+              <a:buFont typeface="Wingdings"/>
+              <a:buChar char=""/>
+              <a:defRPr kumimoji="0" sz="2000" kern="1200">
+                <a:solidFill>
+                  <a:schemeClr val="tx1"/>
+                </a:solidFill>
+                <a:latin typeface="+mn-lt"/>
+                <a:ea typeface="+mn-ea"/>
+                <a:cs typeface="+mn-cs"/>
+              </a:defRPr>
+            </a:lvl4pPr>
+            <a:lvl5pPr marL="1828800" indent="-228600" algn="l" rtl="0" eaLnBrk="1" latinLnBrk="0" hangingPunct="1">
+              <a:spcBef>
+                <a:spcPts val="400"/>
+              </a:spcBef>
+              <a:buClr>
+                <a:schemeClr val="accent4"/>
+              </a:buClr>
+              <a:buSzPct val="65000"/>
+              <a:buFont typeface="Wingdings"/>
+              <a:buChar char=""/>
+              <a:defRPr kumimoji="0" sz="2000" kern="1200">
+                <a:solidFill>
+                  <a:schemeClr val="tx1"/>
+                </a:solidFill>
+                <a:latin typeface="+mn-lt"/>
+                <a:ea typeface="+mn-ea"/>
+                <a:cs typeface="+mn-cs"/>
+              </a:defRPr>
+            </a:lvl5pPr>
+            <a:lvl6pPr marL="2103120" indent="-228600" algn="l" rtl="0" eaLnBrk="1" latinLnBrk="0" hangingPunct="1">
+              <a:spcBef>
+                <a:spcPct val="20000"/>
+              </a:spcBef>
+              <a:buClr>
+                <a:schemeClr val="accent1"/>
+              </a:buClr>
+              <a:buFont typeface="Wingdings"/>
+              <a:buChar char="§"/>
+              <a:defRPr kumimoji="0" sz="1800" kern="1200" baseline="0">
+                <a:solidFill>
+                  <a:schemeClr val="tx1"/>
+                </a:solidFill>
+                <a:latin typeface="+mn-lt"/>
+                <a:ea typeface="+mn-ea"/>
+                <a:cs typeface="+mn-cs"/>
+              </a:defRPr>
+            </a:lvl6pPr>
+            <a:lvl7pPr marL="2377440" indent="-228600" algn="l" rtl="0" eaLnBrk="1" latinLnBrk="0" hangingPunct="1">
+              <a:spcBef>
+                <a:spcPct val="20000"/>
+              </a:spcBef>
+              <a:buClr>
+                <a:schemeClr val="accent2"/>
+              </a:buClr>
+              <a:buFont typeface="Wingdings"/>
+              <a:buChar char="§"/>
+              <a:defRPr kumimoji="0" sz="1800" kern="1200" baseline="0">
+                <a:solidFill>
+                  <a:schemeClr val="tx1"/>
+                </a:solidFill>
+                <a:latin typeface="+mn-lt"/>
+                <a:ea typeface="+mn-ea"/>
+                <a:cs typeface="+mn-cs"/>
+              </a:defRPr>
+            </a:lvl7pPr>
+            <a:lvl8pPr marL="2651760" indent="-228600" algn="l" rtl="0" eaLnBrk="1" latinLnBrk="0" hangingPunct="1">
+              <a:spcBef>
+                <a:spcPct val="20000"/>
+              </a:spcBef>
+              <a:buClr>
+                <a:schemeClr val="accent3"/>
+              </a:buClr>
+              <a:buFont typeface="Wingdings"/>
+              <a:buChar char="§"/>
+              <a:defRPr kumimoji="0" sz="1800" kern="1200" baseline="0">
+                <a:solidFill>
+                  <a:schemeClr val="tx1"/>
+                </a:solidFill>
+                <a:latin typeface="+mn-lt"/>
+                <a:ea typeface="+mn-ea"/>
+                <a:cs typeface="+mn-cs"/>
+              </a:defRPr>
+            </a:lvl8pPr>
+            <a:lvl9pPr marL="2926080" indent="-228600" algn="l" rtl="0" eaLnBrk="1" latinLnBrk="0" hangingPunct="1">
+              <a:spcBef>
+                <a:spcPct val="20000"/>
+              </a:spcBef>
+              <a:buClr>
+                <a:schemeClr val="accent4"/>
+              </a:buClr>
+              <a:buFont typeface="Wingdings"/>
+              <a:buChar char="§"/>
+              <a:defRPr kumimoji="0" sz="1800" kern="1200" baseline="0">
+                <a:solidFill>
+                  <a:schemeClr val="tx1"/>
+                </a:solidFill>
+                <a:latin typeface="+mn-lt"/>
+                <a:ea typeface="+mn-ea"/>
+                <a:cs typeface="+mn-cs"/>
+              </a:defRPr>
+            </a:lvl9pPr>
+          </a:lstStyle>
+          <a:p>
+            <a:r>
+              <a:rPr lang="en-US" sz="2800" dirty="0" smtClean="0"/>
+              <a:t>Naming Conventions:</a:t>
+            </a:r>
+          </a:p>
+          <a:p>
+            <a:pPr lvl="1"/>
+            <a:r>
+              <a:rPr lang="en-US" sz="2400" dirty="0" smtClean="0"/>
+              <a:t>Building the directive, use “camelCase” (</a:t>
+            </a:r>
+            <a:r>
+              <a:rPr lang="en-US" sz="2400" dirty="0" err="1" smtClean="0"/>
+              <a:t>myCustom</a:t>
+            </a:r>
+            <a:r>
+              <a:rPr lang="en-US" sz="2400" dirty="0" smtClean="0"/>
+              <a:t>)</a:t>
+            </a:r>
+          </a:p>
+          <a:p>
+            <a:pPr lvl="1"/>
+            <a:r>
+              <a:rPr lang="en-US" sz="2400" dirty="0" smtClean="0"/>
+              <a:t>From within the HTML DOM:</a:t>
+            </a:r>
+          </a:p>
+          <a:p>
+            <a:pPr marL="685800" lvl="2" indent="0">
+              <a:buNone/>
+            </a:pPr>
+            <a:r>
+              <a:rPr lang="en-US" sz="2100" dirty="0" smtClean="0"/>
+              <a:t>1. my-custom *	3. my:custom	5. data-my-custom</a:t>
+            </a:r>
+          </a:p>
+          <a:p>
+            <a:pPr marL="685800" lvl="2" indent="0">
+              <a:buNone/>
+            </a:pPr>
+            <a:r>
+              <a:rPr lang="en-US" sz="2100" dirty="0" smtClean="0"/>
+              <a:t>2. my_custom	4. x-my-custom   </a:t>
+            </a:r>
+          </a:p>
+          <a:p>
+            <a:pPr marL="685800" lvl="2" indent="0">
+              <a:buNone/>
+            </a:pPr>
+            <a:endParaRPr lang="en-US" sz="1800" dirty="0" smtClean="0"/>
+          </a:p>
+          <a:p>
+            <a:pPr marL="685800" lvl="2" indent="0">
+              <a:buNone/>
+            </a:pPr>
+            <a:r>
+              <a:rPr lang="en-US" sz="1800" dirty="0" smtClean="0"/>
+              <a:t>* </a:t>
+            </a:r>
+            <a:r>
+              <a:rPr lang="en-US" sz="1800" i="1" dirty="0"/>
+              <a:t>The “-” is the </a:t>
+            </a:r>
+            <a:r>
+              <a:rPr lang="en-US" sz="1800" i="1" dirty="0" smtClean="0"/>
+              <a:t>preferred method (in my opinion and AngularJS). </a:t>
+            </a:r>
+          </a:p>
+          <a:p>
+            <a:pPr marL="685800" lvl="2" indent="0">
+              <a:buNone/>
+            </a:pPr>
+            <a:r>
+              <a:rPr lang="en-US" sz="1800" i="1" dirty="0" smtClean="0">
+                <a:solidFill>
+                  <a:srgbClr val="008000"/>
+                </a:solidFill>
+              </a:rPr>
+              <a:t>If </a:t>
+            </a:r>
+            <a:r>
+              <a:rPr lang="en-US" sz="1800" i="1" dirty="0">
+                <a:solidFill>
+                  <a:srgbClr val="008000"/>
+                </a:solidFill>
+              </a:rPr>
+              <a:t>you want to be HTML5 </a:t>
+            </a:r>
+            <a:r>
+              <a:rPr lang="en-US" sz="1800" i="1" dirty="0" smtClean="0">
+                <a:solidFill>
+                  <a:srgbClr val="008000"/>
+                </a:solidFill>
+              </a:rPr>
+              <a:t>compliant, then add the “x-” or “data-” to your directive</a:t>
+            </a:r>
+            <a:endParaRPr lang="en-US" sz="2000" i="1" dirty="0" smtClean="0">
+              <a:solidFill>
+                <a:srgbClr val="008000"/>
+              </a:solidFill>
+            </a:endParaRPr>
+          </a:p>
+        </p:txBody>
+      </p:sp>
+      <p:sp>
+        <p:nvSpPr>
+          <p:cNvPr id="5" name="TextBox 4"/>
+          <p:cNvSpPr txBox="1"/>
+          <p:nvPr/>
+        </p:nvSpPr>
+        <p:spPr>
+          <a:xfrm>
+            <a:off x="612648" y="5140302"/>
+            <a:ext cx="7904928" cy="369332"/>
+          </a:xfrm>
+          <a:prstGeom prst="rect">
+            <a:avLst/>
+          </a:prstGeom>
+          <a:noFill/>
+        </p:spPr>
+        <p:txBody>
+          <a:bodyPr wrap="none" rtlCol="0">
+            <a:spAutoFit/>
+          </a:bodyPr>
+          <a:lstStyle/>
+          <a:p>
+            <a:r>
+              <a:rPr lang="en-US" dirty="0" smtClean="0"/>
+              <a:t>If the name of your directive is a single work like “event”, then just keep it lowercase</a:t>
+            </a:r>
+            <a:endParaRPr lang="en-US" dirty="0"/>
+          </a:p>
+        </p:txBody>
+      </p:sp>
+    </p:spTree>
+    <p:extLst>
+      <p:ext uri="{BB962C8B-B14F-4D97-AF65-F5344CB8AC3E}">
+        <p14:creationId xmlns:p14="http://schemas.microsoft.com/office/powerpoint/2010/main" val="601686587"/>
+      </p:ext>
+    </p:extLst>
+  </p:cSld>
+  <p:clrMapOvr>
+    <a:masterClrMapping/>
+  </p:clrMapOvr>
+  <p:timing>
+    <p:tnLst>
+      <p:par>
+        <p:cTn xmlns:p14="http://schemas.microsoft.com/office/powerpoint/2010/main" id="1" dur="indefinite" restart="never" nodeType="tmRoot"/>
+      </p:par>
+    </p:tnLst>
+  </p:timing>
+</p:sld>
+</file>
+
+<file path=ppt/slides/slide9.xml><?xml version="1.0" encoding="utf-8"?>
+<p:sld xmlns:a="http://schemas.openxmlformats.org/drawingml/2006/main" xmlns:r="http://schemas.openxmlformats.org/officeDocument/2006/relationships" xmlns:p="http://schemas.openxmlformats.org/presentationml/2006/main">
+  <p:cSld>
+    <p:spTree>
+      <p:nvGrpSpPr>
+        <p:cNvPr id="1" name=""/>
+        <p:cNvGrpSpPr/>
+        <p:nvPr/>
+      </p:nvGrpSpPr>
+      <p:grpSpPr>
+        <a:xfrm>
+          <a:off x="0" y="0"/>
+          <a:ext cx="0" cy="0"/>
+          <a:chOff x="0" y="0"/>
+          <a:chExt cx="0" cy="0"/>
+        </a:xfrm>
+      </p:grpSpPr>
+      <p:sp>
+        <p:nvSpPr>
+          <p:cNvPr id="2" name="Title 1"/>
+          <p:cNvSpPr>
+            <a:spLocks noGrp="1"/>
+          </p:cNvSpPr>
+          <p:nvPr>
+            <p:ph type="title"/>
+          </p:nvPr>
+        </p:nvSpPr>
+        <p:spPr/>
+        <p:txBody>
+          <a:bodyPr/>
+          <a:lstStyle/>
+          <a:p>
+            <a:r>
+              <a:rPr lang="en-US" dirty="0" smtClean="0"/>
+              <a:t>Inside </a:t>
+            </a:r>
+            <a:r>
+              <a:rPr lang="en-US" dirty="0"/>
+              <a:t>A </a:t>
+            </a:r>
+            <a:r>
+              <a:rPr lang="en-US" dirty="0" smtClean="0"/>
+              <a:t>Directive: Return Object</a:t>
+            </a:r>
+            <a:endParaRPr lang="en-US" dirty="0"/>
           </a:p>
         </p:txBody>
       </p:sp>
@@ -6080,7 +8987,7 @@
           <p:nvPr>
             <p:extLst>
               <p:ext uri="{D42A27DB-BD31-4B8C-83A1-F6EECF244321}">
-                <p14:modId xmlns:p14="http://schemas.microsoft.com/office/powerpoint/2010/main" val="2673313853"/>
+                <p14:modId xmlns:p14="http://schemas.microsoft.com/office/powerpoint/2010/main" val="1072287372"/>
               </p:ext>
             </p:extLst>
           </p:nvPr>
@@ -6107,7 +9014,11 @@
                     <a:p>
                       <a:r>
                         <a:rPr lang="en-US" dirty="0" smtClean="0"/>
-                        <a:t>Property</a:t>
+                        <a:t>Property/</a:t>
+                      </a:r>
+                      <a:r>
+                        <a:rPr lang="en-US" dirty="0" err="1" smtClean="0"/>
+                        <a:t>Func</a:t>
                       </a:r>
                       <a:endParaRPr lang="en-US" dirty="0"/>
                     </a:p>
@@ -6245,7 +9156,7 @@
                     <a:lstStyle/>
                     <a:p>
                       <a:r>
-                        <a:rPr lang="en-US" dirty="0" err="1" smtClean="0"/>
+                        <a:rPr lang="en-US" dirty="0" smtClean="0"/>
                         <a:t>templateUrl</a:t>
                       </a:r>
                       <a:endParaRPr lang="en-US" dirty="0"/>
@@ -6363,74 +9274,112 @@
   <p:clrMapOvr>
     <a:masterClrMapping/>
   </p:clrMapOvr>
-</p:sld>
-</file>
-
-<file path=ppt/slides/slide9.xml><?xml version="1.0" encoding="utf-8"?>
-<p:sld xmlns:a="http://schemas.openxmlformats.org/drawingml/2006/main" xmlns:r="http://schemas.openxmlformats.org/officeDocument/2006/relationships" xmlns:p="http://schemas.openxmlformats.org/presentationml/2006/main">
-  <p:cSld>
-    <p:spTree>
-      <p:nvGrpSpPr>
-        <p:cNvPr id="1" name=""/>
-        <p:cNvGrpSpPr/>
-        <p:nvPr/>
-      </p:nvGrpSpPr>
-      <p:grpSpPr>
-        <a:xfrm>
-          <a:off x="0" y="0"/>
-          <a:ext cx="0" cy="0"/>
-          <a:chOff x="0" y="0"/>
-          <a:chExt cx="0" cy="0"/>
-        </a:xfrm>
-      </p:grpSpPr>
-      <p:sp>
-        <p:nvSpPr>
-          <p:cNvPr id="2" name="Title 1"/>
-          <p:cNvSpPr>
-            <a:spLocks noGrp="1"/>
-          </p:cNvSpPr>
-          <p:nvPr>
-            <p:ph type="title"/>
-          </p:nvPr>
-        </p:nvSpPr>
-        <p:spPr/>
-        <p:txBody>
-          <a:bodyPr/>
-          <a:lstStyle/>
-          <a:p>
-            <a:endParaRPr lang="en-US"/>
-          </a:p>
-        </p:txBody>
-      </p:sp>
-      <p:sp>
-        <p:nvSpPr>
-          <p:cNvPr id="3" name="Content Placeholder 2"/>
-          <p:cNvSpPr>
-            <a:spLocks noGrp="1"/>
-          </p:cNvSpPr>
-          <p:nvPr>
-            <p:ph sz="quarter" idx="1"/>
-          </p:nvPr>
-        </p:nvSpPr>
-        <p:spPr/>
-        <p:txBody>
-          <a:bodyPr/>
-          <a:lstStyle/>
-          <a:p>
-            <a:endParaRPr lang="en-US"/>
-          </a:p>
-        </p:txBody>
-      </p:sp>
-    </p:spTree>
-    <p:extLst>
-      <p:ext uri="{BB962C8B-B14F-4D97-AF65-F5344CB8AC3E}">
-        <p14:creationId xmlns:p14="http://schemas.microsoft.com/office/powerpoint/2010/main" val="4125248952"/>
-      </p:ext>
-    </p:extLst>
-  </p:cSld>
-  <p:clrMapOvr>
-    <a:masterClrMapping/>
-  </p:clrMapOvr>
+  <p:timing>
+    <p:tnLst>
+      <p:par>
+        <p:cTn xmlns:p14="http://schemas.microsoft.com/office/powerpoint/2010/main" id="1" dur="indefinite" restart="never" nodeType="tmRoot">
+          <p:childTnLst>
+            <p:seq concurrent="1" nextAc="seek">
+              <p:cTn id="2" dur="indefinite" nodeType="mainSeq">
+                <p:childTnLst>
+                  <p:par>
+                    <p:cTn id="3" fill="hold">
+                      <p:stCondLst>
+                        <p:cond delay="indefinite"/>
+                      </p:stCondLst>
+                      <p:childTnLst>
+                        <p:par>
+                          <p:cTn id="4" fill="hold">
+                            <p:stCondLst>
+                              <p:cond delay="0"/>
+                            </p:stCondLst>
+                            <p:childTnLst>
+                              <p:par>
+                                <p:cTn id="5" presetID="12" presetClass="entr" presetSubtype="4" fill="hold" nodeType="clickEffect">
+                                  <p:stCondLst>
+                                    <p:cond delay="0"/>
+                                  </p:stCondLst>
+                                  <p:childTnLst>
+                                    <p:set>
+                                      <p:cBhvr>
+                                        <p:cTn id="6" dur="1" fill="hold">
+                                          <p:stCondLst>
+                                            <p:cond delay="0"/>
+                                          </p:stCondLst>
+                                        </p:cTn>
+                                        <p:tgtEl>
+                                          <p:spTgt spid="4"/>
+                                        </p:tgtEl>
+                                        <p:attrNameLst>
+                                          <p:attrName>style.visibility</p:attrName>
+                                        </p:attrNameLst>
+                                      </p:cBhvr>
+                                      <p:to>
+                                        <p:strVal val="visible"/>
+                                      </p:to>
+                                    </p:set>
+                                    <p:anim calcmode="lin" valueType="num">
+                                      <p:cBhvr additive="base">
+                                        <p:cTn id="7" dur="500"/>
+                                        <p:tgtEl>
+                                          <p:spTgt spid="4"/>
+                                        </p:tgtEl>
+                                        <p:attrNameLst>
+                                          <p:attrName>ppt_y</p:attrName>
+                                        </p:attrNameLst>
+                                      </p:cBhvr>
+                                      <p:tavLst>
+                                        <p:tav tm="0">
+                                          <p:val>
+                                            <p:strVal val="#ppt_y+#ppt_h*1.125000"/>
+                                          </p:val>
+                                        </p:tav>
+                                        <p:tav tm="100000">
+                                          <p:val>
+                                            <p:strVal val="#ppt_y"/>
+                                          </p:val>
+                                        </p:tav>
+                                      </p:tavLst>
+                                    </p:anim>
+                                    <p:animEffect transition="in" filter="wipe(up)">
+                                      <p:cBhvr>
+                                        <p:cTn id="8" dur="500"/>
+                                        <p:tgtEl>
+                                          <p:spTgt spid="4"/>
+                                        </p:tgtEl>
+                                      </p:cBhvr>
+                                    </p:animEffect>
+                                  </p:childTnLst>
+                                </p:cTn>
+                              </p:par>
+                            </p:childTnLst>
+                          </p:cTn>
+                        </p:par>
+                      </p:childTnLst>
+                    </p:cTn>
+                  </p:par>
+                </p:childTnLst>
+              </p:cTn>
+              <p:prevCondLst>
+                <p:cond evt="onPrev" delay="0">
+                  <p:tgtEl>
+                    <p:sldTgt/>
+                  </p:tgtEl>
+                </p:cond>
+              </p:prevCondLst>
+              <p:nextCondLst>
+                <p:cond evt="onNext" delay="0">
+                  <p:tgtEl>
+                    <p:sldTgt/>
+                  </p:tgtEl>
+                </p:cond>
+              </p:nextCondLst>
+            </p:seq>
+          </p:childTnLst>
+        </p:cTn>
+      </p:par>
+    </p:tnLst>
+  </p:timing>
 </p:sld>
 </file>
 

</xml_diff>

<commit_message>
Worked on Demo Files and presentation file
</commit_message>
<xml_diff>
--- a/presentation/ajs_dir_presentation.pptx
+++ b/presentation/ajs_dir_presentation.pptx
@@ -5,7 +5,7 @@
     <p:sldMasterId id="2147483660" r:id="rId1"/>
   </p:sldMasterIdLst>
   <p:notesMasterIdLst>
-    <p:notesMasterId r:id="rId17"/>
+    <p:notesMasterId r:id="rId19"/>
   </p:notesMasterIdLst>
   <p:sldIdLst>
     <p:sldId id="256" r:id="rId2"/>
@@ -22,7 +22,9 @@
     <p:sldId id="265" r:id="rId13"/>
     <p:sldId id="270" r:id="rId14"/>
     <p:sldId id="268" r:id="rId15"/>
-    <p:sldId id="262" r:id="rId16"/>
+    <p:sldId id="272" r:id="rId16"/>
+    <p:sldId id="271" r:id="rId17"/>
+    <p:sldId id="262" r:id="rId18"/>
   </p:sldIdLst>
   <p:sldSz cx="9144000" cy="6858000" type="screen4x3"/>
   <p:notesSz cx="6858000" cy="9144000"/>
@@ -4524,7 +4526,15 @@
             </a:r>
             <a:r>
               <a:rPr lang="en-US" dirty="0" smtClean="0"/>
-              <a:t>or ‘object’)</a:t>
+              <a:t>or </a:t>
+            </a:r>
+            <a:r>
+              <a:rPr lang="en-US" dirty="0" smtClean="0"/>
+              <a:t>another directive with ‘^’ or ‘?’</a:t>
+            </a:r>
+            <a:r>
+              <a:rPr lang="en-US" dirty="0" smtClean="0"/>
+              <a:t>)</a:t>
             </a:r>
             <a:endParaRPr lang="en-US" dirty="0"/>
           </a:p>
@@ -4646,30 +4656,14 @@
           <a:p>
             <a:r>
               <a:rPr lang="en-US" sz="2800" dirty="0" smtClean="0"/>
-              <a:t>Directives Implementations </a:t>
-            </a:r>
-            <a:r>
-              <a:rPr lang="en-US" sz="2800" dirty="0" smtClean="0"/>
-              <a:t>(‘restrict’) Come </a:t>
-            </a:r>
-            <a:r>
-              <a:rPr lang="en-US" sz="2800" dirty="0" smtClean="0"/>
-              <a:t>In 4 Types:</a:t>
+              <a:t>Directives Implementations (‘restrict’) Come In 4 Types:</a:t>
             </a:r>
           </a:p>
           <a:p>
             <a:pPr lvl="1"/>
             <a:r>
               <a:rPr lang="en-US" sz="2100" dirty="0" smtClean="0"/>
-              <a:t>A new HTML </a:t>
-            </a:r>
-            <a:r>
-              <a:rPr lang="en-US" sz="2100" dirty="0" smtClean="0"/>
-              <a:t>Element &lt;Tag&gt; </a:t>
-            </a:r>
-            <a:r>
-              <a:rPr lang="en-US" sz="2100" dirty="0" smtClean="0"/>
-              <a:t>( </a:t>
+              <a:t>A new HTML Element &lt;Tag&gt; ( </a:t>
             </a:r>
             <a:r>
               <a:rPr lang="en-US" sz="2100" dirty="0" smtClean="0">
@@ -6195,7 +6189,15 @@
           <a:p>
             <a:r>
               <a:rPr lang="en-US" dirty="0" smtClean="0"/>
-              <a:t>Isolating a scope does not preclude it from being able to bind it to aspects of the parents scope</a:t>
+              <a:t>Isolating a scope does not preclude it from being able to bind it to aspects of the </a:t>
+            </a:r>
+            <a:r>
+              <a:rPr lang="en-US" dirty="0" smtClean="0"/>
+              <a:t>parent’s </a:t>
+            </a:r>
+            <a:r>
+              <a:rPr lang="en-US" dirty="0" smtClean="0"/>
+              <a:t>scope</a:t>
             </a:r>
           </a:p>
           <a:p>
@@ -6209,22 +6211,45 @@
             <a:pPr lvl="2"/>
             <a:r>
               <a:rPr lang="en-US" dirty="0" smtClean="0"/>
-              <a:t>@</a:t>
-            </a:r>
+              <a:t>@ - </a:t>
+            </a:r>
+            <a:r>
+              <a:rPr lang="en-US" dirty="0"/>
+              <a:t>binds the value of parent scope property (which always a string) to the local scope</a:t>
+            </a:r>
+            <a:r>
+              <a:rPr lang="en-US" dirty="0" smtClean="0"/>
+              <a:t>.</a:t>
+            </a:r>
+            <a:endParaRPr lang="en-US" dirty="0" smtClean="0"/>
           </a:p>
           <a:p>
             <a:pPr lvl="2"/>
             <a:r>
+              <a:rPr lang="en-US" b="1" dirty="0" smtClean="0"/>
+              <a:t>=</a:t>
+            </a:r>
+            <a:r>
               <a:rPr lang="en-US" dirty="0" smtClean="0"/>
-              <a:t>=</a:t>
-            </a:r>
+              <a:t> - </a:t>
+            </a:r>
+            <a:r>
+              <a:rPr lang="en-US" dirty="0"/>
+              <a:t>binds parent scope property directly which will be evaluated before being passed in.</a:t>
+            </a:r>
+            <a:endParaRPr lang="en-US" dirty="0" smtClean="0"/>
           </a:p>
           <a:p>
             <a:pPr lvl="2"/>
             <a:r>
+              <a:rPr lang="en-US" dirty="0" smtClean="0"/>
+              <a:t>&amp; - </a:t>
+            </a:r>
+            <a:r>
               <a:rPr lang="en-US" dirty="0"/>
-              <a:t>&amp;</a:t>
-            </a:r>
+              <a:t>binds an expression or method which will be executed in the context of the scope it belongs.</a:t>
+            </a:r>
+            <a:endParaRPr lang="en-US" dirty="0"/>
           </a:p>
         </p:txBody>
       </p:sp>
@@ -6313,11 +6338,13 @@
         <p:spPr>
           <a:xfrm>
             <a:off x="612648" y="1600200"/>
-            <a:ext cx="8153400" cy="2155712"/>
+            <a:ext cx="8153400" cy="1815570"/>
           </a:xfrm>
         </p:spPr>
         <p:txBody>
-          <a:bodyPr/>
+          <a:bodyPr>
+            <a:normAutofit lnSpcReduction="10000"/>
+          </a:bodyPr>
           <a:lstStyle/>
           <a:p>
             <a:r>
@@ -6375,8 +6402,8 @@
         </p:nvSpPr>
         <p:spPr>
           <a:xfrm>
-            <a:off x="765048" y="3916254"/>
-            <a:ext cx="8153400" cy="2155712"/>
+            <a:off x="765048" y="3492745"/>
+            <a:ext cx="8153400" cy="2982785"/>
           </a:xfrm>
           <a:prstGeom prst="rect">
             <a:avLst/>
@@ -6384,7 +6411,7 @@
         </p:spPr>
         <p:txBody>
           <a:bodyPr vert="horz">
-            <a:normAutofit/>
+            <a:normAutofit lnSpcReduction="10000"/>
           </a:bodyPr>
           <a:lstStyle>
             <a:lvl1pPr marL="320040" indent="-320040" algn="l" rtl="0" eaLnBrk="1" latinLnBrk="0" hangingPunct="1">
@@ -6601,7 +6628,90 @@
               <a:rPr lang="en-US" dirty="0" smtClean="0"/>
               <a:t>’</a:t>
             </a:r>
-            <a:endParaRPr lang="en-US" dirty="0"/>
+          </a:p>
+          <a:p>
+            <a:pPr marL="685800" lvl="2" indent="0">
+              <a:buNone/>
+            </a:pPr>
+            <a:endParaRPr lang="en-US" b="1" dirty="0" smtClean="0">
+              <a:solidFill>
+                <a:srgbClr val="008000"/>
+              </a:solidFill>
+            </a:endParaRPr>
+          </a:p>
+          <a:p>
+            <a:pPr marL="91440" indent="0">
+              <a:buNone/>
+            </a:pPr>
+            <a:r>
+              <a:rPr lang="en-US" sz="1900" b="1" dirty="0" smtClean="0">
+                <a:solidFill>
+                  <a:srgbClr val="008000"/>
+                </a:solidFill>
+              </a:rPr>
+              <a:t>Best </a:t>
+            </a:r>
+            <a:r>
+              <a:rPr lang="en-US" sz="1900" b="1" dirty="0">
+                <a:solidFill>
+                  <a:srgbClr val="008000"/>
+                </a:solidFill>
+              </a:rPr>
+              <a:t>Practice:</a:t>
+            </a:r>
+            <a:r>
+              <a:rPr lang="en-US" sz="1900" dirty="0">
+                <a:solidFill>
+                  <a:srgbClr val="008000"/>
+                </a:solidFill>
+              </a:rPr>
+              <a:t> Unless your template is very small, it's typically better to break it apart into its own HTML file and load it with the </a:t>
+            </a:r>
+            <a:r>
+              <a:rPr lang="en-US" sz="1900" dirty="0" err="1">
+                <a:solidFill>
+                  <a:srgbClr val="008000"/>
+                </a:solidFill>
+              </a:rPr>
+              <a:t>templateUrl</a:t>
+            </a:r>
+            <a:r>
+              <a:rPr lang="en-US" sz="1900" dirty="0">
+                <a:solidFill>
+                  <a:srgbClr val="008000"/>
+                </a:solidFill>
+              </a:rPr>
+              <a:t> option</a:t>
+            </a:r>
+            <a:r>
+              <a:rPr lang="en-US" sz="1900" dirty="0" smtClean="0">
+                <a:solidFill>
+                  <a:srgbClr val="008000"/>
+                </a:solidFill>
+              </a:rPr>
+              <a:t>. (</a:t>
+            </a:r>
+            <a:r>
+              <a:rPr lang="en-US" sz="1900" dirty="0" err="1" smtClean="0">
+                <a:solidFill>
+                  <a:srgbClr val="008000"/>
+                </a:solidFill>
+              </a:rPr>
+              <a:t>AngularJS.org</a:t>
+            </a:r>
+            <a:r>
+              <a:rPr lang="en-US" sz="1900" dirty="0" smtClean="0">
+                <a:solidFill>
+                  <a:srgbClr val="008000"/>
+                </a:solidFill>
+              </a:rPr>
+              <a:t>)</a:t>
+            </a:r>
+            <a:endParaRPr lang="en-US" sz="1900" dirty="0" smtClean="0">
+              <a:solidFill>
+                <a:srgbClr val="008000"/>
+              </a:solidFill>
+            </a:endParaRPr>
           </a:p>
         </p:txBody>
       </p:sp>
@@ -6659,7 +6769,206 @@
           <a:p>
             <a:r>
               <a:rPr lang="en-US" dirty="0"/>
-              <a:t>Looking Inside A Directive</a:t>
+              <a:t>Inside A </a:t>
+            </a:r>
+            <a:r>
+              <a:rPr lang="en-US" dirty="0" smtClean="0"/>
+              <a:t>Directive: Controller</a:t>
+            </a:r>
+            <a:endParaRPr lang="en-US" dirty="0"/>
+          </a:p>
+        </p:txBody>
+      </p:sp>
+      <p:sp>
+        <p:nvSpPr>
+          <p:cNvPr id="3" name="Content Placeholder 2"/>
+          <p:cNvSpPr>
+            <a:spLocks noGrp="1"/>
+          </p:cNvSpPr>
+          <p:nvPr>
+            <p:ph sz="quarter" idx="1"/>
+          </p:nvPr>
+        </p:nvSpPr>
+        <p:spPr/>
+        <p:txBody>
+          <a:bodyPr/>
+          <a:lstStyle/>
+          <a:p>
+            <a:r>
+              <a:rPr lang="en-US" dirty="0" smtClean="0"/>
+              <a:t>Can create a new controller or pass in a controller from the parent.</a:t>
+            </a:r>
+            <a:endParaRPr lang="en-US" dirty="0"/>
+          </a:p>
+        </p:txBody>
+      </p:sp>
+    </p:spTree>
+    <p:extLst>
+      <p:ext uri="{BB962C8B-B14F-4D97-AF65-F5344CB8AC3E}">
+        <p14:creationId xmlns:p14="http://schemas.microsoft.com/office/powerpoint/2010/main" val="859531170"/>
+      </p:ext>
+    </p:extLst>
+  </p:cSld>
+  <p:clrMapOvr>
+    <a:masterClrMapping/>
+  </p:clrMapOvr>
+</p:sld>
+</file>
+
+<file path=ppt/slides/slide16.xml><?xml version="1.0" encoding="utf-8"?>
+<p:sld xmlns:a="http://schemas.openxmlformats.org/drawingml/2006/main" xmlns:r="http://schemas.openxmlformats.org/officeDocument/2006/relationships" xmlns:p="http://schemas.openxmlformats.org/presentationml/2006/main">
+  <p:cSld>
+    <p:spTree>
+      <p:nvGrpSpPr>
+        <p:cNvPr id="1" name=""/>
+        <p:cNvGrpSpPr/>
+        <p:nvPr/>
+      </p:nvGrpSpPr>
+      <p:grpSpPr>
+        <a:xfrm>
+          <a:off x="0" y="0"/>
+          <a:ext cx="0" cy="0"/>
+          <a:chOff x="0" y="0"/>
+          <a:chExt cx="0" cy="0"/>
+        </a:xfrm>
+      </p:grpSpPr>
+      <p:sp>
+        <p:nvSpPr>
+          <p:cNvPr id="2" name="Title 1"/>
+          <p:cNvSpPr>
+            <a:spLocks noGrp="1"/>
+          </p:cNvSpPr>
+          <p:nvPr>
+            <p:ph type="title"/>
+          </p:nvPr>
+        </p:nvSpPr>
+        <p:spPr/>
+        <p:txBody>
+          <a:bodyPr/>
+          <a:lstStyle/>
+          <a:p>
+            <a:r>
+              <a:rPr lang="en-US" dirty="0"/>
+              <a:t>Inside A Directive: </a:t>
+            </a:r>
+            <a:r>
+              <a:rPr lang="en-US" dirty="0" smtClean="0"/>
+              <a:t>Link</a:t>
+            </a:r>
+            <a:endParaRPr lang="en-US" dirty="0"/>
+          </a:p>
+        </p:txBody>
+      </p:sp>
+      <p:sp>
+        <p:nvSpPr>
+          <p:cNvPr id="3" name="Content Placeholder 2"/>
+          <p:cNvSpPr>
+            <a:spLocks noGrp="1"/>
+          </p:cNvSpPr>
+          <p:nvPr>
+            <p:ph sz="quarter" idx="1"/>
+          </p:nvPr>
+        </p:nvSpPr>
+        <p:spPr/>
+        <p:txBody>
+          <a:bodyPr/>
+          <a:lstStyle/>
+          <a:p>
+            <a:r>
+              <a:rPr lang="en-US" dirty="0"/>
+              <a:t>The link function is mainly used for attaching event listeners to DOM elements, watching model properties for changes, and updating the DOM. </a:t>
+            </a:r>
+            <a:endParaRPr lang="en-US" dirty="0" smtClean="0"/>
+          </a:p>
+          <a:p>
+            <a:r>
+              <a:rPr lang="en-US" dirty="0" smtClean="0"/>
+              <a:t>Arguments passed into the link function must be placed in a specific order (unlike a controller):</a:t>
+            </a:r>
+          </a:p>
+          <a:p>
+            <a:pPr lvl="1"/>
+            <a:r>
+              <a:rPr lang="en-US" dirty="0" smtClean="0"/>
+              <a:t>Scope</a:t>
+            </a:r>
+          </a:p>
+          <a:p>
+            <a:pPr lvl="1"/>
+            <a:r>
+              <a:rPr lang="en-US" dirty="0" smtClean="0"/>
+              <a:t>Element</a:t>
+            </a:r>
+          </a:p>
+          <a:p>
+            <a:pPr lvl="1"/>
+            <a:r>
+              <a:rPr lang="en-US" dirty="0" smtClean="0"/>
+              <a:t>Attributes</a:t>
+            </a:r>
+            <a:endParaRPr lang="en-US" dirty="0"/>
+          </a:p>
+        </p:txBody>
+      </p:sp>
+    </p:spTree>
+    <p:extLst>
+      <p:ext uri="{BB962C8B-B14F-4D97-AF65-F5344CB8AC3E}">
+        <p14:creationId xmlns:p14="http://schemas.microsoft.com/office/powerpoint/2010/main" val="2304429542"/>
+      </p:ext>
+    </p:extLst>
+  </p:cSld>
+  <p:clrMapOvr>
+    <a:masterClrMapping/>
+  </p:clrMapOvr>
+  <p:timing>
+    <p:tnLst>
+      <p:par>
+        <p:cTn xmlns:p14="http://schemas.microsoft.com/office/powerpoint/2010/main" id="1" dur="indefinite" restart="never" nodeType="tmRoot"/>
+      </p:par>
+    </p:tnLst>
+  </p:timing>
+</p:sld>
+</file>
+
+<file path=ppt/slides/slide17.xml><?xml version="1.0" encoding="utf-8"?>
+<p:sld xmlns:a="http://schemas.openxmlformats.org/drawingml/2006/main" xmlns:r="http://schemas.openxmlformats.org/officeDocument/2006/relationships" xmlns:p="http://schemas.openxmlformats.org/presentationml/2006/main">
+  <p:cSld>
+    <p:spTree>
+      <p:nvGrpSpPr>
+        <p:cNvPr id="1" name=""/>
+        <p:cNvGrpSpPr/>
+        <p:nvPr/>
+      </p:nvGrpSpPr>
+      <p:grpSpPr>
+        <a:xfrm>
+          <a:off x="0" y="0"/>
+          <a:ext cx="0" cy="0"/>
+          <a:chOff x="0" y="0"/>
+          <a:chExt cx="0" cy="0"/>
+        </a:xfrm>
+      </p:grpSpPr>
+      <p:sp>
+        <p:nvSpPr>
+          <p:cNvPr id="2" name="Title 1"/>
+          <p:cNvSpPr>
+            <a:spLocks noGrp="1"/>
+          </p:cNvSpPr>
+          <p:nvPr>
+            <p:ph type="title"/>
+          </p:nvPr>
+        </p:nvSpPr>
+        <p:spPr/>
+        <p:txBody>
+          <a:bodyPr/>
+          <a:lstStyle/>
+          <a:p>
+            <a:r>
+              <a:rPr lang="en-US" dirty="0" smtClean="0"/>
+              <a:t>Inside </a:t>
+            </a:r>
+            <a:r>
+              <a:rPr lang="en-US" dirty="0"/>
+              <a:t>A Directive</a:t>
             </a:r>
           </a:p>
         </p:txBody>
@@ -6812,7 +7121,6 @@
               <a:rPr lang="en-US" dirty="0" smtClean="0"/>
               <a:t>Inside A Directive</a:t>
             </a:r>
-            <a:endParaRPr lang="en-US" dirty="0" smtClean="0"/>
           </a:p>
           <a:p>
             <a:pPr lvl="1"/>
@@ -6820,7 +7128,6 @@
               <a:rPr lang="en-US" dirty="0" smtClean="0"/>
               <a:t>Overview (Example)</a:t>
             </a:r>
-            <a:endParaRPr lang="en-US" dirty="0" smtClean="0"/>
           </a:p>
           <a:p>
             <a:pPr lvl="1"/>
@@ -6828,7 +7135,6 @@
               <a:rPr lang="en-US" dirty="0" smtClean="0"/>
               <a:t>Naming </a:t>
             </a:r>
-            <a:endParaRPr lang="en-US" dirty="0" smtClean="0"/>
           </a:p>
           <a:p>
             <a:pPr lvl="1"/>
@@ -6866,7 +7172,6 @@
               <a:rPr lang="en-US" dirty="0" smtClean="0"/>
               <a:t>Link</a:t>
             </a:r>
-            <a:endParaRPr lang="en-US" dirty="0" smtClean="0"/>
           </a:p>
           <a:p>
             <a:pPr lvl="1"/>

</xml_diff>

<commit_message>
More work on demo
</commit_message>
<xml_diff>
--- a/presentation/ajs_dir_presentation.pptx
+++ b/presentation/ajs_dir_presentation.pptx
@@ -208,7 +208,7 @@
           <a:p>
             <a:fld id="{457A472E-D807-BD49-BE97-A395F22B75F3}" type="datetimeFigureOut">
               <a:rPr lang="en-US" smtClean="0"/>
-              <a:t>8/31/14</a:t>
+              <a:t>9/2/14</a:t>
             </a:fld>
             <a:endParaRPr lang="en-US"/>
           </a:p>
@@ -541,6 +541,90 @@
           <a:p>
             <a:fld id="{0666F230-82CB-A344-8833-0AA894583C70}" type="slidenum">
               <a:rPr lang="en-US" smtClean="0"/>
+              <a:t>7</a:t>
+            </a:fld>
+            <a:endParaRPr lang="en-US"/>
+          </a:p>
+        </p:txBody>
+      </p:sp>
+    </p:spTree>
+    <p:extLst>
+      <p:ext uri="{BB962C8B-B14F-4D97-AF65-F5344CB8AC3E}">
+        <p14:creationId xmlns:p14="http://schemas.microsoft.com/office/powerpoint/2010/main" val="3641754132"/>
+      </p:ext>
+    </p:extLst>
+  </p:cSld>
+  <p:clrMapOvr>
+    <a:masterClrMapping/>
+  </p:clrMapOvr>
+</p:notes>
+</file>
+
+<file path=ppt/notesSlides/notesSlide2.xml><?xml version="1.0" encoding="utf-8"?>
+<p:notes xmlns:a="http://schemas.openxmlformats.org/drawingml/2006/main" xmlns:r="http://schemas.openxmlformats.org/officeDocument/2006/relationships" xmlns:p="http://schemas.openxmlformats.org/presentationml/2006/main">
+  <p:cSld>
+    <p:spTree>
+      <p:nvGrpSpPr>
+        <p:cNvPr id="1" name=""/>
+        <p:cNvGrpSpPr/>
+        <p:nvPr/>
+      </p:nvGrpSpPr>
+      <p:grpSpPr>
+        <a:xfrm>
+          <a:off x="0" y="0"/>
+          <a:ext cx="0" cy="0"/>
+          <a:chOff x="0" y="0"/>
+          <a:chExt cx="0" cy="0"/>
+        </a:xfrm>
+      </p:grpSpPr>
+      <p:sp>
+        <p:nvSpPr>
+          <p:cNvPr id="2" name="Slide Image Placeholder 1"/>
+          <p:cNvSpPr>
+            <a:spLocks noGrp="1" noRot="1" noChangeAspect="1"/>
+          </p:cNvSpPr>
+          <p:nvPr>
+            <p:ph type="sldImg"/>
+          </p:nvPr>
+        </p:nvSpPr>
+        <p:spPr/>
+      </p:sp>
+      <p:sp>
+        <p:nvSpPr>
+          <p:cNvPr id="3" name="Notes Placeholder 2"/>
+          <p:cNvSpPr>
+            <a:spLocks noGrp="1"/>
+          </p:cNvSpPr>
+          <p:nvPr>
+            <p:ph type="body" idx="1"/>
+          </p:nvPr>
+        </p:nvSpPr>
+        <p:spPr/>
+        <p:txBody>
+          <a:bodyPr/>
+          <a:lstStyle/>
+          <a:p>
+            <a:endParaRPr lang="en-US" dirty="0"/>
+          </a:p>
+        </p:txBody>
+      </p:sp>
+      <p:sp>
+        <p:nvSpPr>
+          <p:cNvPr id="4" name="Slide Number Placeholder 3"/>
+          <p:cNvSpPr>
+            <a:spLocks noGrp="1"/>
+          </p:cNvSpPr>
+          <p:nvPr>
+            <p:ph type="sldNum" sz="quarter" idx="10"/>
+          </p:nvPr>
+        </p:nvSpPr>
+        <p:spPr/>
+        <p:txBody>
+          <a:bodyPr/>
+          <a:lstStyle/>
+          <a:p>
+            <a:fld id="{0666F230-82CB-A344-8833-0AA894583C70}" type="slidenum">
+              <a:rPr lang="en-US" smtClean="0"/>
               <a:t>11</a:t>
             </a:fld>
             <a:endParaRPr lang="en-US"/>
@@ -845,7 +929,7 @@
             <a:fld id="{23A271A1-F6D6-438B-A432-4747EE7ECD40}" type="datetimeFigureOut">
               <a:rPr lang="en-US" smtClean="0"/>
               <a:pPr algn="ctr" eaLnBrk="1" latinLnBrk="0" hangingPunct="1"/>
-              <a:t>8/31/14</a:t>
+              <a:t>9/2/14</a:t>
             </a:fld>
             <a:endParaRPr lang="en-US" sz="2000" dirty="0">
               <a:solidFill>
@@ -1032,7 +1116,7 @@
             <a:fld id="{23A271A1-F6D6-438B-A432-4747EE7ECD40}" type="datetimeFigureOut">
               <a:rPr lang="en-US" smtClean="0"/>
               <a:pPr eaLnBrk="1" latinLnBrk="0" hangingPunct="1"/>
-              <a:t>8/31/14</a:t>
+              <a:t>9/2/14</a:t>
             </a:fld>
             <a:endParaRPr lang="en-US"/>
           </a:p>
@@ -1200,7 +1284,7 @@
             <a:fld id="{23A271A1-F6D6-438B-A432-4747EE7ECD40}" type="datetimeFigureOut">
               <a:rPr lang="en-US" smtClean="0"/>
               <a:pPr eaLnBrk="1" latinLnBrk="0" hangingPunct="1"/>
-              <a:t>8/31/14</a:t>
+              <a:t>9/2/14</a:t>
             </a:fld>
             <a:endParaRPr lang="en-US" dirty="0"/>
           </a:p>
@@ -1462,7 +1546,7 @@
             <a:fld id="{23A271A1-F6D6-438B-A432-4747EE7ECD40}" type="datetimeFigureOut">
               <a:rPr lang="en-US" smtClean="0"/>
               <a:pPr eaLnBrk="1" latinLnBrk="0" hangingPunct="1"/>
-              <a:t>8/31/14</a:t>
+              <a:t>9/2/14</a:t>
             </a:fld>
             <a:endParaRPr lang="en-US" dirty="0"/>
           </a:p>
@@ -1862,7 +1946,7 @@
             <a:fld id="{23A271A1-F6D6-438B-A432-4747EE7ECD40}" type="datetimeFigureOut">
               <a:rPr lang="en-US" smtClean="0"/>
               <a:pPr eaLnBrk="1" latinLnBrk="0" hangingPunct="1"/>
-              <a:t>8/31/14</a:t>
+              <a:t>9/2/14</a:t>
             </a:fld>
             <a:endParaRPr lang="en-US"/>
           </a:p>
@@ -2076,7 +2160,7 @@
             <a:fld id="{23A271A1-F6D6-438B-A432-4747EE7ECD40}" type="datetimeFigureOut">
               <a:rPr lang="en-US" smtClean="0"/>
               <a:pPr eaLnBrk="1" latinLnBrk="0" hangingPunct="1"/>
-              <a:t>8/31/14</a:t>
+              <a:t>9/2/14</a:t>
             </a:fld>
             <a:endParaRPr lang="en-US"/>
           </a:p>
@@ -2280,7 +2364,7 @@
             <a:fld id="{23A271A1-F6D6-438B-A432-4747EE7ECD40}" type="datetimeFigureOut">
               <a:rPr lang="en-US" smtClean="0"/>
               <a:pPr eaLnBrk="1" latinLnBrk="0" hangingPunct="1"/>
-              <a:t>8/31/14</a:t>
+              <a:t>9/2/14</a:t>
             </a:fld>
             <a:endParaRPr lang="en-US"/>
           </a:p>
@@ -2469,7 +2553,7 @@
             <a:fld id="{23A271A1-F6D6-438B-A432-4747EE7ECD40}" type="datetimeFigureOut">
               <a:rPr lang="en-US" smtClean="0"/>
               <a:pPr eaLnBrk="1" latinLnBrk="0" hangingPunct="1"/>
-              <a:t>8/31/14</a:t>
+              <a:t>9/2/14</a:t>
             </a:fld>
             <a:endParaRPr lang="en-US"/>
           </a:p>
@@ -2574,7 +2658,7 @@
             <a:fld id="{23A271A1-F6D6-438B-A432-4747EE7ECD40}" type="datetimeFigureOut">
               <a:rPr lang="en-US" smtClean="0"/>
               <a:pPr eaLnBrk="1" latinLnBrk="0" hangingPunct="1"/>
-              <a:t>8/31/14</a:t>
+              <a:t>9/2/14</a:t>
             </a:fld>
             <a:endParaRPr lang="en-US"/>
           </a:p>
@@ -2713,7 +2797,7 @@
             <a:fld id="{23A271A1-F6D6-438B-A432-4747EE7ECD40}" type="datetimeFigureOut">
               <a:rPr lang="en-US" smtClean="0"/>
               <a:pPr eaLnBrk="1" latinLnBrk="0" hangingPunct="1"/>
-              <a:t>8/31/14</a:t>
+              <a:t>9/2/14</a:t>
             </a:fld>
             <a:endParaRPr lang="en-US"/>
           </a:p>
@@ -3212,7 +3296,7 @@
             <a:fld id="{23A271A1-F6D6-438B-A432-4747EE7ECD40}" type="datetimeFigureOut">
               <a:rPr lang="en-US" smtClean="0"/>
               <a:pPr eaLnBrk="1" latinLnBrk="0" hangingPunct="1"/>
-              <a:t>8/31/14</a:t>
+              <a:t>9/2/14</a:t>
             </a:fld>
             <a:endParaRPr lang="en-US"/>
           </a:p>
@@ -3473,7 +3557,7 @@
             <a:fld id="{23A271A1-F6D6-438B-A432-4747EE7ECD40}" type="datetimeFigureOut">
               <a:rPr lang="en-US" smtClean="0"/>
               <a:pPr eaLnBrk="1" latinLnBrk="0" hangingPunct="1"/>
-              <a:t>8/31/14</a:t>
+              <a:t>9/2/14</a:t>
             </a:fld>
             <a:endParaRPr lang="en-US" sz="1400" dirty="0">
               <a:solidFill>
@@ -4526,15 +4610,7 @@
             </a:r>
             <a:r>
               <a:rPr lang="en-US" dirty="0" smtClean="0"/>
-              <a:t>or </a:t>
-            </a:r>
-            <a:r>
-              <a:rPr lang="en-US" dirty="0" smtClean="0"/>
-              <a:t>another directive with ‘^’ or ‘?’</a:t>
-            </a:r>
-            <a:r>
-              <a:rPr lang="en-US" dirty="0" smtClean="0"/>
-              <a:t>)</a:t>
+              <a:t>or another directive with ‘^’ or ‘?’)</a:t>
             </a:r>
             <a:endParaRPr lang="en-US" dirty="0"/>
           </a:p>
@@ -6189,15 +6265,7 @@
           <a:p>
             <a:r>
               <a:rPr lang="en-US" dirty="0" smtClean="0"/>
-              <a:t>Isolating a scope does not preclude it from being able to bind it to aspects of the </a:t>
-            </a:r>
-            <a:r>
-              <a:rPr lang="en-US" dirty="0" smtClean="0"/>
-              <a:t>parent’s </a:t>
-            </a:r>
-            <a:r>
-              <a:rPr lang="en-US" dirty="0" smtClean="0"/>
-              <a:t>scope</a:t>
+              <a:t>Isolating a scope does not preclude it from being able to bind it to aspects of the parent’s scope</a:t>
             </a:r>
           </a:p>
           <a:p>
@@ -6221,7 +6289,6 @@
               <a:rPr lang="en-US" dirty="0" smtClean="0"/>
               <a:t>.</a:t>
             </a:r>
-            <a:endParaRPr lang="en-US" dirty="0" smtClean="0"/>
           </a:p>
           <a:p>
             <a:pPr lvl="2"/>
@@ -6249,7 +6316,6 @@
               <a:rPr lang="en-US" dirty="0"/>
               <a:t>binds an expression or method which will be executed in the context of the scope it belongs.</a:t>
             </a:r>
-            <a:endParaRPr lang="en-US" dirty="0"/>
           </a:p>
         </p:txBody>
       </p:sp>
@@ -6707,11 +6773,6 @@
               </a:rPr>
               <a:t>)</a:t>
             </a:r>
-            <a:endParaRPr lang="en-US" sz="1900" dirty="0" smtClean="0">
-              <a:solidFill>
-                <a:srgbClr val="008000"/>
-              </a:solidFill>
-            </a:endParaRPr>
           </a:p>
         </p:txBody>
       </p:sp>
@@ -6789,19 +6850,112 @@
             <p:ph sz="quarter" idx="1"/>
           </p:nvPr>
         </p:nvSpPr>
-        <p:spPr/>
-        <p:txBody>
-          <a:bodyPr/>
+        <p:spPr>
+          <a:xfrm>
+            <a:off x="612648" y="4522286"/>
+            <a:ext cx="8153400" cy="1573713"/>
+          </a:xfrm>
+        </p:spPr>
+        <p:txBody>
+          <a:bodyPr>
+            <a:normAutofit fontScale="92500" lnSpcReduction="20000"/>
+          </a:bodyPr>
           <a:lstStyle/>
           <a:p>
             <a:r>
               <a:rPr lang="en-US" dirty="0" smtClean="0"/>
-              <a:t>Can create a new controller or pass in a controller from the parent.</a:t>
+              <a:t>Can create a new controller or pass in a controller from the parent</a:t>
+            </a:r>
+            <a:r>
+              <a:rPr lang="en-US" dirty="0" smtClean="0"/>
+              <a:t>.</a:t>
+            </a:r>
+          </a:p>
+          <a:p>
+            <a:pPr lvl="1"/>
+            <a:r>
+              <a:rPr lang="en-US" dirty="0" smtClean="0"/>
+              <a:t>Declare Controller</a:t>
+            </a:r>
+          </a:p>
+          <a:p>
+            <a:pPr lvl="1"/>
+            <a:r>
+              <a:rPr lang="en-US" dirty="0" smtClean="0"/>
+              <a:t>Option to set the name of Controller by using “</a:t>
+            </a:r>
+            <a:r>
+              <a:rPr lang="en-US" dirty="0" err="1" smtClean="0"/>
+              <a:t>controllerAs</a:t>
+            </a:r>
+            <a:r>
+              <a:rPr lang="en-US" dirty="0" smtClean="0"/>
+              <a:t>:”</a:t>
             </a:r>
             <a:endParaRPr lang="en-US" dirty="0"/>
           </a:p>
         </p:txBody>
       </p:sp>
+      <p:pic>
+        <p:nvPicPr>
+          <p:cNvPr id="4" name="Picture 3" descr="scope-1.tiff"/>
+          <p:cNvPicPr>
+            <a:picLocks noChangeAspect="1"/>
+          </p:cNvPicPr>
+          <p:nvPr/>
+        </p:nvPicPr>
+        <p:blipFill>
+          <a:blip r:embed="rId2">
+            <a:extLst>
+              <a:ext uri="{28A0092B-C50C-407E-A947-70E740481C1C}">
+                <a14:useLocalDpi xmlns:a14="http://schemas.microsoft.com/office/drawing/2010/main" val="0"/>
+              </a:ext>
+            </a:extLst>
+          </a:blip>
+          <a:stretch>
+            <a:fillRect/>
+          </a:stretch>
+        </p:blipFill>
+        <p:spPr>
+          <a:xfrm>
+            <a:off x="955587" y="1666756"/>
+            <a:ext cx="7376602" cy="2690009"/>
+          </a:xfrm>
+          <a:prstGeom prst="rect">
+            <a:avLst/>
+          </a:prstGeom>
+          <a:solidFill>
+            <a:srgbClr val="FFFFFF">
+              <a:shade val="85000"/>
+            </a:srgbClr>
+          </a:solidFill>
+          <a:ln w="88900" cap="sq">
+            <a:solidFill>
+              <a:srgbClr val="FFFFFF"/>
+            </a:solidFill>
+            <a:miter lim="800000"/>
+          </a:ln>
+          <a:effectLst>
+            <a:outerShdw blurRad="55000" dist="18000" dir="5400000" algn="tl" rotWithShape="0">
+              <a:srgbClr val="000000">
+                <a:alpha val="40000"/>
+              </a:srgbClr>
+            </a:outerShdw>
+          </a:effectLst>
+          <a:scene3d>
+            <a:camera prst="orthographicFront"/>
+            <a:lightRig rig="twoPt" dir="t">
+              <a:rot lat="0" lon="0" rev="7200000"/>
+            </a:lightRig>
+          </a:scene3d>
+          <a:sp3d>
+            <a:bevelT w="25400" h="19050"/>
+            <a:contourClr>
+              <a:srgbClr val="FFFFFF"/>
+            </a:contourClr>
+          </a:sp3d>
+        </p:spPr>
+      </p:pic>
     </p:spTree>
     <p:extLst>
       <p:ext uri="{BB962C8B-B14F-4D97-AF65-F5344CB8AC3E}">
@@ -6968,8 +7122,17 @@
             </a:r>
             <a:r>
               <a:rPr lang="en-US" dirty="0"/>
-              <a:t>A Directive</a:t>
-            </a:r>
+              <a:t>A </a:t>
+            </a:r>
+            <a:r>
+              <a:rPr lang="en-US" dirty="0" smtClean="0"/>
+              <a:t>Directive: Bootstrap </a:t>
+            </a:r>
+            <a:r>
+              <a:rPr lang="en-US" dirty="0" err="1" smtClean="0"/>
+              <a:t>Proc</a:t>
+            </a:r>
+            <a:endParaRPr lang="en-US" dirty="0"/>
           </a:p>
         </p:txBody>
       </p:sp>
@@ -8391,7 +8554,7 @@
           </p:nvPr>
         </p:nvPicPr>
         <p:blipFill rotWithShape="1">
-          <a:blip r:embed="rId2">
+          <a:blip r:embed="rId3">
             <a:extLst>
               <a:ext uri="{28A0092B-C50C-407E-A947-70E740481C1C}">
                 <a14:useLocalDpi xmlns:a14="http://schemas.microsoft.com/office/drawing/2010/main" val="0"/>

</xml_diff>

<commit_message>
Worked on the demo files
</commit_message>
<xml_diff>
--- a/presentation/ajs_dir_presentation.pptx
+++ b/presentation/ajs_dir_presentation.pptx
@@ -5,7 +5,7 @@
     <p:sldMasterId id="2147483660" r:id="rId1"/>
   </p:sldMasterIdLst>
   <p:notesMasterIdLst>
-    <p:notesMasterId r:id="rId19"/>
+    <p:notesMasterId r:id="rId20"/>
   </p:notesMasterIdLst>
   <p:sldIdLst>
     <p:sldId id="256" r:id="rId2"/>
@@ -24,7 +24,8 @@
     <p:sldId id="268" r:id="rId15"/>
     <p:sldId id="272" r:id="rId16"/>
     <p:sldId id="271" r:id="rId17"/>
-    <p:sldId id="262" r:id="rId18"/>
+    <p:sldId id="273" r:id="rId18"/>
+    <p:sldId id="262" r:id="rId19"/>
   </p:sldIdLst>
   <p:sldSz cx="9144000" cy="6858000" type="screen4x3"/>
   <p:notesSz cx="6858000" cy="9144000"/>
@@ -208,7 +209,7 @@
           <a:p>
             <a:fld id="{457A472E-D807-BD49-BE97-A395F22B75F3}" type="datetimeFigureOut">
               <a:rPr lang="en-US" smtClean="0"/>
-              <a:t>9/2/14</a:t>
+              <a:t>9/4/14</a:t>
             </a:fld>
             <a:endParaRPr lang="en-US"/>
           </a:p>
@@ -929,7 +930,7 @@
             <a:fld id="{23A271A1-F6D6-438B-A432-4747EE7ECD40}" type="datetimeFigureOut">
               <a:rPr lang="en-US" smtClean="0"/>
               <a:pPr algn="ctr" eaLnBrk="1" latinLnBrk="0" hangingPunct="1"/>
-              <a:t>9/2/14</a:t>
+              <a:t>9/4/14</a:t>
             </a:fld>
             <a:endParaRPr lang="en-US" sz="2000" dirty="0">
               <a:solidFill>
@@ -1116,7 +1117,7 @@
             <a:fld id="{23A271A1-F6D6-438B-A432-4747EE7ECD40}" type="datetimeFigureOut">
               <a:rPr lang="en-US" smtClean="0"/>
               <a:pPr eaLnBrk="1" latinLnBrk="0" hangingPunct="1"/>
-              <a:t>9/2/14</a:t>
+              <a:t>9/4/14</a:t>
             </a:fld>
             <a:endParaRPr lang="en-US"/>
           </a:p>
@@ -1284,7 +1285,7 @@
             <a:fld id="{23A271A1-F6D6-438B-A432-4747EE7ECD40}" type="datetimeFigureOut">
               <a:rPr lang="en-US" smtClean="0"/>
               <a:pPr eaLnBrk="1" latinLnBrk="0" hangingPunct="1"/>
-              <a:t>9/2/14</a:t>
+              <a:t>9/4/14</a:t>
             </a:fld>
             <a:endParaRPr lang="en-US" dirty="0"/>
           </a:p>
@@ -1546,7 +1547,7 @@
             <a:fld id="{23A271A1-F6D6-438B-A432-4747EE7ECD40}" type="datetimeFigureOut">
               <a:rPr lang="en-US" smtClean="0"/>
               <a:pPr eaLnBrk="1" latinLnBrk="0" hangingPunct="1"/>
-              <a:t>9/2/14</a:t>
+              <a:t>9/4/14</a:t>
             </a:fld>
             <a:endParaRPr lang="en-US" dirty="0"/>
           </a:p>
@@ -1946,7 +1947,7 @@
             <a:fld id="{23A271A1-F6D6-438B-A432-4747EE7ECD40}" type="datetimeFigureOut">
               <a:rPr lang="en-US" smtClean="0"/>
               <a:pPr eaLnBrk="1" latinLnBrk="0" hangingPunct="1"/>
-              <a:t>9/2/14</a:t>
+              <a:t>9/4/14</a:t>
             </a:fld>
             <a:endParaRPr lang="en-US"/>
           </a:p>
@@ -2160,7 +2161,7 @@
             <a:fld id="{23A271A1-F6D6-438B-A432-4747EE7ECD40}" type="datetimeFigureOut">
               <a:rPr lang="en-US" smtClean="0"/>
               <a:pPr eaLnBrk="1" latinLnBrk="0" hangingPunct="1"/>
-              <a:t>9/2/14</a:t>
+              <a:t>9/4/14</a:t>
             </a:fld>
             <a:endParaRPr lang="en-US"/>
           </a:p>
@@ -2364,7 +2365,7 @@
             <a:fld id="{23A271A1-F6D6-438B-A432-4747EE7ECD40}" type="datetimeFigureOut">
               <a:rPr lang="en-US" smtClean="0"/>
               <a:pPr eaLnBrk="1" latinLnBrk="0" hangingPunct="1"/>
-              <a:t>9/2/14</a:t>
+              <a:t>9/4/14</a:t>
             </a:fld>
             <a:endParaRPr lang="en-US"/>
           </a:p>
@@ -2553,7 +2554,7 @@
             <a:fld id="{23A271A1-F6D6-438B-A432-4747EE7ECD40}" type="datetimeFigureOut">
               <a:rPr lang="en-US" smtClean="0"/>
               <a:pPr eaLnBrk="1" latinLnBrk="0" hangingPunct="1"/>
-              <a:t>9/2/14</a:t>
+              <a:t>9/4/14</a:t>
             </a:fld>
             <a:endParaRPr lang="en-US"/>
           </a:p>
@@ -2658,7 +2659,7 @@
             <a:fld id="{23A271A1-F6D6-438B-A432-4747EE7ECD40}" type="datetimeFigureOut">
               <a:rPr lang="en-US" smtClean="0"/>
               <a:pPr eaLnBrk="1" latinLnBrk="0" hangingPunct="1"/>
-              <a:t>9/2/14</a:t>
+              <a:t>9/4/14</a:t>
             </a:fld>
             <a:endParaRPr lang="en-US"/>
           </a:p>
@@ -2797,7 +2798,7 @@
             <a:fld id="{23A271A1-F6D6-438B-A432-4747EE7ECD40}" type="datetimeFigureOut">
               <a:rPr lang="en-US" smtClean="0"/>
               <a:pPr eaLnBrk="1" latinLnBrk="0" hangingPunct="1"/>
-              <a:t>9/2/14</a:t>
+              <a:t>9/4/14</a:t>
             </a:fld>
             <a:endParaRPr lang="en-US"/>
           </a:p>
@@ -3296,7 +3297,7 @@
             <a:fld id="{23A271A1-F6D6-438B-A432-4747EE7ECD40}" type="datetimeFigureOut">
               <a:rPr lang="en-US" smtClean="0"/>
               <a:pPr eaLnBrk="1" latinLnBrk="0" hangingPunct="1"/>
-              <a:t>9/2/14</a:t>
+              <a:t>9/4/14</a:t>
             </a:fld>
             <a:endParaRPr lang="en-US"/>
           </a:p>
@@ -3557,7 +3558,7 @@
             <a:fld id="{23A271A1-F6D6-438B-A432-4747EE7ECD40}" type="datetimeFigureOut">
               <a:rPr lang="en-US" smtClean="0"/>
               <a:pPr eaLnBrk="1" latinLnBrk="0" hangingPunct="1"/>
-              <a:t>9/2/14</a:t>
+              <a:t>9/4/14</a:t>
             </a:fld>
             <a:endParaRPr lang="en-US" sz="1400" dirty="0">
               <a:solidFill>
@@ -4502,7 +4503,9 @@
         </p:nvSpPr>
         <p:spPr/>
         <p:txBody>
-          <a:bodyPr/>
+          <a:bodyPr>
+            <a:normAutofit lnSpcReduction="10000"/>
+          </a:bodyPr>
           <a:lstStyle/>
           <a:p>
             <a:r>
@@ -4530,6 +4533,14 @@
             </a:r>
           </a:p>
           <a:p>
+            <a:pPr lvl="2"/>
+            <a:r>
+              <a:rPr lang="en-US" dirty="0" smtClean="0"/>
+              <a:t>Remove the custom tag or leave it</a:t>
+            </a:r>
+            <a:endParaRPr lang="en-US" dirty="0" smtClean="0"/>
+          </a:p>
+          <a:p>
             <a:pPr lvl="1"/>
             <a:r>
               <a:rPr lang="en-US" dirty="0" smtClean="0"/>
@@ -4545,8 +4556,13 @@
             </a:r>
             <a:r>
               <a:rPr lang="en-US" dirty="0" smtClean="0"/>
-              <a:t> – 3)</a:t>
-            </a:r>
+              <a:t> – </a:t>
+            </a:r>
+            <a:r>
+              <a:rPr lang="en-US" dirty="0" smtClean="0"/>
+              <a:t>?)</a:t>
+            </a:r>
+            <a:endParaRPr lang="en-US" dirty="0" smtClean="0"/>
           </a:p>
           <a:p>
             <a:pPr lvl="1"/>
@@ -6864,11 +6880,7 @@
           <a:p>
             <a:r>
               <a:rPr lang="en-US" dirty="0" smtClean="0"/>
-              <a:t>Can create a new controller or pass in a controller from the parent</a:t>
-            </a:r>
-            <a:r>
-              <a:rPr lang="en-US" dirty="0" smtClean="0"/>
-              <a:t>.</a:t>
+              <a:t>Can create a new controller or pass in a controller from the parent.</a:t>
             </a:r>
           </a:p>
           <a:p>
@@ -7085,6 +7097,80 @@
 </file>
 
 <file path=ppt/slides/slide17.xml><?xml version="1.0" encoding="utf-8"?>
+<p:sld xmlns:a="http://schemas.openxmlformats.org/drawingml/2006/main" xmlns:r="http://schemas.openxmlformats.org/officeDocument/2006/relationships" xmlns:p="http://schemas.openxmlformats.org/presentationml/2006/main">
+  <p:cSld>
+    <p:spTree>
+      <p:nvGrpSpPr>
+        <p:cNvPr id="1" name=""/>
+        <p:cNvGrpSpPr/>
+        <p:nvPr/>
+      </p:nvGrpSpPr>
+      <p:grpSpPr>
+        <a:xfrm>
+          <a:off x="0" y="0"/>
+          <a:ext cx="0" cy="0"/>
+          <a:chOff x="0" y="0"/>
+          <a:chExt cx="0" cy="0"/>
+        </a:xfrm>
+      </p:grpSpPr>
+      <p:sp>
+        <p:nvSpPr>
+          <p:cNvPr id="2" name="Title 1"/>
+          <p:cNvSpPr>
+            <a:spLocks noGrp="1"/>
+          </p:cNvSpPr>
+          <p:nvPr>
+            <p:ph type="title"/>
+          </p:nvPr>
+        </p:nvSpPr>
+        <p:spPr/>
+        <p:txBody>
+          <a:bodyPr>
+            <a:normAutofit fontScale="90000"/>
+          </a:bodyPr>
+          <a:lstStyle/>
+          <a:p>
+            <a:r>
+              <a:rPr lang="en-US" dirty="0" smtClean="0"/>
+              <a:t>Inside A Directive: $apply or $watch</a:t>
+            </a:r>
+            <a:endParaRPr lang="en-US" dirty="0"/>
+          </a:p>
+        </p:txBody>
+      </p:sp>
+      <p:sp>
+        <p:nvSpPr>
+          <p:cNvPr id="3" name="Content Placeholder 2"/>
+          <p:cNvSpPr>
+            <a:spLocks noGrp="1"/>
+          </p:cNvSpPr>
+          <p:nvPr>
+            <p:ph sz="quarter" idx="1"/>
+          </p:nvPr>
+        </p:nvSpPr>
+        <p:spPr/>
+        <p:txBody>
+          <a:bodyPr/>
+          <a:lstStyle/>
+          <a:p>
+            <a:endParaRPr lang="en-US" dirty="0"/>
+          </a:p>
+        </p:txBody>
+      </p:sp>
+    </p:spTree>
+    <p:extLst>
+      <p:ext uri="{BB962C8B-B14F-4D97-AF65-F5344CB8AC3E}">
+        <p14:creationId xmlns:p14="http://schemas.microsoft.com/office/powerpoint/2010/main" val="3198031996"/>
+      </p:ext>
+    </p:extLst>
+  </p:cSld>
+  <p:clrMapOvr>
+    <a:masterClrMapping/>
+  </p:clrMapOvr>
+</p:sld>
+</file>
+
+<file path=ppt/slides/slide18.xml><?xml version="1.0" encoding="utf-8"?>
 <p:sld xmlns:a="http://schemas.openxmlformats.org/drawingml/2006/main" xmlns:r="http://schemas.openxmlformats.org/officeDocument/2006/relationships" xmlns:p="http://schemas.openxmlformats.org/presentationml/2006/main">
   <p:cSld>
     <p:spTree>
@@ -8306,11 +8392,13 @@
         <p:spPr>
           <a:xfrm>
             <a:off x="612648" y="1600200"/>
-            <a:ext cx="8153400" cy="1096352"/>
+            <a:ext cx="8153400" cy="2762702"/>
           </a:xfrm>
         </p:spPr>
         <p:txBody>
-          <a:bodyPr/>
+          <a:bodyPr>
+            <a:normAutofit/>
+          </a:bodyPr>
           <a:lstStyle/>
           <a:p>
             <a:r>
@@ -8321,8 +8409,22 @@
           <a:p>
             <a:r>
               <a:rPr lang="en-US" dirty="0" smtClean="0"/>
-              <a:t>Name Some Built-In Directives.</a:t>
-            </a:r>
+              <a:t>Name Some Built-In Directives</a:t>
+            </a:r>
+            <a:r>
+              <a:rPr lang="en-US" dirty="0" smtClean="0"/>
+              <a:t>.</a:t>
+            </a:r>
+          </a:p>
+          <a:p>
+            <a:r>
+              <a:rPr lang="en-US" dirty="0" smtClean="0"/>
+              <a:t>Who Shot First?</a:t>
+            </a:r>
+            <a:endParaRPr lang="en-US" dirty="0" smtClean="0"/>
+          </a:p>
+          <a:p>
+            <a:endParaRPr lang="en-US" dirty="0" smtClean="0"/>
           </a:p>
           <a:p>
             <a:pPr lvl="1"/>
@@ -8456,6 +8558,67 @@
                                           <p:spTgt spid="3">
                                             <p:txEl>
                                               <p:pRg st="1" end="1"/>
+                                            </p:txEl>
+                                          </p:spTgt>
+                                        </p:tgtEl>
+                                      </p:cBhvr>
+                                    </p:animEffect>
+                                  </p:childTnLst>
+                                </p:cTn>
+                              </p:par>
+                            </p:childTnLst>
+                          </p:cTn>
+                        </p:par>
+                      </p:childTnLst>
+                    </p:cTn>
+                  </p:par>
+                  <p:par>
+                    <p:cTn id="13" fill="hold">
+                      <p:stCondLst>
+                        <p:cond delay="indefinite"/>
+                      </p:stCondLst>
+                      <p:childTnLst>
+                        <p:par>
+                          <p:cTn id="14" fill="hold">
+                            <p:stCondLst>
+                              <p:cond delay="0"/>
+                            </p:stCondLst>
+                            <p:childTnLst>
+                              <p:par>
+                                <p:cTn id="15" presetID="9" presetClass="entr" presetSubtype="0" fill="hold" nodeType="clickEffect">
+                                  <p:stCondLst>
+                                    <p:cond delay="0"/>
+                                  </p:stCondLst>
+                                  <p:childTnLst>
+                                    <p:set>
+                                      <p:cBhvr>
+                                        <p:cTn id="16" dur="1" fill="hold">
+                                          <p:stCondLst>
+                                            <p:cond delay="0"/>
+                                          </p:stCondLst>
+                                        </p:cTn>
+                                        <p:tgtEl>
+                                          <p:spTgt spid="3">
+                                            <p:txEl>
+                                              <p:pRg st="2" end="2"/>
+                                            </p:txEl>
+                                          </p:spTgt>
+                                        </p:tgtEl>
+                                        <p:attrNameLst>
+                                          <p:attrName>style.visibility</p:attrName>
+                                        </p:attrNameLst>
+                                      </p:cBhvr>
+                                      <p:to>
+                                        <p:strVal val="visible"/>
+                                      </p:to>
+                                    </p:set>
+                                    <p:animEffect transition="in" filter="dissolve">
+                                      <p:cBhvr>
+                                        <p:cTn id="17" dur="500"/>
+                                        <p:tgtEl>
+                                          <p:spTgt spid="3">
+                                            <p:txEl>
+                                              <p:pRg st="2" end="2"/>
                                             </p:txEl>
                                           </p:spTgt>
                                         </p:tgtEl>

</xml_diff>

<commit_message>
More Changes and Additions
</commit_message>
<xml_diff>
--- a/presentation/ajs_dir_presentation.pptx
+++ b/presentation/ajs_dir_presentation.pptx
@@ -209,7 +209,7 @@
           <a:p>
             <a:fld id="{457A472E-D807-BD49-BE97-A395F22B75F3}" type="datetimeFigureOut">
               <a:rPr lang="en-US" smtClean="0"/>
-              <a:t>9/4/14</a:t>
+              <a:t>9/6/14</a:t>
             </a:fld>
             <a:endParaRPr lang="en-US"/>
           </a:p>
@@ -930,7 +930,7 @@
             <a:fld id="{23A271A1-F6D6-438B-A432-4747EE7ECD40}" type="datetimeFigureOut">
               <a:rPr lang="en-US" smtClean="0"/>
               <a:pPr algn="ctr" eaLnBrk="1" latinLnBrk="0" hangingPunct="1"/>
-              <a:t>9/4/14</a:t>
+              <a:t>9/6/14</a:t>
             </a:fld>
             <a:endParaRPr lang="en-US" sz="2000" dirty="0">
               <a:solidFill>
@@ -1117,7 +1117,7 @@
             <a:fld id="{23A271A1-F6D6-438B-A432-4747EE7ECD40}" type="datetimeFigureOut">
               <a:rPr lang="en-US" smtClean="0"/>
               <a:pPr eaLnBrk="1" latinLnBrk="0" hangingPunct="1"/>
-              <a:t>9/4/14</a:t>
+              <a:t>9/6/14</a:t>
             </a:fld>
             <a:endParaRPr lang="en-US"/>
           </a:p>
@@ -1285,7 +1285,7 @@
             <a:fld id="{23A271A1-F6D6-438B-A432-4747EE7ECD40}" type="datetimeFigureOut">
               <a:rPr lang="en-US" smtClean="0"/>
               <a:pPr eaLnBrk="1" latinLnBrk="0" hangingPunct="1"/>
-              <a:t>9/4/14</a:t>
+              <a:t>9/6/14</a:t>
             </a:fld>
             <a:endParaRPr lang="en-US" dirty="0"/>
           </a:p>
@@ -1547,7 +1547,7 @@
             <a:fld id="{23A271A1-F6D6-438B-A432-4747EE7ECD40}" type="datetimeFigureOut">
               <a:rPr lang="en-US" smtClean="0"/>
               <a:pPr eaLnBrk="1" latinLnBrk="0" hangingPunct="1"/>
-              <a:t>9/4/14</a:t>
+              <a:t>9/6/14</a:t>
             </a:fld>
             <a:endParaRPr lang="en-US" dirty="0"/>
           </a:p>
@@ -1947,7 +1947,7 @@
             <a:fld id="{23A271A1-F6D6-438B-A432-4747EE7ECD40}" type="datetimeFigureOut">
               <a:rPr lang="en-US" smtClean="0"/>
               <a:pPr eaLnBrk="1" latinLnBrk="0" hangingPunct="1"/>
-              <a:t>9/4/14</a:t>
+              <a:t>9/6/14</a:t>
             </a:fld>
             <a:endParaRPr lang="en-US"/>
           </a:p>
@@ -2161,7 +2161,7 @@
             <a:fld id="{23A271A1-F6D6-438B-A432-4747EE7ECD40}" type="datetimeFigureOut">
               <a:rPr lang="en-US" smtClean="0"/>
               <a:pPr eaLnBrk="1" latinLnBrk="0" hangingPunct="1"/>
-              <a:t>9/4/14</a:t>
+              <a:t>9/6/14</a:t>
             </a:fld>
             <a:endParaRPr lang="en-US"/>
           </a:p>
@@ -2365,7 +2365,7 @@
             <a:fld id="{23A271A1-F6D6-438B-A432-4747EE7ECD40}" type="datetimeFigureOut">
               <a:rPr lang="en-US" smtClean="0"/>
               <a:pPr eaLnBrk="1" latinLnBrk="0" hangingPunct="1"/>
-              <a:t>9/4/14</a:t>
+              <a:t>9/6/14</a:t>
             </a:fld>
             <a:endParaRPr lang="en-US"/>
           </a:p>
@@ -2554,7 +2554,7 @@
             <a:fld id="{23A271A1-F6D6-438B-A432-4747EE7ECD40}" type="datetimeFigureOut">
               <a:rPr lang="en-US" smtClean="0"/>
               <a:pPr eaLnBrk="1" latinLnBrk="0" hangingPunct="1"/>
-              <a:t>9/4/14</a:t>
+              <a:t>9/6/14</a:t>
             </a:fld>
             <a:endParaRPr lang="en-US"/>
           </a:p>
@@ -2659,7 +2659,7 @@
             <a:fld id="{23A271A1-F6D6-438B-A432-4747EE7ECD40}" type="datetimeFigureOut">
               <a:rPr lang="en-US" smtClean="0"/>
               <a:pPr eaLnBrk="1" latinLnBrk="0" hangingPunct="1"/>
-              <a:t>9/4/14</a:t>
+              <a:t>9/6/14</a:t>
             </a:fld>
             <a:endParaRPr lang="en-US"/>
           </a:p>
@@ -2798,7 +2798,7 @@
             <a:fld id="{23A271A1-F6D6-438B-A432-4747EE7ECD40}" type="datetimeFigureOut">
               <a:rPr lang="en-US" smtClean="0"/>
               <a:pPr eaLnBrk="1" latinLnBrk="0" hangingPunct="1"/>
-              <a:t>9/4/14</a:t>
+              <a:t>9/6/14</a:t>
             </a:fld>
             <a:endParaRPr lang="en-US"/>
           </a:p>
@@ -3297,7 +3297,7 @@
             <a:fld id="{23A271A1-F6D6-438B-A432-4747EE7ECD40}" type="datetimeFigureOut">
               <a:rPr lang="en-US" smtClean="0"/>
               <a:pPr eaLnBrk="1" latinLnBrk="0" hangingPunct="1"/>
-              <a:t>9/4/14</a:t>
+              <a:t>9/6/14</a:t>
             </a:fld>
             <a:endParaRPr lang="en-US"/>
           </a:p>
@@ -3558,7 +3558,7 @@
             <a:fld id="{23A271A1-F6D6-438B-A432-4747EE7ECD40}" type="datetimeFigureOut">
               <a:rPr lang="en-US" smtClean="0"/>
               <a:pPr eaLnBrk="1" latinLnBrk="0" hangingPunct="1"/>
-              <a:t>9/4/14</a:t>
+              <a:t>9/6/14</a:t>
             </a:fld>
             <a:endParaRPr lang="en-US" sz="1400" dirty="0">
               <a:solidFill>
@@ -4538,7 +4538,6 @@
               <a:rPr lang="en-US" dirty="0" smtClean="0"/>
               <a:t>Remove the custom tag or leave it</a:t>
             </a:r>
-            <a:endParaRPr lang="en-US" dirty="0" smtClean="0"/>
           </a:p>
           <a:p>
             <a:pPr lvl="1"/>
@@ -4556,13 +4555,8 @@
             </a:r>
             <a:r>
               <a:rPr lang="en-US" dirty="0" smtClean="0"/>
-              <a:t> – </a:t>
-            </a:r>
-            <a:r>
-              <a:rPr lang="en-US" dirty="0" smtClean="0"/>
-              <a:t>?)</a:t>
-            </a:r>
-            <a:endParaRPr lang="en-US" dirty="0" smtClean="0"/>
+              <a:t> – ?)</a:t>
+            </a:r>
           </a:p>
           <a:p>
             <a:pPr lvl="1"/>
@@ -7138,25 +7132,6 @@
           </a:p>
         </p:txBody>
       </p:sp>
-      <p:sp>
-        <p:nvSpPr>
-          <p:cNvPr id="3" name="Content Placeholder 2"/>
-          <p:cNvSpPr>
-            <a:spLocks noGrp="1"/>
-          </p:cNvSpPr>
-          <p:nvPr>
-            <p:ph sz="quarter" idx="1"/>
-          </p:nvPr>
-        </p:nvSpPr>
-        <p:spPr/>
-        <p:txBody>
-          <a:bodyPr/>
-          <a:lstStyle/>
-          <a:p>
-            <a:endParaRPr lang="en-US" dirty="0"/>
-          </a:p>
-        </p:txBody>
-      </p:sp>
     </p:spTree>
     <p:extLst>
       <p:ext uri="{BB962C8B-B14F-4D97-AF65-F5344CB8AC3E}">
@@ -8409,11 +8384,7 @@
           <a:p>
             <a:r>
               <a:rPr lang="en-US" dirty="0" smtClean="0"/>
-              <a:t>Name Some Built-In Directives</a:t>
-            </a:r>
-            <a:r>
-              <a:rPr lang="en-US" dirty="0" smtClean="0"/>
-              <a:t>.</a:t>
+              <a:t>Name Some Built-In Directives.</a:t>
             </a:r>
           </a:p>
           <a:p>
@@ -8421,7 +8392,6 @@
               <a:rPr lang="en-US" dirty="0" smtClean="0"/>
               <a:t>Who Shot First?</a:t>
             </a:r>
-            <a:endParaRPr lang="en-US" dirty="0" smtClean="0"/>
           </a:p>
           <a:p>
             <a:endParaRPr lang="en-US" dirty="0" smtClean="0"/>

</xml_diff>

<commit_message>
More Work Done For Meeting
</commit_message>
<xml_diff>
--- a/presentation/ajs_dir_presentation.pptx
+++ b/presentation/ajs_dir_presentation.pptx
@@ -209,7 +209,7 @@
           <a:p>
             <a:fld id="{457A472E-D807-BD49-BE97-A395F22B75F3}" type="datetimeFigureOut">
               <a:rPr lang="en-US" smtClean="0"/>
-              <a:t>9/6/14</a:t>
+              <a:t>10/19/14</a:t>
             </a:fld>
             <a:endParaRPr lang="en-US"/>
           </a:p>
@@ -930,7 +930,7 @@
             <a:fld id="{23A271A1-F6D6-438B-A432-4747EE7ECD40}" type="datetimeFigureOut">
               <a:rPr lang="en-US" smtClean="0"/>
               <a:pPr algn="ctr" eaLnBrk="1" latinLnBrk="0" hangingPunct="1"/>
-              <a:t>9/6/14</a:t>
+              <a:t>10/19/14</a:t>
             </a:fld>
             <a:endParaRPr lang="en-US" sz="2000" dirty="0">
               <a:solidFill>
@@ -1117,7 +1117,7 @@
             <a:fld id="{23A271A1-F6D6-438B-A432-4747EE7ECD40}" type="datetimeFigureOut">
               <a:rPr lang="en-US" smtClean="0"/>
               <a:pPr eaLnBrk="1" latinLnBrk="0" hangingPunct="1"/>
-              <a:t>9/6/14</a:t>
+              <a:t>10/19/14</a:t>
             </a:fld>
             <a:endParaRPr lang="en-US"/>
           </a:p>
@@ -1285,7 +1285,7 @@
             <a:fld id="{23A271A1-F6D6-438B-A432-4747EE7ECD40}" type="datetimeFigureOut">
               <a:rPr lang="en-US" smtClean="0"/>
               <a:pPr eaLnBrk="1" latinLnBrk="0" hangingPunct="1"/>
-              <a:t>9/6/14</a:t>
+              <a:t>10/19/14</a:t>
             </a:fld>
             <a:endParaRPr lang="en-US" dirty="0"/>
           </a:p>
@@ -1547,7 +1547,7 @@
             <a:fld id="{23A271A1-F6D6-438B-A432-4747EE7ECD40}" type="datetimeFigureOut">
               <a:rPr lang="en-US" smtClean="0"/>
               <a:pPr eaLnBrk="1" latinLnBrk="0" hangingPunct="1"/>
-              <a:t>9/6/14</a:t>
+              <a:t>10/19/14</a:t>
             </a:fld>
             <a:endParaRPr lang="en-US" dirty="0"/>
           </a:p>
@@ -1947,7 +1947,7 @@
             <a:fld id="{23A271A1-F6D6-438B-A432-4747EE7ECD40}" type="datetimeFigureOut">
               <a:rPr lang="en-US" smtClean="0"/>
               <a:pPr eaLnBrk="1" latinLnBrk="0" hangingPunct="1"/>
-              <a:t>9/6/14</a:t>
+              <a:t>10/19/14</a:t>
             </a:fld>
             <a:endParaRPr lang="en-US"/>
           </a:p>
@@ -2161,7 +2161,7 @@
             <a:fld id="{23A271A1-F6D6-438B-A432-4747EE7ECD40}" type="datetimeFigureOut">
               <a:rPr lang="en-US" smtClean="0"/>
               <a:pPr eaLnBrk="1" latinLnBrk="0" hangingPunct="1"/>
-              <a:t>9/6/14</a:t>
+              <a:t>10/19/14</a:t>
             </a:fld>
             <a:endParaRPr lang="en-US"/>
           </a:p>
@@ -2365,7 +2365,7 @@
             <a:fld id="{23A271A1-F6D6-438B-A432-4747EE7ECD40}" type="datetimeFigureOut">
               <a:rPr lang="en-US" smtClean="0"/>
               <a:pPr eaLnBrk="1" latinLnBrk="0" hangingPunct="1"/>
-              <a:t>9/6/14</a:t>
+              <a:t>10/19/14</a:t>
             </a:fld>
             <a:endParaRPr lang="en-US"/>
           </a:p>
@@ -2554,7 +2554,7 @@
             <a:fld id="{23A271A1-F6D6-438B-A432-4747EE7ECD40}" type="datetimeFigureOut">
               <a:rPr lang="en-US" smtClean="0"/>
               <a:pPr eaLnBrk="1" latinLnBrk="0" hangingPunct="1"/>
-              <a:t>9/6/14</a:t>
+              <a:t>10/19/14</a:t>
             </a:fld>
             <a:endParaRPr lang="en-US"/>
           </a:p>
@@ -2659,7 +2659,7 @@
             <a:fld id="{23A271A1-F6D6-438B-A432-4747EE7ECD40}" type="datetimeFigureOut">
               <a:rPr lang="en-US" smtClean="0"/>
               <a:pPr eaLnBrk="1" latinLnBrk="0" hangingPunct="1"/>
-              <a:t>9/6/14</a:t>
+              <a:t>10/19/14</a:t>
             </a:fld>
             <a:endParaRPr lang="en-US"/>
           </a:p>
@@ -2798,7 +2798,7 @@
             <a:fld id="{23A271A1-F6D6-438B-A432-4747EE7ECD40}" type="datetimeFigureOut">
               <a:rPr lang="en-US" smtClean="0"/>
               <a:pPr eaLnBrk="1" latinLnBrk="0" hangingPunct="1"/>
-              <a:t>9/6/14</a:t>
+              <a:t>10/19/14</a:t>
             </a:fld>
             <a:endParaRPr lang="en-US"/>
           </a:p>
@@ -3297,7 +3297,7 @@
             <a:fld id="{23A271A1-F6D6-438B-A432-4747EE7ECD40}" type="datetimeFigureOut">
               <a:rPr lang="en-US" smtClean="0"/>
               <a:pPr eaLnBrk="1" latinLnBrk="0" hangingPunct="1"/>
-              <a:t>9/6/14</a:t>
+              <a:t>10/19/14</a:t>
             </a:fld>
             <a:endParaRPr lang="en-US"/>
           </a:p>
@@ -3558,7 +3558,7 @@
             <a:fld id="{23A271A1-F6D6-438B-A432-4747EE7ECD40}" type="datetimeFigureOut">
               <a:rPr lang="en-US" smtClean="0"/>
               <a:pPr eaLnBrk="1" latinLnBrk="0" hangingPunct="1"/>
-              <a:t>9/6/14</a:t>
+              <a:t>10/19/14</a:t>
             </a:fld>
             <a:endParaRPr lang="en-US" sz="1400" dirty="0">
               <a:solidFill>
@@ -4555,8 +4555,13 @@
             </a:r>
             <a:r>
               <a:rPr lang="en-US" dirty="0" smtClean="0"/>
-              <a:t> – ?)</a:t>
-            </a:r>
+              <a:t> – ?</a:t>
+            </a:r>
+            <a:r>
+              <a:rPr lang="en-US" dirty="0" smtClean="0"/>
+              <a:t>) [Order Of Execution]</a:t>
+            </a:r>
+            <a:endParaRPr lang="en-US" dirty="0" smtClean="0"/>
           </a:p>
           <a:p>
             <a:pPr lvl="1"/>
@@ -4878,7 +4883,7 @@
             <a:pPr lvl="1"/>
             <a:r>
               <a:rPr lang="en-US" sz="2100" dirty="0" smtClean="0"/>
-              <a:t>Comment/Meta ( </a:t>
+              <a:t>Comment ( </a:t>
             </a:r>
             <a:r>
               <a:rPr lang="en-US" sz="2100" dirty="0" smtClean="0">
@@ -6675,7 +6680,11 @@
             <a:pPr lvl="2"/>
             <a:r>
               <a:rPr lang="en-US" dirty="0" smtClean="0"/>
-              <a:t>templateUrl: ‘./partials/</a:t>
+              <a:t>templateUrl: ‘.</a:t>
+            </a:r>
+            <a:r>
+              <a:rPr lang="en-US" dirty="0" smtClean="0"/>
+              <a:t>/views/</a:t>
             </a:r>
             <a:r>
               <a:rPr lang="en-US" dirty="0" err="1" smtClean="0"/>

</xml_diff>